<commit_message>
Reordered and clarified the debug description documentation.
</commit_message>
<xml_diff>
--- a/CMSIS/DoxyGen/Pack/src/CMSIS-Pack.pptx
+++ b/CMSIS/DoxyGen/Pack/src/CMSIS-Pack.pptx
@@ -5,14 +5,15 @@
     <p:sldMasterId id="2147483716" r:id="rId5"/>
   </p:sldMasterIdLst>
   <p:notesMasterIdLst>
-    <p:notesMasterId r:id="rId8"/>
+    <p:notesMasterId r:id="rId9"/>
   </p:notesMasterIdLst>
   <p:handoutMasterIdLst>
-    <p:handoutMasterId r:id="rId9"/>
+    <p:handoutMasterId r:id="rId10"/>
   </p:handoutMasterIdLst>
   <p:sldIdLst>
     <p:sldId id="279" r:id="rId6"/>
     <p:sldId id="280" r:id="rId7"/>
+    <p:sldId id="281" r:id="rId8"/>
   </p:sldIdLst>
   <p:sldSz cx="12188825" cy="6858000"/>
   <p:notesSz cx="6794500" cy="9918700"/>
@@ -124,6 +125,753 @@
 </file>
 
 <file path=ppt/diagrams/colors1.xml><?xml version="1.0" encoding="utf-8"?>
+<dgm:colorsDef xmlns:dgm="http://schemas.openxmlformats.org/drawingml/2006/diagram" xmlns:a="http://schemas.openxmlformats.org/drawingml/2006/main" uniqueId="urn:microsoft.com/office/officeart/2005/8/colors/accent1_2">
+  <dgm:title val=""/>
+  <dgm:desc val=""/>
+  <dgm:catLst>
+    <dgm:cat type="accent1" pri="11200"/>
+  </dgm:catLst>
+  <dgm:styleLbl name="node0">
+    <dgm:fillClrLst meth="repeat">
+      <a:schemeClr val="accent1"/>
+    </dgm:fillClrLst>
+    <dgm:linClrLst meth="repeat">
+      <a:schemeClr val="lt1"/>
+    </dgm:linClrLst>
+    <dgm:effectClrLst/>
+    <dgm:txLinClrLst/>
+    <dgm:txFillClrLst/>
+    <dgm:txEffectClrLst/>
+  </dgm:styleLbl>
+  <dgm:styleLbl name="alignNode1">
+    <dgm:fillClrLst meth="repeat">
+      <a:schemeClr val="accent1"/>
+    </dgm:fillClrLst>
+    <dgm:linClrLst meth="repeat">
+      <a:schemeClr val="accent1"/>
+    </dgm:linClrLst>
+    <dgm:effectClrLst/>
+    <dgm:txLinClrLst/>
+    <dgm:txFillClrLst/>
+    <dgm:txEffectClrLst/>
+  </dgm:styleLbl>
+  <dgm:styleLbl name="node1">
+    <dgm:fillClrLst meth="repeat">
+      <a:schemeClr val="accent1"/>
+    </dgm:fillClrLst>
+    <dgm:linClrLst meth="repeat">
+      <a:schemeClr val="lt1"/>
+    </dgm:linClrLst>
+    <dgm:effectClrLst/>
+    <dgm:txLinClrLst/>
+    <dgm:txFillClrLst/>
+    <dgm:txEffectClrLst/>
+  </dgm:styleLbl>
+  <dgm:styleLbl name="lnNode1">
+    <dgm:fillClrLst meth="repeat">
+      <a:schemeClr val="accent1"/>
+    </dgm:fillClrLst>
+    <dgm:linClrLst meth="repeat">
+      <a:schemeClr val="lt1"/>
+    </dgm:linClrLst>
+    <dgm:effectClrLst/>
+    <dgm:txLinClrLst/>
+    <dgm:txFillClrLst/>
+    <dgm:txEffectClrLst/>
+  </dgm:styleLbl>
+  <dgm:styleLbl name="vennNode1">
+    <dgm:fillClrLst meth="repeat">
+      <a:schemeClr val="accent1">
+        <a:alpha val="50000"/>
+      </a:schemeClr>
+    </dgm:fillClrLst>
+    <dgm:linClrLst meth="repeat">
+      <a:schemeClr val="lt1"/>
+    </dgm:linClrLst>
+    <dgm:effectClrLst/>
+    <dgm:txLinClrLst/>
+    <dgm:txFillClrLst/>
+    <dgm:txEffectClrLst/>
+  </dgm:styleLbl>
+  <dgm:styleLbl name="node2">
+    <dgm:fillClrLst meth="repeat">
+      <a:schemeClr val="accent1"/>
+    </dgm:fillClrLst>
+    <dgm:linClrLst meth="repeat">
+      <a:schemeClr val="lt1"/>
+    </dgm:linClrLst>
+    <dgm:effectClrLst/>
+    <dgm:txLinClrLst/>
+    <dgm:txFillClrLst/>
+    <dgm:txEffectClrLst/>
+  </dgm:styleLbl>
+  <dgm:styleLbl name="node3">
+    <dgm:fillClrLst meth="repeat">
+      <a:schemeClr val="accent1"/>
+    </dgm:fillClrLst>
+    <dgm:linClrLst meth="repeat">
+      <a:schemeClr val="lt1"/>
+    </dgm:linClrLst>
+    <dgm:effectClrLst/>
+    <dgm:txLinClrLst/>
+    <dgm:txFillClrLst/>
+    <dgm:txEffectClrLst/>
+  </dgm:styleLbl>
+  <dgm:styleLbl name="node4">
+    <dgm:fillClrLst meth="repeat">
+      <a:schemeClr val="accent1"/>
+    </dgm:fillClrLst>
+    <dgm:linClrLst meth="repeat">
+      <a:schemeClr val="lt1"/>
+    </dgm:linClrLst>
+    <dgm:effectClrLst/>
+    <dgm:txLinClrLst/>
+    <dgm:txFillClrLst/>
+    <dgm:txEffectClrLst/>
+  </dgm:styleLbl>
+  <dgm:styleLbl name="fgImgPlace1">
+    <dgm:fillClrLst meth="repeat">
+      <a:schemeClr val="accent1">
+        <a:tint val="50000"/>
+      </a:schemeClr>
+    </dgm:fillClrLst>
+    <dgm:linClrLst meth="repeat">
+      <a:schemeClr val="lt1"/>
+    </dgm:linClrLst>
+    <dgm:effectClrLst/>
+    <dgm:txLinClrLst/>
+    <dgm:txFillClrLst meth="repeat">
+      <a:schemeClr val="lt1"/>
+    </dgm:txFillClrLst>
+    <dgm:txEffectClrLst/>
+  </dgm:styleLbl>
+  <dgm:styleLbl name="alignImgPlace1">
+    <dgm:fillClrLst meth="repeat">
+      <a:schemeClr val="accent1">
+        <a:tint val="50000"/>
+      </a:schemeClr>
+    </dgm:fillClrLst>
+    <dgm:linClrLst meth="repeat">
+      <a:schemeClr val="lt1"/>
+    </dgm:linClrLst>
+    <dgm:effectClrLst/>
+    <dgm:txLinClrLst/>
+    <dgm:txFillClrLst meth="repeat">
+      <a:schemeClr val="lt1"/>
+    </dgm:txFillClrLst>
+    <dgm:txEffectClrLst/>
+  </dgm:styleLbl>
+  <dgm:styleLbl name="bgImgPlace1">
+    <dgm:fillClrLst meth="repeat">
+      <a:schemeClr val="accent1">
+        <a:tint val="50000"/>
+      </a:schemeClr>
+    </dgm:fillClrLst>
+    <dgm:linClrLst meth="repeat">
+      <a:schemeClr val="lt1"/>
+    </dgm:linClrLst>
+    <dgm:effectClrLst/>
+    <dgm:txLinClrLst/>
+    <dgm:txFillClrLst meth="repeat">
+      <a:schemeClr val="lt1"/>
+    </dgm:txFillClrLst>
+    <dgm:txEffectClrLst/>
+  </dgm:styleLbl>
+  <dgm:styleLbl name="sibTrans2D1">
+    <dgm:fillClrLst meth="repeat">
+      <a:schemeClr val="accent1">
+        <a:tint val="60000"/>
+      </a:schemeClr>
+    </dgm:fillClrLst>
+    <dgm:linClrLst meth="repeat">
+      <a:schemeClr val="accent1">
+        <a:tint val="60000"/>
+      </a:schemeClr>
+    </dgm:linClrLst>
+    <dgm:effectClrLst/>
+    <dgm:txLinClrLst/>
+    <dgm:txFillClrLst/>
+    <dgm:txEffectClrLst/>
+  </dgm:styleLbl>
+  <dgm:styleLbl name="fgSibTrans2D1">
+    <dgm:fillClrLst meth="repeat">
+      <a:schemeClr val="accent1">
+        <a:tint val="60000"/>
+      </a:schemeClr>
+    </dgm:fillClrLst>
+    <dgm:linClrLst meth="repeat">
+      <a:schemeClr val="accent1">
+        <a:tint val="60000"/>
+      </a:schemeClr>
+    </dgm:linClrLst>
+    <dgm:effectClrLst/>
+    <dgm:txLinClrLst/>
+    <dgm:txFillClrLst/>
+    <dgm:txEffectClrLst/>
+  </dgm:styleLbl>
+  <dgm:styleLbl name="bgSibTrans2D1">
+    <dgm:fillClrLst meth="repeat">
+      <a:schemeClr val="accent1">
+        <a:tint val="60000"/>
+      </a:schemeClr>
+    </dgm:fillClrLst>
+    <dgm:linClrLst meth="repeat">
+      <a:schemeClr val="accent1">
+        <a:tint val="60000"/>
+      </a:schemeClr>
+    </dgm:linClrLst>
+    <dgm:effectClrLst/>
+    <dgm:txLinClrLst/>
+    <dgm:txFillClrLst/>
+    <dgm:txEffectClrLst/>
+  </dgm:styleLbl>
+  <dgm:styleLbl name="sibTrans1D1">
+    <dgm:fillClrLst meth="repeat">
+      <a:schemeClr val="accent1"/>
+    </dgm:fillClrLst>
+    <dgm:linClrLst meth="repeat">
+      <a:schemeClr val="accent1"/>
+    </dgm:linClrLst>
+    <dgm:effectClrLst/>
+    <dgm:txLinClrLst/>
+    <dgm:txFillClrLst meth="repeat">
+      <a:schemeClr val="tx1"/>
+    </dgm:txFillClrLst>
+    <dgm:txEffectClrLst/>
+  </dgm:styleLbl>
+  <dgm:styleLbl name="callout">
+    <dgm:fillClrLst meth="repeat">
+      <a:schemeClr val="accent1"/>
+    </dgm:fillClrLst>
+    <dgm:linClrLst meth="repeat">
+      <a:schemeClr val="accent1">
+        <a:tint val="50000"/>
+      </a:schemeClr>
+    </dgm:linClrLst>
+    <dgm:effectClrLst/>
+    <dgm:txLinClrLst/>
+    <dgm:txFillClrLst meth="repeat">
+      <a:schemeClr val="tx1"/>
+    </dgm:txFillClrLst>
+    <dgm:txEffectClrLst/>
+  </dgm:styleLbl>
+  <dgm:styleLbl name="asst0">
+    <dgm:fillClrLst meth="repeat">
+      <a:schemeClr val="accent1"/>
+    </dgm:fillClrLst>
+    <dgm:linClrLst meth="repeat">
+      <a:schemeClr val="lt1"/>
+    </dgm:linClrLst>
+    <dgm:effectClrLst/>
+    <dgm:txLinClrLst/>
+    <dgm:txFillClrLst/>
+    <dgm:txEffectClrLst/>
+  </dgm:styleLbl>
+  <dgm:styleLbl name="asst1">
+    <dgm:fillClrLst meth="repeat">
+      <a:schemeClr val="accent1"/>
+    </dgm:fillClrLst>
+    <dgm:linClrLst meth="repeat">
+      <a:schemeClr val="lt1"/>
+    </dgm:linClrLst>
+    <dgm:effectClrLst/>
+    <dgm:txLinClrLst/>
+    <dgm:txFillClrLst/>
+    <dgm:txEffectClrLst/>
+  </dgm:styleLbl>
+  <dgm:styleLbl name="asst2">
+    <dgm:fillClrLst meth="repeat">
+      <a:schemeClr val="accent1"/>
+    </dgm:fillClrLst>
+    <dgm:linClrLst meth="repeat">
+      <a:schemeClr val="lt1"/>
+    </dgm:linClrLst>
+    <dgm:effectClrLst/>
+    <dgm:txLinClrLst/>
+    <dgm:txFillClrLst/>
+    <dgm:txEffectClrLst/>
+  </dgm:styleLbl>
+  <dgm:styleLbl name="asst3">
+    <dgm:fillClrLst meth="repeat">
+      <a:schemeClr val="accent1"/>
+    </dgm:fillClrLst>
+    <dgm:linClrLst meth="repeat">
+      <a:schemeClr val="lt1"/>
+    </dgm:linClrLst>
+    <dgm:effectClrLst/>
+    <dgm:txLinClrLst/>
+    <dgm:txFillClrLst/>
+    <dgm:txEffectClrLst/>
+  </dgm:styleLbl>
+  <dgm:styleLbl name="asst4">
+    <dgm:fillClrLst meth="repeat">
+      <a:schemeClr val="accent1"/>
+    </dgm:fillClrLst>
+    <dgm:linClrLst meth="repeat">
+      <a:schemeClr val="lt1"/>
+    </dgm:linClrLst>
+    <dgm:effectClrLst/>
+    <dgm:txLinClrLst/>
+    <dgm:txFillClrLst/>
+    <dgm:txEffectClrLst/>
+  </dgm:styleLbl>
+  <dgm:styleLbl name="parChTrans2D1">
+    <dgm:fillClrLst meth="repeat">
+      <a:schemeClr val="accent1">
+        <a:tint val="60000"/>
+      </a:schemeClr>
+    </dgm:fillClrLst>
+    <dgm:linClrLst meth="repeat">
+      <a:schemeClr val="accent1">
+        <a:tint val="60000"/>
+      </a:schemeClr>
+    </dgm:linClrLst>
+    <dgm:effectClrLst/>
+    <dgm:txLinClrLst/>
+    <dgm:txFillClrLst meth="repeat">
+      <a:schemeClr val="lt1"/>
+    </dgm:txFillClrLst>
+    <dgm:txEffectClrLst/>
+  </dgm:styleLbl>
+  <dgm:styleLbl name="parChTrans2D2">
+    <dgm:fillClrLst meth="repeat">
+      <a:schemeClr val="accent1"/>
+    </dgm:fillClrLst>
+    <dgm:linClrLst meth="repeat">
+      <a:schemeClr val="accent1"/>
+    </dgm:linClrLst>
+    <dgm:effectClrLst/>
+    <dgm:txLinClrLst/>
+    <dgm:txFillClrLst meth="repeat">
+      <a:schemeClr val="lt1"/>
+    </dgm:txFillClrLst>
+    <dgm:txEffectClrLst/>
+  </dgm:styleLbl>
+  <dgm:styleLbl name="parChTrans2D3">
+    <dgm:fillClrLst meth="repeat">
+      <a:schemeClr val="accent1"/>
+    </dgm:fillClrLst>
+    <dgm:linClrLst meth="repeat">
+      <a:schemeClr val="accent1"/>
+    </dgm:linClrLst>
+    <dgm:effectClrLst/>
+    <dgm:txLinClrLst/>
+    <dgm:txFillClrLst meth="repeat">
+      <a:schemeClr val="lt1"/>
+    </dgm:txFillClrLst>
+    <dgm:txEffectClrLst/>
+  </dgm:styleLbl>
+  <dgm:styleLbl name="parChTrans2D4">
+    <dgm:fillClrLst meth="repeat">
+      <a:schemeClr val="accent1"/>
+    </dgm:fillClrLst>
+    <dgm:linClrLst meth="repeat">
+      <a:schemeClr val="accent1"/>
+    </dgm:linClrLst>
+    <dgm:effectClrLst/>
+    <dgm:txLinClrLst/>
+    <dgm:txFillClrLst meth="repeat">
+      <a:schemeClr val="lt1"/>
+    </dgm:txFillClrLst>
+    <dgm:txEffectClrLst/>
+  </dgm:styleLbl>
+  <dgm:styleLbl name="parChTrans1D1">
+    <dgm:fillClrLst meth="repeat">
+      <a:schemeClr val="accent1"/>
+    </dgm:fillClrLst>
+    <dgm:linClrLst meth="repeat">
+      <a:schemeClr val="accent1">
+        <a:shade val="60000"/>
+      </a:schemeClr>
+    </dgm:linClrLst>
+    <dgm:effectClrLst/>
+    <dgm:txLinClrLst/>
+    <dgm:txFillClrLst meth="repeat">
+      <a:schemeClr val="tx1"/>
+    </dgm:txFillClrLst>
+    <dgm:txEffectClrLst/>
+  </dgm:styleLbl>
+  <dgm:styleLbl name="parChTrans1D2">
+    <dgm:fillClrLst meth="repeat">
+      <a:schemeClr val="accent1"/>
+    </dgm:fillClrLst>
+    <dgm:linClrLst meth="repeat">
+      <a:schemeClr val="accent1">
+        <a:shade val="60000"/>
+      </a:schemeClr>
+    </dgm:linClrLst>
+    <dgm:effectClrLst/>
+    <dgm:txLinClrLst/>
+    <dgm:txFillClrLst meth="repeat">
+      <a:schemeClr val="tx1"/>
+    </dgm:txFillClrLst>
+    <dgm:txEffectClrLst/>
+  </dgm:styleLbl>
+  <dgm:styleLbl name="parChTrans1D3">
+    <dgm:fillClrLst meth="repeat">
+      <a:schemeClr val="accent1"/>
+    </dgm:fillClrLst>
+    <dgm:linClrLst meth="repeat">
+      <a:schemeClr val="accent1">
+        <a:shade val="80000"/>
+      </a:schemeClr>
+    </dgm:linClrLst>
+    <dgm:effectClrLst/>
+    <dgm:txLinClrLst/>
+    <dgm:txFillClrLst meth="repeat">
+      <a:schemeClr val="tx1"/>
+    </dgm:txFillClrLst>
+    <dgm:txEffectClrLst/>
+  </dgm:styleLbl>
+  <dgm:styleLbl name="parChTrans1D4">
+    <dgm:fillClrLst meth="repeat">
+      <a:schemeClr val="accent1"/>
+    </dgm:fillClrLst>
+    <dgm:linClrLst meth="repeat">
+      <a:schemeClr val="accent1">
+        <a:shade val="80000"/>
+      </a:schemeClr>
+    </dgm:linClrLst>
+    <dgm:effectClrLst/>
+    <dgm:txLinClrLst/>
+    <dgm:txFillClrLst meth="repeat">
+      <a:schemeClr val="tx1"/>
+    </dgm:txFillClrLst>
+    <dgm:txEffectClrLst/>
+  </dgm:styleLbl>
+  <dgm:styleLbl name="fgAcc1">
+    <dgm:fillClrLst meth="repeat">
+      <a:schemeClr val="lt1">
+        <a:alpha val="90000"/>
+      </a:schemeClr>
+    </dgm:fillClrLst>
+    <dgm:linClrLst meth="repeat">
+      <a:schemeClr val="accent1"/>
+    </dgm:linClrLst>
+    <dgm:effectClrLst/>
+    <dgm:txLinClrLst/>
+    <dgm:txFillClrLst meth="repeat">
+      <a:schemeClr val="dk1"/>
+    </dgm:txFillClrLst>
+    <dgm:txEffectClrLst/>
+  </dgm:styleLbl>
+  <dgm:styleLbl name="conFgAcc1">
+    <dgm:fillClrLst meth="repeat">
+      <a:schemeClr val="lt1">
+        <a:alpha val="90000"/>
+      </a:schemeClr>
+    </dgm:fillClrLst>
+    <dgm:linClrLst meth="repeat">
+      <a:schemeClr val="accent1"/>
+    </dgm:linClrLst>
+    <dgm:effectClrLst/>
+    <dgm:txLinClrLst/>
+    <dgm:txFillClrLst meth="repeat">
+      <a:schemeClr val="dk1"/>
+    </dgm:txFillClrLst>
+    <dgm:txEffectClrLst/>
+  </dgm:styleLbl>
+  <dgm:styleLbl name="alignAcc1">
+    <dgm:fillClrLst meth="repeat">
+      <a:schemeClr val="lt1">
+        <a:alpha val="90000"/>
+      </a:schemeClr>
+    </dgm:fillClrLst>
+    <dgm:linClrLst meth="repeat">
+      <a:schemeClr val="accent1"/>
+    </dgm:linClrLst>
+    <dgm:effectClrLst/>
+    <dgm:txLinClrLst/>
+    <dgm:txFillClrLst meth="repeat">
+      <a:schemeClr val="dk1"/>
+    </dgm:txFillClrLst>
+    <dgm:txEffectClrLst/>
+  </dgm:styleLbl>
+  <dgm:styleLbl name="trAlignAcc1">
+    <dgm:fillClrLst meth="repeat">
+      <a:schemeClr val="lt1">
+        <a:alpha val="40000"/>
+      </a:schemeClr>
+    </dgm:fillClrLst>
+    <dgm:linClrLst meth="repeat">
+      <a:schemeClr val="accent1"/>
+    </dgm:linClrLst>
+    <dgm:effectClrLst/>
+    <dgm:txLinClrLst/>
+    <dgm:txFillClrLst meth="repeat">
+      <a:schemeClr val="dk1"/>
+    </dgm:txFillClrLst>
+    <dgm:txEffectClrLst/>
+  </dgm:styleLbl>
+  <dgm:styleLbl name="bgAcc1">
+    <dgm:fillClrLst meth="repeat">
+      <a:schemeClr val="lt1">
+        <a:alpha val="90000"/>
+      </a:schemeClr>
+    </dgm:fillClrLst>
+    <dgm:linClrLst meth="repeat">
+      <a:schemeClr val="accent1"/>
+    </dgm:linClrLst>
+    <dgm:effectClrLst/>
+    <dgm:txLinClrLst/>
+    <dgm:txFillClrLst meth="repeat">
+      <a:schemeClr val="dk1"/>
+    </dgm:txFillClrLst>
+    <dgm:txEffectClrLst/>
+  </dgm:styleLbl>
+  <dgm:styleLbl name="solidFgAcc1">
+    <dgm:fillClrLst meth="repeat">
+      <a:schemeClr val="lt1"/>
+    </dgm:fillClrLst>
+    <dgm:linClrLst meth="repeat">
+      <a:schemeClr val="accent1"/>
+    </dgm:linClrLst>
+    <dgm:effectClrLst/>
+    <dgm:txLinClrLst/>
+    <dgm:txFillClrLst meth="repeat">
+      <a:schemeClr val="dk1"/>
+    </dgm:txFillClrLst>
+    <dgm:txEffectClrLst/>
+  </dgm:styleLbl>
+  <dgm:styleLbl name="solidAlignAcc1">
+    <dgm:fillClrLst meth="repeat">
+      <a:schemeClr val="lt1"/>
+    </dgm:fillClrLst>
+    <dgm:linClrLst meth="repeat">
+      <a:schemeClr val="accent1"/>
+    </dgm:linClrLst>
+    <dgm:effectClrLst/>
+    <dgm:txLinClrLst/>
+    <dgm:txFillClrLst meth="repeat">
+      <a:schemeClr val="dk1"/>
+    </dgm:txFillClrLst>
+    <dgm:txEffectClrLst/>
+  </dgm:styleLbl>
+  <dgm:styleLbl name="solidBgAcc1">
+    <dgm:fillClrLst meth="repeat">
+      <a:schemeClr val="lt1"/>
+    </dgm:fillClrLst>
+    <dgm:linClrLst meth="repeat">
+      <a:schemeClr val="accent1"/>
+    </dgm:linClrLst>
+    <dgm:effectClrLst/>
+    <dgm:txLinClrLst/>
+    <dgm:txFillClrLst meth="repeat">
+      <a:schemeClr val="dk1"/>
+    </dgm:txFillClrLst>
+    <dgm:txEffectClrLst/>
+  </dgm:styleLbl>
+  <dgm:styleLbl name="fgAccFollowNode1">
+    <dgm:fillClrLst meth="repeat">
+      <a:schemeClr val="accent1">
+        <a:alpha val="90000"/>
+        <a:tint val="40000"/>
+      </a:schemeClr>
+    </dgm:fillClrLst>
+    <dgm:linClrLst meth="repeat">
+      <a:schemeClr val="accent1">
+        <a:alpha val="90000"/>
+        <a:tint val="40000"/>
+      </a:schemeClr>
+    </dgm:linClrLst>
+    <dgm:effectClrLst/>
+    <dgm:txLinClrLst/>
+    <dgm:txFillClrLst meth="repeat">
+      <a:schemeClr val="dk1"/>
+    </dgm:txFillClrLst>
+    <dgm:txEffectClrLst/>
+  </dgm:styleLbl>
+  <dgm:styleLbl name="alignAccFollowNode1">
+    <dgm:fillClrLst meth="repeat">
+      <a:schemeClr val="accent1">
+        <a:alpha val="90000"/>
+        <a:tint val="40000"/>
+      </a:schemeClr>
+    </dgm:fillClrLst>
+    <dgm:linClrLst meth="repeat">
+      <a:schemeClr val="accent1">
+        <a:alpha val="90000"/>
+        <a:tint val="40000"/>
+      </a:schemeClr>
+    </dgm:linClrLst>
+    <dgm:effectClrLst/>
+    <dgm:txLinClrLst/>
+    <dgm:txFillClrLst meth="repeat">
+      <a:schemeClr val="dk1"/>
+    </dgm:txFillClrLst>
+    <dgm:txEffectClrLst/>
+  </dgm:styleLbl>
+  <dgm:styleLbl name="bgAccFollowNode1">
+    <dgm:fillClrLst meth="repeat">
+      <a:schemeClr val="accent1">
+        <a:alpha val="90000"/>
+        <a:tint val="40000"/>
+      </a:schemeClr>
+    </dgm:fillClrLst>
+    <dgm:linClrLst meth="repeat">
+      <a:schemeClr val="accent1">
+        <a:alpha val="90000"/>
+        <a:tint val="40000"/>
+      </a:schemeClr>
+    </dgm:linClrLst>
+    <dgm:effectClrLst/>
+    <dgm:txLinClrLst/>
+    <dgm:txFillClrLst meth="repeat">
+      <a:schemeClr val="dk1"/>
+    </dgm:txFillClrLst>
+    <dgm:txEffectClrLst/>
+  </dgm:styleLbl>
+  <dgm:styleLbl name="fgAcc0">
+    <dgm:fillClrLst meth="repeat">
+      <a:schemeClr val="lt1">
+        <a:alpha val="90000"/>
+      </a:schemeClr>
+    </dgm:fillClrLst>
+    <dgm:linClrLst meth="repeat">
+      <a:schemeClr val="accent1"/>
+    </dgm:linClrLst>
+    <dgm:effectClrLst/>
+    <dgm:txLinClrLst/>
+    <dgm:txFillClrLst meth="repeat">
+      <a:schemeClr val="dk1"/>
+    </dgm:txFillClrLst>
+    <dgm:txEffectClrLst/>
+  </dgm:styleLbl>
+  <dgm:styleLbl name="fgAcc2">
+    <dgm:fillClrLst meth="repeat">
+      <a:schemeClr val="lt1">
+        <a:alpha val="90000"/>
+      </a:schemeClr>
+    </dgm:fillClrLst>
+    <dgm:linClrLst meth="repeat">
+      <a:schemeClr val="accent1"/>
+    </dgm:linClrLst>
+    <dgm:effectClrLst/>
+    <dgm:txLinClrLst/>
+    <dgm:txFillClrLst meth="repeat">
+      <a:schemeClr val="dk1"/>
+    </dgm:txFillClrLst>
+    <dgm:txEffectClrLst/>
+  </dgm:styleLbl>
+  <dgm:styleLbl name="fgAcc3">
+    <dgm:fillClrLst meth="repeat">
+      <a:schemeClr val="lt1">
+        <a:alpha val="90000"/>
+      </a:schemeClr>
+    </dgm:fillClrLst>
+    <dgm:linClrLst meth="repeat">
+      <a:schemeClr val="accent1"/>
+    </dgm:linClrLst>
+    <dgm:effectClrLst/>
+    <dgm:txLinClrLst/>
+    <dgm:txFillClrLst meth="repeat">
+      <a:schemeClr val="dk1"/>
+    </dgm:txFillClrLst>
+    <dgm:txEffectClrLst/>
+  </dgm:styleLbl>
+  <dgm:styleLbl name="fgAcc4">
+    <dgm:fillClrLst meth="repeat">
+      <a:schemeClr val="lt1">
+        <a:alpha val="90000"/>
+      </a:schemeClr>
+    </dgm:fillClrLst>
+    <dgm:linClrLst meth="repeat">
+      <a:schemeClr val="accent1"/>
+    </dgm:linClrLst>
+    <dgm:effectClrLst/>
+    <dgm:txLinClrLst/>
+    <dgm:txFillClrLst meth="repeat">
+      <a:schemeClr val="dk1"/>
+    </dgm:txFillClrLst>
+    <dgm:txEffectClrLst/>
+  </dgm:styleLbl>
+  <dgm:styleLbl name="bgShp">
+    <dgm:fillClrLst meth="repeat">
+      <a:schemeClr val="accent1">
+        <a:tint val="40000"/>
+      </a:schemeClr>
+    </dgm:fillClrLst>
+    <dgm:linClrLst meth="repeat">
+      <a:schemeClr val="accent1"/>
+    </dgm:linClrLst>
+    <dgm:effectClrLst/>
+    <dgm:txLinClrLst/>
+    <dgm:txFillClrLst meth="repeat">
+      <a:schemeClr val="dk1"/>
+    </dgm:txFillClrLst>
+    <dgm:txEffectClrLst/>
+  </dgm:styleLbl>
+  <dgm:styleLbl name="dkBgShp">
+    <dgm:fillClrLst meth="repeat">
+      <a:schemeClr val="accent1">
+        <a:shade val="80000"/>
+      </a:schemeClr>
+    </dgm:fillClrLst>
+    <dgm:linClrLst meth="repeat">
+      <a:schemeClr val="accent1"/>
+    </dgm:linClrLst>
+    <dgm:effectClrLst/>
+    <dgm:txLinClrLst/>
+    <dgm:txFillClrLst meth="repeat">
+      <a:schemeClr val="lt1"/>
+    </dgm:txFillClrLst>
+    <dgm:txEffectClrLst/>
+  </dgm:styleLbl>
+  <dgm:styleLbl name="trBgShp">
+    <dgm:fillClrLst meth="repeat">
+      <a:schemeClr val="accent1">
+        <a:tint val="50000"/>
+        <a:alpha val="40000"/>
+      </a:schemeClr>
+    </dgm:fillClrLst>
+    <dgm:linClrLst meth="repeat">
+      <a:schemeClr val="accent1"/>
+    </dgm:linClrLst>
+    <dgm:effectClrLst/>
+    <dgm:txLinClrLst/>
+    <dgm:txFillClrLst meth="repeat">
+      <a:schemeClr val="lt1"/>
+    </dgm:txFillClrLst>
+    <dgm:txEffectClrLst/>
+  </dgm:styleLbl>
+  <dgm:styleLbl name="fgShp">
+    <dgm:fillClrLst meth="repeat">
+      <a:schemeClr val="accent1">
+        <a:tint val="60000"/>
+      </a:schemeClr>
+    </dgm:fillClrLst>
+    <dgm:linClrLst meth="repeat">
+      <a:schemeClr val="lt1"/>
+    </dgm:linClrLst>
+    <dgm:effectClrLst/>
+    <dgm:txLinClrLst/>
+    <dgm:txFillClrLst meth="repeat">
+      <a:schemeClr val="dk1"/>
+    </dgm:txFillClrLst>
+    <dgm:txEffectClrLst/>
+  </dgm:styleLbl>
+  <dgm:styleLbl name="revTx">
+    <dgm:fillClrLst meth="repeat">
+      <a:schemeClr val="lt1">
+        <a:alpha val="0"/>
+      </a:schemeClr>
+    </dgm:fillClrLst>
+    <dgm:linClrLst meth="repeat">
+      <a:schemeClr val="dk1">
+        <a:alpha val="0"/>
+      </a:schemeClr>
+    </dgm:linClrLst>
+    <dgm:effectClrLst/>
+    <dgm:txLinClrLst/>
+    <dgm:txFillClrLst meth="repeat">
+      <a:schemeClr val="tx1"/>
+    </dgm:txFillClrLst>
+    <dgm:txEffectClrLst/>
+  </dgm:styleLbl>
+</dgm:colorsDef>
+</file>
+
+<file path=ppt/diagrams/colors2.xml><?xml version="1.0" encoding="utf-8"?>
 <dgm:colorsDef xmlns:dgm="http://schemas.openxmlformats.org/drawingml/2006/diagram" xmlns:a="http://schemas.openxmlformats.org/drawingml/2006/main" uniqueId="urn:microsoft.com/office/officeart/2005/8/colors/accent1_2">
   <dgm:title val=""/>
   <dgm:desc val=""/>
@@ -1058,15 +1806,7 @@
                 <a:schemeClr val="tx1"/>
               </a:solidFill>
             </a:rPr>
-            <a:t>Source code, header files, documentation, </a:t>
-          </a:r>
-          <a:r>
-            <a:rPr lang="en-US" dirty="0" smtClean="0">
-              <a:solidFill>
-                <a:schemeClr val="tx1"/>
-              </a:solidFill>
-            </a:rPr>
-            <a:t>etc.</a:t>
+            <a:t>Source code, header files, documentation, etc.</a:t>
           </a:r>
           <a:endParaRPr lang="en-US" dirty="0"/>
         </a:p>
@@ -1332,23 +2072,23 @@
     </dgm:pt>
   </dgm:ptLst>
   <dgm:cxnLst>
+    <dgm:cxn modelId="{F434006E-2FF4-499C-8254-782364BC69FA}" srcId="{19D99FA6-8D29-484F-8F9E-963934186247}" destId="{6A13DA54-29D6-40EF-8DE3-1192761460DB}" srcOrd="3" destOrd="0" parTransId="{4E6631B7-5C83-43A7-BB6E-B056D87E9A6D}" sibTransId="{D98797D1-8FEF-4C97-9DB1-DFCD90C2F535}"/>
+    <dgm:cxn modelId="{50CCD34F-D890-4E5A-9884-0B19D707AE0A}" srcId="{97D18895-AFB3-45B7-928B-B6522EBAFD97}" destId="{CA81B55A-4B86-4E8A-8321-7CF01B1EFEB9}" srcOrd="0" destOrd="0" parTransId="{FC334487-FE6F-44CB-9059-C592F9F91A84}" sibTransId="{81E104B4-BB71-4F05-915C-84B6059C936A}"/>
+    <dgm:cxn modelId="{43ADDEFC-4A84-499B-A7FF-465936FD6B89}" srcId="{C2DC6BCB-58EF-40EC-8D94-2BECCEF22457}" destId="{02F0EBE7-A51E-4585-878C-6905FD954334}" srcOrd="0" destOrd="0" parTransId="{9CF97DA2-E710-4010-9C21-AB2F89EB88CE}" sibTransId="{F6290414-5A73-46B7-8D10-0A701FA93632}"/>
+    <dgm:cxn modelId="{E7D48016-125B-435B-9D9C-F0CDCDC638AD}" type="presOf" srcId="{FB728F9B-DAED-4152-A191-2EAFD3CE6201}" destId="{1A29F33B-5654-4790-8C4C-D8330C5003CD}" srcOrd="0" destOrd="1" presId="urn:microsoft.com/office/officeart/2005/8/layout/hProcess9"/>
+    <dgm:cxn modelId="{131A62AF-19AA-4D3A-9B44-5F3DE03F1503}" srcId="{19D99FA6-8D29-484F-8F9E-963934186247}" destId="{C2DC6BCB-58EF-40EC-8D94-2BECCEF22457}" srcOrd="2" destOrd="0" parTransId="{FF3E2932-32AF-4862-823A-055C615ABADD}" sibTransId="{FD7C0BB5-A77E-4359-9626-23BE3A1D1823}"/>
+    <dgm:cxn modelId="{917DF737-3C04-4D06-954F-B221E0AD27BB}" srcId="{6A13DA54-29D6-40EF-8DE3-1192761460DB}" destId="{FB728F9B-DAED-4152-A191-2EAFD3CE6201}" srcOrd="0" destOrd="0" parTransId="{B6BE5A03-FCAD-43FD-A5EC-D18BAE195D42}" sibTransId="{61D18ADC-5A55-483C-9960-27831A897C9D}"/>
+    <dgm:cxn modelId="{71EEA935-3B36-4151-8D9D-343A517E66F6}" type="presOf" srcId="{97D18895-AFB3-45B7-928B-B6522EBAFD97}" destId="{A8886D96-0572-43B9-A738-7AF22DEAF85D}" srcOrd="0" destOrd="0" presId="urn:microsoft.com/office/officeart/2005/8/layout/hProcess9"/>
     <dgm:cxn modelId="{B6B27B43-1222-4658-8435-CEBD78548228}" srcId="{9F68795F-2190-433E-8335-581472B9F264}" destId="{10BD4C43-335F-4F26-8509-AE0A3104735E}" srcOrd="0" destOrd="0" parTransId="{05D19A37-D7C2-4758-B963-62838C8E69ED}" sibTransId="{D15F90E9-7F3C-4F53-9FD6-3873FD74BCD3}"/>
-    <dgm:cxn modelId="{131A62AF-19AA-4D3A-9B44-5F3DE03F1503}" srcId="{19D99FA6-8D29-484F-8F9E-963934186247}" destId="{C2DC6BCB-58EF-40EC-8D94-2BECCEF22457}" srcOrd="2" destOrd="0" parTransId="{FF3E2932-32AF-4862-823A-055C615ABADD}" sibTransId="{FD7C0BB5-A77E-4359-9626-23BE3A1D1823}"/>
-    <dgm:cxn modelId="{50CCD34F-D890-4E5A-9884-0B19D707AE0A}" srcId="{97D18895-AFB3-45B7-928B-B6522EBAFD97}" destId="{CA81B55A-4B86-4E8A-8321-7CF01B1EFEB9}" srcOrd="0" destOrd="0" parTransId="{FC334487-FE6F-44CB-9059-C592F9F91A84}" sibTransId="{81E104B4-BB71-4F05-915C-84B6059C936A}"/>
+    <dgm:cxn modelId="{7E721132-4C81-41CC-BC5D-5CFE4FC20C06}" type="presOf" srcId="{02F0EBE7-A51E-4585-878C-6905FD954334}" destId="{87DD2403-CC57-4BE7-806A-5E2FD598AFF9}" srcOrd="0" destOrd="1" presId="urn:microsoft.com/office/officeart/2005/8/layout/hProcess9"/>
+    <dgm:cxn modelId="{5F1EAF4A-3E59-491B-BF52-596E4A57A798}" type="presOf" srcId="{9F68795F-2190-433E-8335-581472B9F264}" destId="{C90621DF-EC09-4CCA-9B44-CE15A2C8E155}" srcOrd="0" destOrd="0" presId="urn:microsoft.com/office/officeart/2005/8/layout/hProcess9"/>
+    <dgm:cxn modelId="{E21D6374-196C-413A-8E2D-E9E329F3E79B}" type="presOf" srcId="{10BD4C43-335F-4F26-8509-AE0A3104735E}" destId="{C90621DF-EC09-4CCA-9B44-CE15A2C8E155}" srcOrd="0" destOrd="1" presId="urn:microsoft.com/office/officeart/2005/8/layout/hProcess9"/>
     <dgm:cxn modelId="{263F98B0-058B-4283-B0B3-C52ED0AA1EF5}" srcId="{19D99FA6-8D29-484F-8F9E-963934186247}" destId="{9F68795F-2190-433E-8335-581472B9F264}" srcOrd="0" destOrd="0" parTransId="{9E76810B-A53F-4FA5-9026-8CD7831B1E5D}" sibTransId="{409C664D-37F9-4CA4-91BB-9620185DD979}"/>
-    <dgm:cxn modelId="{E21D6374-196C-413A-8E2D-E9E329F3E79B}" type="presOf" srcId="{10BD4C43-335F-4F26-8509-AE0A3104735E}" destId="{C90621DF-EC09-4CCA-9B44-CE15A2C8E155}" srcOrd="0" destOrd="1" presId="urn:microsoft.com/office/officeart/2005/8/layout/hProcess9"/>
-    <dgm:cxn modelId="{7E721132-4C81-41CC-BC5D-5CFE4FC20C06}" type="presOf" srcId="{02F0EBE7-A51E-4585-878C-6905FD954334}" destId="{87DD2403-CC57-4BE7-806A-5E2FD598AFF9}" srcOrd="0" destOrd="1" presId="urn:microsoft.com/office/officeart/2005/8/layout/hProcess9"/>
+    <dgm:cxn modelId="{9471EAF6-0286-4E4A-93F7-FCC70DE09A66}" type="presOf" srcId="{6A13DA54-29D6-40EF-8DE3-1192761460DB}" destId="{1A29F33B-5654-4790-8C4C-D8330C5003CD}" srcOrd="0" destOrd="0" presId="urn:microsoft.com/office/officeart/2005/8/layout/hProcess9"/>
     <dgm:cxn modelId="{69229F1B-3FF6-4DA3-8F9E-44676C375EC9}" srcId="{19D99FA6-8D29-484F-8F9E-963934186247}" destId="{97D18895-AFB3-45B7-928B-B6522EBAFD97}" srcOrd="1" destOrd="0" parTransId="{672CF2CE-2B2C-4D38-A526-8579FD388DD2}" sibTransId="{C2C8F478-2489-4626-94E5-096A8AF13A1D}"/>
-    <dgm:cxn modelId="{E7D48016-125B-435B-9D9C-F0CDCDC638AD}" type="presOf" srcId="{FB728F9B-DAED-4152-A191-2EAFD3CE6201}" destId="{1A29F33B-5654-4790-8C4C-D8330C5003CD}" srcOrd="0" destOrd="1" presId="urn:microsoft.com/office/officeart/2005/8/layout/hProcess9"/>
     <dgm:cxn modelId="{67E3C733-0666-40F6-B819-A74B69DD09E1}" type="presOf" srcId="{C2DC6BCB-58EF-40EC-8D94-2BECCEF22457}" destId="{87DD2403-CC57-4BE7-806A-5E2FD598AFF9}" srcOrd="0" destOrd="0" presId="urn:microsoft.com/office/officeart/2005/8/layout/hProcess9"/>
-    <dgm:cxn modelId="{F434006E-2FF4-499C-8254-782364BC69FA}" srcId="{19D99FA6-8D29-484F-8F9E-963934186247}" destId="{6A13DA54-29D6-40EF-8DE3-1192761460DB}" srcOrd="3" destOrd="0" parTransId="{4E6631B7-5C83-43A7-BB6E-B056D87E9A6D}" sibTransId="{D98797D1-8FEF-4C97-9DB1-DFCD90C2F535}"/>
     <dgm:cxn modelId="{D5AD1412-FB4A-4BA0-8502-4C0BD5FF8F5B}" type="presOf" srcId="{19D99FA6-8D29-484F-8F9E-963934186247}" destId="{3177BB53-307F-46E6-8C42-D565EF669EAF}" srcOrd="0" destOrd="0" presId="urn:microsoft.com/office/officeart/2005/8/layout/hProcess9"/>
     <dgm:cxn modelId="{2220A4A9-4C2F-4B00-BC95-860DC8552F96}" type="presOf" srcId="{CA81B55A-4B86-4E8A-8321-7CF01B1EFEB9}" destId="{A8886D96-0572-43B9-A738-7AF22DEAF85D}" srcOrd="0" destOrd="1" presId="urn:microsoft.com/office/officeart/2005/8/layout/hProcess9"/>
-    <dgm:cxn modelId="{917DF737-3C04-4D06-954F-B221E0AD27BB}" srcId="{6A13DA54-29D6-40EF-8DE3-1192761460DB}" destId="{FB728F9B-DAED-4152-A191-2EAFD3CE6201}" srcOrd="0" destOrd="0" parTransId="{B6BE5A03-FCAD-43FD-A5EC-D18BAE195D42}" sibTransId="{61D18ADC-5A55-483C-9960-27831A897C9D}"/>
-    <dgm:cxn modelId="{71EEA935-3B36-4151-8D9D-343A517E66F6}" type="presOf" srcId="{97D18895-AFB3-45B7-928B-B6522EBAFD97}" destId="{A8886D96-0572-43B9-A738-7AF22DEAF85D}" srcOrd="0" destOrd="0" presId="urn:microsoft.com/office/officeart/2005/8/layout/hProcess9"/>
-    <dgm:cxn modelId="{5F1EAF4A-3E59-491B-BF52-596E4A57A798}" type="presOf" srcId="{9F68795F-2190-433E-8335-581472B9F264}" destId="{C90621DF-EC09-4CCA-9B44-CE15A2C8E155}" srcOrd="0" destOrd="0" presId="urn:microsoft.com/office/officeart/2005/8/layout/hProcess9"/>
-    <dgm:cxn modelId="{43ADDEFC-4A84-499B-A7FF-465936FD6B89}" srcId="{C2DC6BCB-58EF-40EC-8D94-2BECCEF22457}" destId="{02F0EBE7-A51E-4585-878C-6905FD954334}" srcOrd="0" destOrd="0" parTransId="{9CF97DA2-E710-4010-9C21-AB2F89EB88CE}" sibTransId="{F6290414-5A73-46B7-8D10-0A701FA93632}"/>
-    <dgm:cxn modelId="{9471EAF6-0286-4E4A-93F7-FCC70DE09A66}" type="presOf" srcId="{6A13DA54-29D6-40EF-8DE3-1192761460DB}" destId="{1A29F33B-5654-4790-8C4C-D8330C5003CD}" srcOrd="0" destOrd="0" presId="urn:microsoft.com/office/officeart/2005/8/layout/hProcess9"/>
     <dgm:cxn modelId="{7C2C805B-754D-4ACF-B1B4-7A95A939C274}" type="presParOf" srcId="{3177BB53-307F-46E6-8C42-D565EF669EAF}" destId="{6DA11162-CE5A-41C5-B6A2-AA987F68E645}" srcOrd="0" destOrd="0" presId="urn:microsoft.com/office/officeart/2005/8/layout/hProcess9"/>
     <dgm:cxn modelId="{F8BF48C0-1C47-480E-9BFE-44D0620CDA9D}" type="presParOf" srcId="{3177BB53-307F-46E6-8C42-D565EF669EAF}" destId="{9F6F832C-ED24-4392-A1F7-DFA523B2391B}" srcOrd="1" destOrd="0" presId="urn:microsoft.com/office/officeart/2005/8/layout/hProcess9"/>
     <dgm:cxn modelId="{E7D809D7-8062-4775-B3EE-69BE56113CF5}" type="presParOf" srcId="{9F6F832C-ED24-4392-A1F7-DFA523B2391B}" destId="{C90621DF-EC09-4CCA-9B44-CE15A2C8E155}" srcOrd="0" destOrd="0" presId="urn:microsoft.com/office/officeart/2005/8/layout/hProcess9"/>
@@ -1358,6 +2098,948 @@
     <dgm:cxn modelId="{18C6DC63-8BFA-4569-8B4C-2BEB56EF2818}" type="presParOf" srcId="{9F6F832C-ED24-4392-A1F7-DFA523B2391B}" destId="{87DD2403-CC57-4BE7-806A-5E2FD598AFF9}" srcOrd="4" destOrd="0" presId="urn:microsoft.com/office/officeart/2005/8/layout/hProcess9"/>
     <dgm:cxn modelId="{07C1F067-8874-49C8-82DB-686D18042BF8}" type="presParOf" srcId="{9F6F832C-ED24-4392-A1F7-DFA523B2391B}" destId="{B874A810-EDCF-44A2-B764-96315F391824}" srcOrd="5" destOrd="0" presId="urn:microsoft.com/office/officeart/2005/8/layout/hProcess9"/>
     <dgm:cxn modelId="{0B3D62C5-F594-497C-B4C3-1B6EFD8ED0C7}" type="presParOf" srcId="{9F6F832C-ED24-4392-A1F7-DFA523B2391B}" destId="{1A29F33B-5654-4790-8C4C-D8330C5003CD}" srcOrd="6" destOrd="0" presId="urn:microsoft.com/office/officeart/2005/8/layout/hProcess9"/>
+  </dgm:cxnLst>
+  <dgm:bg/>
+  <dgm:whole/>
+  <dgm:extLst>
+    <a:ext uri="http://schemas.microsoft.com/office/drawing/2008/diagram">
+      <dsp:dataModelExt xmlns:dsp="http://schemas.microsoft.com/office/drawing/2008/diagram" relId="rId6" minVer="http://schemas.openxmlformats.org/drawingml/2006/diagram"/>
+    </a:ext>
+  </dgm:extLst>
+</dgm:dataModel>
+</file>
+
+<file path=ppt/diagrams/data2.xml><?xml version="1.0" encoding="utf-8"?>
+<dgm:dataModel xmlns:dgm="http://schemas.openxmlformats.org/drawingml/2006/diagram" xmlns:a="http://schemas.openxmlformats.org/drawingml/2006/main">
+  <dgm:ptLst>
+    <dgm:pt modelId="{C0AFDC70-32E0-4B9F-932E-27382B633E08}" type="doc">
+      <dgm:prSet loTypeId="urn:microsoft.com/office/officeart/2005/8/layout/chevron2" loCatId="process" qsTypeId="urn:microsoft.com/office/officeart/2005/8/quickstyle/simple1" qsCatId="simple" csTypeId="urn:microsoft.com/office/officeart/2005/8/colors/accent1_2" csCatId="accent1" phldr="1"/>
+      <dgm:spPr/>
+      <dgm:t>
+        <a:bodyPr/>
+        <a:lstStyle/>
+        <a:p>
+          <a:endParaRPr lang="en-US"/>
+        </a:p>
+      </dgm:t>
+    </dgm:pt>
+    <dgm:pt modelId="{D651B15E-07DF-42FC-9782-10247930488F}">
+      <dgm:prSet phldrT="[Text]"/>
+      <dgm:spPr>
+        <a:solidFill>
+          <a:srgbClr val="00A960"/>
+        </a:solidFill>
+        <a:ln>
+          <a:solidFill>
+            <a:srgbClr val="00A960"/>
+          </a:solidFill>
+        </a:ln>
+      </dgm:spPr>
+      <dgm:t>
+        <a:bodyPr/>
+        <a:lstStyle/>
+        <a:p>
+          <a:r>
+            <a:rPr lang="en-US" dirty="0" smtClean="0"/>
+            <a:t>CORE</a:t>
+          </a:r>
+          <a:endParaRPr lang="en-US" dirty="0"/>
+        </a:p>
+      </dgm:t>
+    </dgm:pt>
+    <dgm:pt modelId="{6DEB5D5C-BE96-43C5-AB17-F999072D6C1A}" type="parTrans" cxnId="{F6AE1862-A2BF-4021-AA22-D38C66185759}">
+      <dgm:prSet/>
+      <dgm:spPr/>
+      <dgm:t>
+        <a:bodyPr/>
+        <a:lstStyle/>
+        <a:p>
+          <a:endParaRPr lang="en-US"/>
+        </a:p>
+      </dgm:t>
+    </dgm:pt>
+    <dgm:pt modelId="{4AF67BC8-A56D-4026-9461-D8FCF954C3E7}" type="sibTrans" cxnId="{F6AE1862-A2BF-4021-AA22-D38C66185759}">
+      <dgm:prSet/>
+      <dgm:spPr/>
+      <dgm:t>
+        <a:bodyPr/>
+        <a:lstStyle/>
+        <a:p>
+          <a:endParaRPr lang="en-US"/>
+        </a:p>
+      </dgm:t>
+    </dgm:pt>
+    <dgm:pt modelId="{B69B01B5-3268-4099-A8E3-4A4F3FB1D043}">
+      <dgm:prSet phldrT="[Text]"/>
+      <dgm:spPr>
+        <a:ln>
+          <a:solidFill>
+            <a:srgbClr val="00A960"/>
+          </a:solidFill>
+        </a:ln>
+      </dgm:spPr>
+      <dgm:t>
+        <a:bodyPr/>
+        <a:lstStyle/>
+        <a:p>
+          <a:r>
+            <a:rPr lang="en-US" dirty="0" smtClean="0"/>
+            <a:t>Create startup_&lt;device&gt;.s with reset handler and exception/interrupt vectors</a:t>
+          </a:r>
+          <a:endParaRPr lang="en-US" dirty="0"/>
+        </a:p>
+      </dgm:t>
+    </dgm:pt>
+    <dgm:pt modelId="{F6675C08-3040-46F4-824D-D746F191516C}" type="parTrans" cxnId="{34E794F6-997A-4961-AE06-5DC765D71CDC}">
+      <dgm:prSet/>
+      <dgm:spPr/>
+      <dgm:t>
+        <a:bodyPr/>
+        <a:lstStyle/>
+        <a:p>
+          <a:endParaRPr lang="en-US"/>
+        </a:p>
+      </dgm:t>
+    </dgm:pt>
+    <dgm:pt modelId="{AA09ADC0-9421-44F0-89E2-39EAECADA555}" type="sibTrans" cxnId="{34E794F6-997A-4961-AE06-5DC765D71CDC}">
+      <dgm:prSet/>
+      <dgm:spPr/>
+      <dgm:t>
+        <a:bodyPr/>
+        <a:lstStyle/>
+        <a:p>
+          <a:endParaRPr lang="en-US"/>
+        </a:p>
+      </dgm:t>
+    </dgm:pt>
+    <dgm:pt modelId="{8F439D51-B6B7-43F0-A14D-CBB8F59A87C3}">
+      <dgm:prSet phldrT="[Text]"/>
+      <dgm:spPr>
+        <a:solidFill>
+          <a:srgbClr val="D77B00"/>
+        </a:solidFill>
+        <a:ln>
+          <a:solidFill>
+            <a:srgbClr val="D77B00"/>
+          </a:solidFill>
+        </a:ln>
+      </dgm:spPr>
+      <dgm:t>
+        <a:bodyPr/>
+        <a:lstStyle/>
+        <a:p>
+          <a:r>
+            <a:rPr lang="en-US" dirty="0" smtClean="0"/>
+            <a:t>SVD</a:t>
+          </a:r>
+          <a:endParaRPr lang="en-US" dirty="0"/>
+        </a:p>
+      </dgm:t>
+    </dgm:pt>
+    <dgm:pt modelId="{FFA6ED4D-A19C-438C-9324-D8A0BECCEC98}" type="parTrans" cxnId="{8634C915-38CC-4F4C-A6DE-8DD167CBD581}">
+      <dgm:prSet/>
+      <dgm:spPr/>
+      <dgm:t>
+        <a:bodyPr/>
+        <a:lstStyle/>
+        <a:p>
+          <a:endParaRPr lang="en-US"/>
+        </a:p>
+      </dgm:t>
+    </dgm:pt>
+    <dgm:pt modelId="{72EF58BE-7C82-47E2-8B8A-796159977996}" type="sibTrans" cxnId="{8634C915-38CC-4F4C-A6DE-8DD167CBD581}">
+      <dgm:prSet/>
+      <dgm:spPr/>
+      <dgm:t>
+        <a:bodyPr/>
+        <a:lstStyle/>
+        <a:p>
+          <a:endParaRPr lang="en-US"/>
+        </a:p>
+      </dgm:t>
+    </dgm:pt>
+    <dgm:pt modelId="{88D7EFD8-C24E-4900-965C-615A00BF7A18}">
+      <dgm:prSet phldrT="[Text]"/>
+      <dgm:spPr>
+        <a:ln>
+          <a:solidFill>
+            <a:srgbClr val="D77B00"/>
+          </a:solidFill>
+        </a:ln>
+      </dgm:spPr>
+      <dgm:t>
+        <a:bodyPr/>
+        <a:lstStyle/>
+        <a:p>
+          <a:r>
+            <a:rPr lang="en-US" dirty="0" smtClean="0"/>
+            <a:t>Create System View Description (SVD) file</a:t>
+          </a:r>
+          <a:endParaRPr lang="en-US" dirty="0"/>
+        </a:p>
+      </dgm:t>
+    </dgm:pt>
+    <dgm:pt modelId="{04B59200-97A9-4893-8DD6-D674CEDEE23B}" type="parTrans" cxnId="{790F8E87-ED9C-4D49-A0EE-ED553D4D7024}">
+      <dgm:prSet/>
+      <dgm:spPr/>
+      <dgm:t>
+        <a:bodyPr/>
+        <a:lstStyle/>
+        <a:p>
+          <a:endParaRPr lang="en-US"/>
+        </a:p>
+      </dgm:t>
+    </dgm:pt>
+    <dgm:pt modelId="{71427AF1-D5CA-493C-BA3B-1CD68B805A4C}" type="sibTrans" cxnId="{790F8E87-ED9C-4D49-A0EE-ED553D4D7024}">
+      <dgm:prSet/>
+      <dgm:spPr/>
+      <dgm:t>
+        <a:bodyPr/>
+        <a:lstStyle/>
+        <a:p>
+          <a:endParaRPr lang="en-US"/>
+        </a:p>
+      </dgm:t>
+    </dgm:pt>
+    <dgm:pt modelId="{E90407A8-D19D-4B7E-B854-8A80F2D00F61}">
+      <dgm:prSet phldrT="[Text]"/>
+      <dgm:spPr>
+        <a:solidFill>
+          <a:srgbClr val="CF364A"/>
+        </a:solidFill>
+        <a:ln>
+          <a:solidFill>
+            <a:srgbClr val="CF364A"/>
+          </a:solidFill>
+        </a:ln>
+      </dgm:spPr>
+      <dgm:t>
+        <a:bodyPr/>
+        <a:lstStyle/>
+        <a:p>
+          <a:r>
+            <a:rPr lang="en-US" dirty="0" smtClean="0"/>
+            <a:t>Flash</a:t>
+          </a:r>
+          <a:endParaRPr lang="en-US" dirty="0"/>
+        </a:p>
+      </dgm:t>
+    </dgm:pt>
+    <dgm:pt modelId="{15C53900-64F2-4093-B4AF-9B88AEDF23D8}" type="parTrans" cxnId="{8B484A0C-A870-421E-B8DC-BB1BDBDBB51B}">
+      <dgm:prSet/>
+      <dgm:spPr/>
+      <dgm:t>
+        <a:bodyPr/>
+        <a:lstStyle/>
+        <a:p>
+          <a:endParaRPr lang="en-US"/>
+        </a:p>
+      </dgm:t>
+    </dgm:pt>
+    <dgm:pt modelId="{DA19E450-219D-4587-87C5-FEFCF6520AE5}" type="sibTrans" cxnId="{8B484A0C-A870-421E-B8DC-BB1BDBDBB51B}">
+      <dgm:prSet/>
+      <dgm:spPr/>
+      <dgm:t>
+        <a:bodyPr/>
+        <a:lstStyle/>
+        <a:p>
+          <a:endParaRPr lang="en-US"/>
+        </a:p>
+      </dgm:t>
+    </dgm:pt>
+    <dgm:pt modelId="{98DAF3B8-0A67-4327-ABCF-5B72E8401E90}">
+      <dgm:prSet phldrT="[Text]"/>
+      <dgm:spPr>
+        <a:ln>
+          <a:solidFill>
+            <a:srgbClr val="CF364A"/>
+          </a:solidFill>
+        </a:ln>
+      </dgm:spPr>
+      <dgm:t>
+        <a:bodyPr/>
+        <a:lstStyle/>
+        <a:p>
+          <a:r>
+            <a:rPr lang="en-US" dirty="0" smtClean="0"/>
+            <a:t>Use template project from </a:t>
+          </a:r>
+          <a:r>
+            <a:rPr lang="en-US" b="1" dirty="0" smtClean="0"/>
+            <a:t>ARM::CMSIS</a:t>
+          </a:r>
+          <a:r>
+            <a:rPr lang="en-US" dirty="0" smtClean="0"/>
+            <a:t> Pack to create Flash programming algorithm</a:t>
+          </a:r>
+          <a:endParaRPr lang="en-US" dirty="0"/>
+        </a:p>
+      </dgm:t>
+    </dgm:pt>
+    <dgm:pt modelId="{1E2DFB62-37C9-47B9-9511-402174624535}" type="parTrans" cxnId="{E71FECE7-7DC9-4CF6-BC4A-58FAB182D575}">
+      <dgm:prSet/>
+      <dgm:spPr/>
+      <dgm:t>
+        <a:bodyPr/>
+        <a:lstStyle/>
+        <a:p>
+          <a:endParaRPr lang="en-US"/>
+        </a:p>
+      </dgm:t>
+    </dgm:pt>
+    <dgm:pt modelId="{CF5413AE-D39A-494C-96B9-8ED6FA5A6D90}" type="sibTrans" cxnId="{E71FECE7-7DC9-4CF6-BC4A-58FAB182D575}">
+      <dgm:prSet/>
+      <dgm:spPr/>
+      <dgm:t>
+        <a:bodyPr/>
+        <a:lstStyle/>
+        <a:p>
+          <a:endParaRPr lang="en-US"/>
+        </a:p>
+      </dgm:t>
+    </dgm:pt>
+    <dgm:pt modelId="{BD3784C6-52B0-46FC-A306-5A31729ADD62}">
+      <dgm:prSet phldrT="[Text]"/>
+      <dgm:spPr>
+        <a:ln>
+          <a:solidFill>
+            <a:srgbClr val="00A960"/>
+          </a:solidFill>
+        </a:ln>
+      </dgm:spPr>
+      <dgm:t>
+        <a:bodyPr/>
+        <a:lstStyle/>
+        <a:p>
+          <a:r>
+            <a:rPr lang="en-US" dirty="0" smtClean="0"/>
+            <a:t>Create system_&lt;device&gt;.c/h files are used for system and clock configuration</a:t>
+          </a:r>
+          <a:endParaRPr lang="en-US" dirty="0"/>
+        </a:p>
+      </dgm:t>
+    </dgm:pt>
+    <dgm:pt modelId="{C1A104FD-94D9-4A50-AE0E-44296C702A91}" type="parTrans" cxnId="{882D978B-4393-4C00-9CC8-D2CB1096A732}">
+      <dgm:prSet/>
+      <dgm:spPr/>
+      <dgm:t>
+        <a:bodyPr/>
+        <a:lstStyle/>
+        <a:p>
+          <a:endParaRPr lang="en-US"/>
+        </a:p>
+      </dgm:t>
+    </dgm:pt>
+    <dgm:pt modelId="{56FCBF33-A8AF-449A-9980-68244F560569}" type="sibTrans" cxnId="{882D978B-4393-4C00-9CC8-D2CB1096A732}">
+      <dgm:prSet/>
+      <dgm:spPr/>
+      <dgm:t>
+        <a:bodyPr/>
+        <a:lstStyle/>
+        <a:p>
+          <a:endParaRPr lang="en-US"/>
+        </a:p>
+      </dgm:t>
+    </dgm:pt>
+    <dgm:pt modelId="{F360982B-F2E2-4E1C-97C7-4DD023CF475A}">
+      <dgm:prSet phldrT="[Text]"/>
+      <dgm:spPr>
+        <a:ln>
+          <a:solidFill>
+            <a:srgbClr val="D77B00"/>
+          </a:solidFill>
+        </a:ln>
+      </dgm:spPr>
+      <dgm:t>
+        <a:bodyPr/>
+        <a:lstStyle/>
+        <a:p>
+          <a:r>
+            <a:rPr lang="en-US" dirty="0" smtClean="0"/>
+            <a:t>Generate device header file and debug views using svdconv.exe</a:t>
+          </a:r>
+          <a:endParaRPr lang="en-US" dirty="0"/>
+        </a:p>
+      </dgm:t>
+    </dgm:pt>
+    <dgm:pt modelId="{4AC6B4D8-D4FA-4368-BD5D-D377DFBF8655}" type="parTrans" cxnId="{4495C053-D333-47E3-8957-3958E928B02A}">
+      <dgm:prSet/>
+      <dgm:spPr/>
+      <dgm:t>
+        <a:bodyPr/>
+        <a:lstStyle/>
+        <a:p>
+          <a:endParaRPr lang="en-US"/>
+        </a:p>
+      </dgm:t>
+    </dgm:pt>
+    <dgm:pt modelId="{5374B0DD-9F00-4486-88D6-26582C980520}" type="sibTrans" cxnId="{4495C053-D333-47E3-8957-3958E928B02A}">
+      <dgm:prSet/>
+      <dgm:spPr/>
+      <dgm:t>
+        <a:bodyPr/>
+        <a:lstStyle/>
+        <a:p>
+          <a:endParaRPr lang="en-US"/>
+        </a:p>
+      </dgm:t>
+    </dgm:pt>
+    <dgm:pt modelId="{354A7675-6CB2-48EB-A031-71267C4E7163}">
+      <dgm:prSet phldrT="[Text]"/>
+      <dgm:spPr/>
+      <dgm:t>
+        <a:bodyPr/>
+        <a:lstStyle/>
+        <a:p>
+          <a:r>
+            <a:rPr lang="en-US" dirty="0" smtClean="0"/>
+            <a:t>Pack</a:t>
+          </a:r>
+          <a:endParaRPr lang="en-US" dirty="0"/>
+        </a:p>
+      </dgm:t>
+    </dgm:pt>
+    <dgm:pt modelId="{AB4A92BE-79F2-4F9A-95F7-870769F2AD9B}" type="parTrans" cxnId="{579A652A-D964-463F-9AE8-EDEC4775AA53}">
+      <dgm:prSet/>
+      <dgm:spPr/>
+      <dgm:t>
+        <a:bodyPr/>
+        <a:lstStyle/>
+        <a:p>
+          <a:endParaRPr lang="en-US"/>
+        </a:p>
+      </dgm:t>
+    </dgm:pt>
+    <dgm:pt modelId="{C0EFA3C1-CFF3-4B10-AB83-126E5BBD1075}" type="sibTrans" cxnId="{579A652A-D964-463F-9AE8-EDEC4775AA53}">
+      <dgm:prSet/>
+      <dgm:spPr/>
+      <dgm:t>
+        <a:bodyPr/>
+        <a:lstStyle/>
+        <a:p>
+          <a:endParaRPr lang="en-US"/>
+        </a:p>
+      </dgm:t>
+    </dgm:pt>
+    <dgm:pt modelId="{662466BC-9981-43AE-9CCF-A9622E072E23}">
+      <dgm:prSet phldrT="[Text]"/>
+      <dgm:spPr/>
+      <dgm:t>
+        <a:bodyPr/>
+        <a:lstStyle/>
+        <a:p>
+          <a:r>
+            <a:rPr lang="en-US" dirty="0" smtClean="0"/>
+            <a:t>Create a basic Pack to be able to select device in a development tool</a:t>
+          </a:r>
+          <a:endParaRPr lang="en-US" dirty="0"/>
+        </a:p>
+      </dgm:t>
+    </dgm:pt>
+    <dgm:pt modelId="{D7650571-C21F-4FFA-933F-827F443B10E5}" type="parTrans" cxnId="{76E7BC09-BB9B-4208-8155-F8B914DFF601}">
+      <dgm:prSet/>
+      <dgm:spPr/>
+      <dgm:t>
+        <a:bodyPr/>
+        <a:lstStyle/>
+        <a:p>
+          <a:endParaRPr lang="en-US"/>
+        </a:p>
+      </dgm:t>
+    </dgm:pt>
+    <dgm:pt modelId="{61B0D713-6D48-4757-8F3D-65C1DA71CF60}" type="sibTrans" cxnId="{76E7BC09-BB9B-4208-8155-F8B914DFF601}">
+      <dgm:prSet/>
+      <dgm:spPr/>
+      <dgm:t>
+        <a:bodyPr/>
+        <a:lstStyle/>
+        <a:p>
+          <a:endParaRPr lang="en-US"/>
+        </a:p>
+      </dgm:t>
+    </dgm:pt>
+    <dgm:pt modelId="{C241F0C3-AB5E-48E3-94ED-47CAE99599AC}">
+      <dgm:prSet phldrT="[Text]"/>
+      <dgm:spPr>
+        <a:solidFill>
+          <a:srgbClr val="00C3DC"/>
+        </a:solidFill>
+        <a:ln>
+          <a:solidFill>
+            <a:srgbClr val="00C3DC"/>
+          </a:solidFill>
+        </a:ln>
+      </dgm:spPr>
+      <dgm:t>
+        <a:bodyPr/>
+        <a:lstStyle/>
+        <a:p>
+          <a:r>
+            <a:rPr lang="en-US" dirty="0" smtClean="0"/>
+            <a:t>Pack</a:t>
+          </a:r>
+          <a:endParaRPr lang="en-US" dirty="0"/>
+        </a:p>
+      </dgm:t>
+    </dgm:pt>
+    <dgm:pt modelId="{D47A52A8-1B28-444C-8A30-511F6ABD08BD}" type="parTrans" cxnId="{FFE88066-3E84-4EC5-A6DE-33B74D811AD6}">
+      <dgm:prSet/>
+      <dgm:spPr/>
+      <dgm:t>
+        <a:bodyPr/>
+        <a:lstStyle/>
+        <a:p>
+          <a:endParaRPr lang="en-US"/>
+        </a:p>
+      </dgm:t>
+    </dgm:pt>
+    <dgm:pt modelId="{7F8D2CB8-DA46-479E-86E2-4AFE58750954}" type="sibTrans" cxnId="{FFE88066-3E84-4EC5-A6DE-33B74D811AD6}">
+      <dgm:prSet/>
+      <dgm:spPr/>
+      <dgm:t>
+        <a:bodyPr/>
+        <a:lstStyle/>
+        <a:p>
+          <a:endParaRPr lang="en-US"/>
+        </a:p>
+      </dgm:t>
+    </dgm:pt>
+    <dgm:pt modelId="{E9AB0F46-5E8B-476F-81AA-C397F9EE2554}">
+      <dgm:prSet phldrT="[Text]"/>
+      <dgm:spPr>
+        <a:ln>
+          <a:solidFill>
+            <a:srgbClr val="00C3DC"/>
+          </a:solidFill>
+        </a:ln>
+      </dgm:spPr>
+      <dgm:t>
+        <a:bodyPr/>
+        <a:lstStyle/>
+        <a:p>
+          <a:r>
+            <a:rPr lang="en-US" dirty="0" smtClean="0"/>
+            <a:t>Finalize the DFP adding the generated files and documentation, as well as features</a:t>
+          </a:r>
+          <a:endParaRPr lang="en-US" dirty="0"/>
+        </a:p>
+      </dgm:t>
+    </dgm:pt>
+    <dgm:pt modelId="{9CCB7A11-21F8-479B-9283-8C63BBE9829A}" type="parTrans" cxnId="{7F904DB1-7315-49D1-87C9-01DF123A147E}">
+      <dgm:prSet/>
+      <dgm:spPr/>
+      <dgm:t>
+        <a:bodyPr/>
+        <a:lstStyle/>
+        <a:p>
+          <a:endParaRPr lang="en-US"/>
+        </a:p>
+      </dgm:t>
+    </dgm:pt>
+    <dgm:pt modelId="{F0006B29-AC1D-4B6E-96A3-1FD561F468A7}" type="sibTrans" cxnId="{7F904DB1-7315-49D1-87C9-01DF123A147E}">
+      <dgm:prSet/>
+      <dgm:spPr/>
+      <dgm:t>
+        <a:bodyPr/>
+        <a:lstStyle/>
+        <a:p>
+          <a:endParaRPr lang="en-US"/>
+        </a:p>
+      </dgm:t>
+    </dgm:pt>
+    <dgm:pt modelId="{0282634B-803E-473F-A3DB-94DCCFB53278}">
+      <dgm:prSet phldrT="[Text]"/>
+      <dgm:spPr>
+        <a:solidFill>
+          <a:srgbClr val="765F97"/>
+        </a:solidFill>
+        <a:ln>
+          <a:solidFill>
+            <a:srgbClr val="765F97"/>
+          </a:solidFill>
+        </a:ln>
+      </dgm:spPr>
+      <dgm:t>
+        <a:bodyPr/>
+        <a:lstStyle/>
+        <a:p>
+          <a:r>
+            <a:rPr lang="en-US" dirty="0" smtClean="0"/>
+            <a:t>Debug</a:t>
+          </a:r>
+          <a:endParaRPr lang="en-US" dirty="0"/>
+        </a:p>
+      </dgm:t>
+    </dgm:pt>
+    <dgm:pt modelId="{9CF309C0-A2DC-4281-A04C-C9636E9B8004}" type="parTrans" cxnId="{D2B987E1-8CEA-435E-8D28-577CF4C1845D}">
+      <dgm:prSet/>
+      <dgm:spPr/>
+      <dgm:t>
+        <a:bodyPr/>
+        <a:lstStyle/>
+        <a:p>
+          <a:endParaRPr lang="en-US"/>
+        </a:p>
+      </dgm:t>
+    </dgm:pt>
+    <dgm:pt modelId="{E6D8037E-EB17-475B-804B-A373CABD384B}" type="sibTrans" cxnId="{D2B987E1-8CEA-435E-8D28-577CF4C1845D}">
+      <dgm:prSet/>
+      <dgm:spPr/>
+      <dgm:t>
+        <a:bodyPr/>
+        <a:lstStyle/>
+        <a:p>
+          <a:endParaRPr lang="en-US"/>
+        </a:p>
+      </dgm:t>
+    </dgm:pt>
+    <dgm:pt modelId="{A899E859-3E80-48D1-A0B7-5A63B9EFC7E2}">
+      <dgm:prSet phldrT="[Text]"/>
+      <dgm:spPr>
+        <a:solidFill>
+          <a:schemeClr val="bg1"/>
+        </a:solidFill>
+        <a:ln>
+          <a:solidFill>
+            <a:srgbClr val="765F97"/>
+          </a:solidFill>
+        </a:ln>
+      </dgm:spPr>
+      <dgm:t>
+        <a:bodyPr/>
+        <a:lstStyle/>
+        <a:p>
+          <a:r>
+            <a:rPr lang="en-US" dirty="0" smtClean="0"/>
+            <a:t>Setup the CoreSight component for debug access using debug descriptions</a:t>
+          </a:r>
+          <a:endParaRPr lang="en-US" dirty="0"/>
+        </a:p>
+      </dgm:t>
+    </dgm:pt>
+    <dgm:pt modelId="{A556C426-B26C-4C9C-B0AC-4C5976E9914B}" type="parTrans" cxnId="{6AF6C067-51AF-4E89-8E8B-30DBBF812BC1}">
+      <dgm:prSet/>
+      <dgm:spPr/>
+      <dgm:t>
+        <a:bodyPr/>
+        <a:lstStyle/>
+        <a:p>
+          <a:endParaRPr lang="en-US"/>
+        </a:p>
+      </dgm:t>
+    </dgm:pt>
+    <dgm:pt modelId="{227AB353-6080-4B9A-9D58-476F3AB11C13}" type="sibTrans" cxnId="{6AF6C067-51AF-4E89-8E8B-30DBBF812BC1}">
+      <dgm:prSet/>
+      <dgm:spPr/>
+      <dgm:t>
+        <a:bodyPr/>
+        <a:lstStyle/>
+        <a:p>
+          <a:endParaRPr lang="en-US"/>
+        </a:p>
+      </dgm:t>
+    </dgm:pt>
+    <dgm:pt modelId="{2DEE4503-4407-4D17-A609-65FA9BC2BE43}" type="pres">
+      <dgm:prSet presAssocID="{C0AFDC70-32E0-4B9F-932E-27382B633E08}" presName="linearFlow" presStyleCnt="0">
+        <dgm:presLayoutVars>
+          <dgm:dir/>
+          <dgm:animLvl val="lvl"/>
+          <dgm:resizeHandles val="exact"/>
+        </dgm:presLayoutVars>
+      </dgm:prSet>
+      <dgm:spPr/>
+      <dgm:t>
+        <a:bodyPr/>
+        <a:lstStyle/>
+        <a:p>
+          <a:endParaRPr lang="en-US"/>
+        </a:p>
+      </dgm:t>
+    </dgm:pt>
+    <dgm:pt modelId="{FDAB2438-A0E0-4A0E-A602-7E1C76010C2D}" type="pres">
+      <dgm:prSet presAssocID="{354A7675-6CB2-48EB-A031-71267C4E7163}" presName="composite" presStyleCnt="0"/>
+      <dgm:spPr/>
+    </dgm:pt>
+    <dgm:pt modelId="{9DFE142A-7BDA-4E7E-8987-9508CDF088CA}" type="pres">
+      <dgm:prSet presAssocID="{354A7675-6CB2-48EB-A031-71267C4E7163}" presName="parentText" presStyleLbl="alignNode1" presStyleIdx="0" presStyleCnt="6">
+        <dgm:presLayoutVars>
+          <dgm:chMax val="1"/>
+          <dgm:bulletEnabled val="1"/>
+        </dgm:presLayoutVars>
+      </dgm:prSet>
+      <dgm:spPr/>
+      <dgm:t>
+        <a:bodyPr/>
+        <a:lstStyle/>
+        <a:p>
+          <a:endParaRPr lang="en-US"/>
+        </a:p>
+      </dgm:t>
+    </dgm:pt>
+    <dgm:pt modelId="{CB79293A-EEDC-43E4-B2F6-862AE9B8B2D3}" type="pres">
+      <dgm:prSet presAssocID="{354A7675-6CB2-48EB-A031-71267C4E7163}" presName="descendantText" presStyleLbl="alignAcc1" presStyleIdx="0" presStyleCnt="6">
+        <dgm:presLayoutVars>
+          <dgm:bulletEnabled val="1"/>
+        </dgm:presLayoutVars>
+      </dgm:prSet>
+      <dgm:spPr/>
+      <dgm:t>
+        <a:bodyPr/>
+        <a:lstStyle/>
+        <a:p>
+          <a:endParaRPr lang="en-US"/>
+        </a:p>
+      </dgm:t>
+    </dgm:pt>
+    <dgm:pt modelId="{11BA829E-B193-435E-B127-08AAD026EA09}" type="pres">
+      <dgm:prSet presAssocID="{C0EFA3C1-CFF3-4B10-AB83-126E5BBD1075}" presName="sp" presStyleCnt="0"/>
+      <dgm:spPr/>
+    </dgm:pt>
+    <dgm:pt modelId="{53CA02E4-5A4D-4FB9-B974-243500B8BAD9}" type="pres">
+      <dgm:prSet presAssocID="{D651B15E-07DF-42FC-9782-10247930488F}" presName="composite" presStyleCnt="0"/>
+      <dgm:spPr/>
+    </dgm:pt>
+    <dgm:pt modelId="{FCDEB0BF-1A15-4842-9292-3AA12B1B6889}" type="pres">
+      <dgm:prSet presAssocID="{D651B15E-07DF-42FC-9782-10247930488F}" presName="parentText" presStyleLbl="alignNode1" presStyleIdx="1" presStyleCnt="6">
+        <dgm:presLayoutVars>
+          <dgm:chMax val="1"/>
+          <dgm:bulletEnabled val="1"/>
+        </dgm:presLayoutVars>
+      </dgm:prSet>
+      <dgm:spPr/>
+      <dgm:t>
+        <a:bodyPr/>
+        <a:lstStyle/>
+        <a:p>
+          <a:endParaRPr lang="en-US"/>
+        </a:p>
+      </dgm:t>
+    </dgm:pt>
+    <dgm:pt modelId="{F3BDF937-815C-4C3D-8CEF-3192A27EA3DC}" type="pres">
+      <dgm:prSet presAssocID="{D651B15E-07DF-42FC-9782-10247930488F}" presName="descendantText" presStyleLbl="alignAcc1" presStyleIdx="1" presStyleCnt="6">
+        <dgm:presLayoutVars>
+          <dgm:bulletEnabled val="1"/>
+        </dgm:presLayoutVars>
+      </dgm:prSet>
+      <dgm:spPr/>
+      <dgm:t>
+        <a:bodyPr/>
+        <a:lstStyle/>
+        <a:p>
+          <a:endParaRPr lang="en-US"/>
+        </a:p>
+      </dgm:t>
+    </dgm:pt>
+    <dgm:pt modelId="{F28C42C1-685A-4ECD-B710-B679681240E2}" type="pres">
+      <dgm:prSet presAssocID="{4AF67BC8-A56D-4026-9461-D8FCF954C3E7}" presName="sp" presStyleCnt="0"/>
+      <dgm:spPr/>
+    </dgm:pt>
+    <dgm:pt modelId="{4BAF3AB4-5428-46BE-8EE4-36EFB382C436}" type="pres">
+      <dgm:prSet presAssocID="{8F439D51-B6B7-43F0-A14D-CBB8F59A87C3}" presName="composite" presStyleCnt="0"/>
+      <dgm:spPr/>
+    </dgm:pt>
+    <dgm:pt modelId="{0C7BE4FD-A097-4302-9DE3-D74D6C1B369E}" type="pres">
+      <dgm:prSet presAssocID="{8F439D51-B6B7-43F0-A14D-CBB8F59A87C3}" presName="parentText" presStyleLbl="alignNode1" presStyleIdx="2" presStyleCnt="6">
+        <dgm:presLayoutVars>
+          <dgm:chMax val="1"/>
+          <dgm:bulletEnabled val="1"/>
+        </dgm:presLayoutVars>
+      </dgm:prSet>
+      <dgm:spPr/>
+      <dgm:t>
+        <a:bodyPr/>
+        <a:lstStyle/>
+        <a:p>
+          <a:endParaRPr lang="en-US"/>
+        </a:p>
+      </dgm:t>
+    </dgm:pt>
+    <dgm:pt modelId="{F1042AF1-C5B0-4195-BED3-223E85A2B6C6}" type="pres">
+      <dgm:prSet presAssocID="{8F439D51-B6B7-43F0-A14D-CBB8F59A87C3}" presName="descendantText" presStyleLbl="alignAcc1" presStyleIdx="2" presStyleCnt="6">
+        <dgm:presLayoutVars>
+          <dgm:bulletEnabled val="1"/>
+        </dgm:presLayoutVars>
+      </dgm:prSet>
+      <dgm:spPr/>
+      <dgm:t>
+        <a:bodyPr/>
+        <a:lstStyle/>
+        <a:p>
+          <a:endParaRPr lang="en-US"/>
+        </a:p>
+      </dgm:t>
+    </dgm:pt>
+    <dgm:pt modelId="{06C5A76F-A012-49BF-A92B-3134BB24019D}" type="pres">
+      <dgm:prSet presAssocID="{72EF58BE-7C82-47E2-8B8A-796159977996}" presName="sp" presStyleCnt="0"/>
+      <dgm:spPr/>
+    </dgm:pt>
+    <dgm:pt modelId="{1793110E-4A37-4C29-A653-CD27FE84DA27}" type="pres">
+      <dgm:prSet presAssocID="{E90407A8-D19D-4B7E-B854-8A80F2D00F61}" presName="composite" presStyleCnt="0"/>
+      <dgm:spPr/>
+    </dgm:pt>
+    <dgm:pt modelId="{1C041D6E-4DF5-43A7-9B8C-8C6610F805F9}" type="pres">
+      <dgm:prSet presAssocID="{E90407A8-D19D-4B7E-B854-8A80F2D00F61}" presName="parentText" presStyleLbl="alignNode1" presStyleIdx="3" presStyleCnt="6">
+        <dgm:presLayoutVars>
+          <dgm:chMax val="1"/>
+          <dgm:bulletEnabled val="1"/>
+        </dgm:presLayoutVars>
+      </dgm:prSet>
+      <dgm:spPr/>
+      <dgm:t>
+        <a:bodyPr/>
+        <a:lstStyle/>
+        <a:p>
+          <a:endParaRPr lang="en-US"/>
+        </a:p>
+      </dgm:t>
+    </dgm:pt>
+    <dgm:pt modelId="{43A45EDA-CE86-41D2-B92A-09BFE1585692}" type="pres">
+      <dgm:prSet presAssocID="{E90407A8-D19D-4B7E-B854-8A80F2D00F61}" presName="descendantText" presStyleLbl="alignAcc1" presStyleIdx="3" presStyleCnt="6">
+        <dgm:presLayoutVars>
+          <dgm:bulletEnabled val="1"/>
+        </dgm:presLayoutVars>
+      </dgm:prSet>
+      <dgm:spPr/>
+      <dgm:t>
+        <a:bodyPr/>
+        <a:lstStyle/>
+        <a:p>
+          <a:endParaRPr lang="en-US"/>
+        </a:p>
+      </dgm:t>
+    </dgm:pt>
+    <dgm:pt modelId="{276BFF95-4C61-447A-AA0D-EDF0698F78C0}" type="pres">
+      <dgm:prSet presAssocID="{DA19E450-219D-4587-87C5-FEFCF6520AE5}" presName="sp" presStyleCnt="0"/>
+      <dgm:spPr/>
+    </dgm:pt>
+    <dgm:pt modelId="{79FC0ED7-CAA2-4F0C-813F-9B7722381328}" type="pres">
+      <dgm:prSet presAssocID="{0282634B-803E-473F-A3DB-94DCCFB53278}" presName="composite" presStyleCnt="0"/>
+      <dgm:spPr/>
+    </dgm:pt>
+    <dgm:pt modelId="{03991D8D-D943-465A-BBA9-01B35A9A9A27}" type="pres">
+      <dgm:prSet presAssocID="{0282634B-803E-473F-A3DB-94DCCFB53278}" presName="parentText" presStyleLbl="alignNode1" presStyleIdx="4" presStyleCnt="6">
+        <dgm:presLayoutVars>
+          <dgm:chMax val="1"/>
+          <dgm:bulletEnabled val="1"/>
+        </dgm:presLayoutVars>
+      </dgm:prSet>
+      <dgm:spPr/>
+      <dgm:t>
+        <a:bodyPr/>
+        <a:lstStyle/>
+        <a:p>
+          <a:endParaRPr lang="en-US"/>
+        </a:p>
+      </dgm:t>
+    </dgm:pt>
+    <dgm:pt modelId="{5F8EC6B9-7FA8-41E5-AEC8-F776C9BC2ACF}" type="pres">
+      <dgm:prSet presAssocID="{0282634B-803E-473F-A3DB-94DCCFB53278}" presName="descendantText" presStyleLbl="alignAcc1" presStyleIdx="4" presStyleCnt="6">
+        <dgm:presLayoutVars>
+          <dgm:bulletEnabled val="1"/>
+        </dgm:presLayoutVars>
+      </dgm:prSet>
+      <dgm:spPr/>
+      <dgm:t>
+        <a:bodyPr/>
+        <a:lstStyle/>
+        <a:p>
+          <a:endParaRPr lang="en-US"/>
+        </a:p>
+      </dgm:t>
+    </dgm:pt>
+    <dgm:pt modelId="{427D1768-75ED-4105-B4E1-3DDAD46ED952}" type="pres">
+      <dgm:prSet presAssocID="{E6D8037E-EB17-475B-804B-A373CABD384B}" presName="sp" presStyleCnt="0"/>
+      <dgm:spPr/>
+    </dgm:pt>
+    <dgm:pt modelId="{F3B0C9FE-F8BE-4197-B0EE-7588CB736827}" type="pres">
+      <dgm:prSet presAssocID="{C241F0C3-AB5E-48E3-94ED-47CAE99599AC}" presName="composite" presStyleCnt="0"/>
+      <dgm:spPr/>
+    </dgm:pt>
+    <dgm:pt modelId="{FB0EBA03-1927-40C6-831E-7FBE2EA9D2DC}" type="pres">
+      <dgm:prSet presAssocID="{C241F0C3-AB5E-48E3-94ED-47CAE99599AC}" presName="parentText" presStyleLbl="alignNode1" presStyleIdx="5" presStyleCnt="6">
+        <dgm:presLayoutVars>
+          <dgm:chMax val="1"/>
+          <dgm:bulletEnabled val="1"/>
+        </dgm:presLayoutVars>
+      </dgm:prSet>
+      <dgm:spPr/>
+      <dgm:t>
+        <a:bodyPr/>
+        <a:lstStyle/>
+        <a:p>
+          <a:endParaRPr lang="en-US"/>
+        </a:p>
+      </dgm:t>
+    </dgm:pt>
+    <dgm:pt modelId="{A72CA3DD-D2FB-49C0-9BFA-FE00F3A81F45}" type="pres">
+      <dgm:prSet presAssocID="{C241F0C3-AB5E-48E3-94ED-47CAE99599AC}" presName="descendantText" presStyleLbl="alignAcc1" presStyleIdx="5" presStyleCnt="6">
+        <dgm:presLayoutVars>
+          <dgm:bulletEnabled val="1"/>
+        </dgm:presLayoutVars>
+      </dgm:prSet>
+      <dgm:spPr/>
+      <dgm:t>
+        <a:bodyPr/>
+        <a:lstStyle/>
+        <a:p>
+          <a:endParaRPr lang="en-US"/>
+        </a:p>
+      </dgm:t>
+    </dgm:pt>
+  </dgm:ptLst>
+  <dgm:cxnLst>
+    <dgm:cxn modelId="{3BC0EA8D-3A9F-4571-B3E7-A123ECC1008E}" type="presOf" srcId="{E90407A8-D19D-4B7E-B854-8A80F2D00F61}" destId="{1C041D6E-4DF5-43A7-9B8C-8C6610F805F9}" srcOrd="0" destOrd="0" presId="urn:microsoft.com/office/officeart/2005/8/layout/chevron2"/>
+    <dgm:cxn modelId="{FFE88066-3E84-4EC5-A6DE-33B74D811AD6}" srcId="{C0AFDC70-32E0-4B9F-932E-27382B633E08}" destId="{C241F0C3-AB5E-48E3-94ED-47CAE99599AC}" srcOrd="5" destOrd="0" parTransId="{D47A52A8-1B28-444C-8A30-511F6ABD08BD}" sibTransId="{7F8D2CB8-DA46-479E-86E2-4AFE58750954}"/>
+    <dgm:cxn modelId="{25A545DC-0B38-42CE-BF2C-E120F7391489}" type="presOf" srcId="{C0AFDC70-32E0-4B9F-932E-27382B633E08}" destId="{2DEE4503-4407-4D17-A609-65FA9BC2BE43}" srcOrd="0" destOrd="0" presId="urn:microsoft.com/office/officeart/2005/8/layout/chevron2"/>
+    <dgm:cxn modelId="{76E7BC09-BB9B-4208-8155-F8B914DFF601}" srcId="{354A7675-6CB2-48EB-A031-71267C4E7163}" destId="{662466BC-9981-43AE-9CCF-A9622E072E23}" srcOrd="0" destOrd="0" parTransId="{D7650571-C21F-4FFA-933F-827F443B10E5}" sibTransId="{61B0D713-6D48-4757-8F3D-65C1DA71CF60}"/>
+    <dgm:cxn modelId="{E71FECE7-7DC9-4CF6-BC4A-58FAB182D575}" srcId="{E90407A8-D19D-4B7E-B854-8A80F2D00F61}" destId="{98DAF3B8-0A67-4327-ABCF-5B72E8401E90}" srcOrd="0" destOrd="0" parTransId="{1E2DFB62-37C9-47B9-9511-402174624535}" sibTransId="{CF5413AE-D39A-494C-96B9-8ED6FA5A6D90}"/>
+    <dgm:cxn modelId="{0589AAA9-B942-474A-909C-982E2B8C47F8}" type="presOf" srcId="{F360982B-F2E2-4E1C-97C7-4DD023CF475A}" destId="{F1042AF1-C5B0-4195-BED3-223E85A2B6C6}" srcOrd="0" destOrd="1" presId="urn:microsoft.com/office/officeart/2005/8/layout/chevron2"/>
+    <dgm:cxn modelId="{F6AE1862-A2BF-4021-AA22-D38C66185759}" srcId="{C0AFDC70-32E0-4B9F-932E-27382B633E08}" destId="{D651B15E-07DF-42FC-9782-10247930488F}" srcOrd="1" destOrd="0" parTransId="{6DEB5D5C-BE96-43C5-AB17-F999072D6C1A}" sibTransId="{4AF67BC8-A56D-4026-9461-D8FCF954C3E7}"/>
+    <dgm:cxn modelId="{384003D5-C3B0-48B8-946D-4F60DBE8DF5A}" type="presOf" srcId="{A899E859-3E80-48D1-A0B7-5A63B9EFC7E2}" destId="{5F8EC6B9-7FA8-41E5-AEC8-F776C9BC2ACF}" srcOrd="0" destOrd="0" presId="urn:microsoft.com/office/officeart/2005/8/layout/chevron2"/>
+    <dgm:cxn modelId="{83D3A29F-B58C-48A2-AC7B-F273481DEEFA}" type="presOf" srcId="{88D7EFD8-C24E-4900-965C-615A00BF7A18}" destId="{F1042AF1-C5B0-4195-BED3-223E85A2B6C6}" srcOrd="0" destOrd="0" presId="urn:microsoft.com/office/officeart/2005/8/layout/chevron2"/>
+    <dgm:cxn modelId="{4495C053-D333-47E3-8957-3958E928B02A}" srcId="{8F439D51-B6B7-43F0-A14D-CBB8F59A87C3}" destId="{F360982B-F2E2-4E1C-97C7-4DD023CF475A}" srcOrd="1" destOrd="0" parTransId="{4AC6B4D8-D4FA-4368-BD5D-D377DFBF8655}" sibTransId="{5374B0DD-9F00-4486-88D6-26582C980520}"/>
+    <dgm:cxn modelId="{D2B987E1-8CEA-435E-8D28-577CF4C1845D}" srcId="{C0AFDC70-32E0-4B9F-932E-27382B633E08}" destId="{0282634B-803E-473F-A3DB-94DCCFB53278}" srcOrd="4" destOrd="0" parTransId="{9CF309C0-A2DC-4281-A04C-C9636E9B8004}" sibTransId="{E6D8037E-EB17-475B-804B-A373CABD384B}"/>
+    <dgm:cxn modelId="{34E794F6-997A-4961-AE06-5DC765D71CDC}" srcId="{D651B15E-07DF-42FC-9782-10247930488F}" destId="{B69B01B5-3268-4099-A8E3-4A4F3FB1D043}" srcOrd="0" destOrd="0" parTransId="{F6675C08-3040-46F4-824D-D746F191516C}" sibTransId="{AA09ADC0-9421-44F0-89E2-39EAECADA555}"/>
+    <dgm:cxn modelId="{579A652A-D964-463F-9AE8-EDEC4775AA53}" srcId="{C0AFDC70-32E0-4B9F-932E-27382B633E08}" destId="{354A7675-6CB2-48EB-A031-71267C4E7163}" srcOrd="0" destOrd="0" parTransId="{AB4A92BE-79F2-4F9A-95F7-870769F2AD9B}" sibTransId="{C0EFA3C1-CFF3-4B10-AB83-126E5BBD1075}"/>
+    <dgm:cxn modelId="{790F8E87-ED9C-4D49-A0EE-ED553D4D7024}" srcId="{8F439D51-B6B7-43F0-A14D-CBB8F59A87C3}" destId="{88D7EFD8-C24E-4900-965C-615A00BF7A18}" srcOrd="0" destOrd="0" parTransId="{04B59200-97A9-4893-8DD6-D674CEDEE23B}" sibTransId="{71427AF1-D5CA-493C-BA3B-1CD68B805A4C}"/>
+    <dgm:cxn modelId="{882D978B-4393-4C00-9CC8-D2CB1096A732}" srcId="{D651B15E-07DF-42FC-9782-10247930488F}" destId="{BD3784C6-52B0-46FC-A306-5A31729ADD62}" srcOrd="1" destOrd="0" parTransId="{C1A104FD-94D9-4A50-AE0E-44296C702A91}" sibTransId="{56FCBF33-A8AF-449A-9980-68244F560569}"/>
+    <dgm:cxn modelId="{61E201DE-C5A0-4215-8051-51295195202E}" type="presOf" srcId="{E9AB0F46-5E8B-476F-81AA-C397F9EE2554}" destId="{A72CA3DD-D2FB-49C0-9BFA-FE00F3A81F45}" srcOrd="0" destOrd="0" presId="urn:microsoft.com/office/officeart/2005/8/layout/chevron2"/>
+    <dgm:cxn modelId="{89E46D45-713D-4C86-9E90-F0218BD0070B}" type="presOf" srcId="{0282634B-803E-473F-A3DB-94DCCFB53278}" destId="{03991D8D-D943-465A-BBA9-01B35A9A9A27}" srcOrd="0" destOrd="0" presId="urn:microsoft.com/office/officeart/2005/8/layout/chevron2"/>
+    <dgm:cxn modelId="{87EE144F-49DE-4DFC-BF8D-E0BD03E83CF1}" type="presOf" srcId="{354A7675-6CB2-48EB-A031-71267C4E7163}" destId="{9DFE142A-7BDA-4E7E-8987-9508CDF088CA}" srcOrd="0" destOrd="0" presId="urn:microsoft.com/office/officeart/2005/8/layout/chevron2"/>
+    <dgm:cxn modelId="{61BFC162-4D1F-4886-82C2-62C0BB5FF738}" type="presOf" srcId="{D651B15E-07DF-42FC-9782-10247930488F}" destId="{FCDEB0BF-1A15-4842-9292-3AA12B1B6889}" srcOrd="0" destOrd="0" presId="urn:microsoft.com/office/officeart/2005/8/layout/chevron2"/>
+    <dgm:cxn modelId="{8B484A0C-A870-421E-B8DC-BB1BDBDBB51B}" srcId="{C0AFDC70-32E0-4B9F-932E-27382B633E08}" destId="{E90407A8-D19D-4B7E-B854-8A80F2D00F61}" srcOrd="3" destOrd="0" parTransId="{15C53900-64F2-4093-B4AF-9B88AEDF23D8}" sibTransId="{DA19E450-219D-4587-87C5-FEFCF6520AE5}"/>
+    <dgm:cxn modelId="{63B1D630-E800-4DBF-8F6E-9301D4BAE40A}" type="presOf" srcId="{BD3784C6-52B0-46FC-A306-5A31729ADD62}" destId="{F3BDF937-815C-4C3D-8CEF-3192A27EA3DC}" srcOrd="0" destOrd="1" presId="urn:microsoft.com/office/officeart/2005/8/layout/chevron2"/>
+    <dgm:cxn modelId="{F71C979F-17C3-44B0-8717-01EC968B03DB}" type="presOf" srcId="{662466BC-9981-43AE-9CCF-A9622E072E23}" destId="{CB79293A-EEDC-43E4-B2F6-862AE9B8B2D3}" srcOrd="0" destOrd="0" presId="urn:microsoft.com/office/officeart/2005/8/layout/chevron2"/>
+    <dgm:cxn modelId="{9E870966-A3C2-4C39-BFD3-E1C35253068A}" type="presOf" srcId="{B69B01B5-3268-4099-A8E3-4A4F3FB1D043}" destId="{F3BDF937-815C-4C3D-8CEF-3192A27EA3DC}" srcOrd="0" destOrd="0" presId="urn:microsoft.com/office/officeart/2005/8/layout/chevron2"/>
+    <dgm:cxn modelId="{8634C915-38CC-4F4C-A6DE-8DD167CBD581}" srcId="{C0AFDC70-32E0-4B9F-932E-27382B633E08}" destId="{8F439D51-B6B7-43F0-A14D-CBB8F59A87C3}" srcOrd="2" destOrd="0" parTransId="{FFA6ED4D-A19C-438C-9324-D8A0BECCEC98}" sibTransId="{72EF58BE-7C82-47E2-8B8A-796159977996}"/>
+    <dgm:cxn modelId="{81AE1F54-0790-40E2-A02B-4C45D9E35FB4}" type="presOf" srcId="{8F439D51-B6B7-43F0-A14D-CBB8F59A87C3}" destId="{0C7BE4FD-A097-4302-9DE3-D74D6C1B369E}" srcOrd="0" destOrd="0" presId="urn:microsoft.com/office/officeart/2005/8/layout/chevron2"/>
+    <dgm:cxn modelId="{6AF6C067-51AF-4E89-8E8B-30DBBF812BC1}" srcId="{0282634B-803E-473F-A3DB-94DCCFB53278}" destId="{A899E859-3E80-48D1-A0B7-5A63B9EFC7E2}" srcOrd="0" destOrd="0" parTransId="{A556C426-B26C-4C9C-B0AC-4C5976E9914B}" sibTransId="{227AB353-6080-4B9A-9D58-476F3AB11C13}"/>
+    <dgm:cxn modelId="{18A4EB01-2193-4BB7-BA2B-6EB664B21870}" type="presOf" srcId="{98DAF3B8-0A67-4327-ABCF-5B72E8401E90}" destId="{43A45EDA-CE86-41D2-B92A-09BFE1585692}" srcOrd="0" destOrd="0" presId="urn:microsoft.com/office/officeart/2005/8/layout/chevron2"/>
+    <dgm:cxn modelId="{1CB4F2CD-FE0C-405A-A777-A75E419CD8BF}" type="presOf" srcId="{C241F0C3-AB5E-48E3-94ED-47CAE99599AC}" destId="{FB0EBA03-1927-40C6-831E-7FBE2EA9D2DC}" srcOrd="0" destOrd="0" presId="urn:microsoft.com/office/officeart/2005/8/layout/chevron2"/>
+    <dgm:cxn modelId="{7F904DB1-7315-49D1-87C9-01DF123A147E}" srcId="{C241F0C3-AB5E-48E3-94ED-47CAE99599AC}" destId="{E9AB0F46-5E8B-476F-81AA-C397F9EE2554}" srcOrd="0" destOrd="0" parTransId="{9CCB7A11-21F8-479B-9283-8C63BBE9829A}" sibTransId="{F0006B29-AC1D-4B6E-96A3-1FD561F468A7}"/>
+    <dgm:cxn modelId="{2B9CF1A2-659C-4D37-B197-F37B887E0562}" type="presParOf" srcId="{2DEE4503-4407-4D17-A609-65FA9BC2BE43}" destId="{FDAB2438-A0E0-4A0E-A602-7E1C76010C2D}" srcOrd="0" destOrd="0" presId="urn:microsoft.com/office/officeart/2005/8/layout/chevron2"/>
+    <dgm:cxn modelId="{8C213D8F-054C-44FE-8944-183A8C24710A}" type="presParOf" srcId="{FDAB2438-A0E0-4A0E-A602-7E1C76010C2D}" destId="{9DFE142A-7BDA-4E7E-8987-9508CDF088CA}" srcOrd="0" destOrd="0" presId="urn:microsoft.com/office/officeart/2005/8/layout/chevron2"/>
+    <dgm:cxn modelId="{1920C5BB-9837-481B-A38C-DF819EEEF87B}" type="presParOf" srcId="{FDAB2438-A0E0-4A0E-A602-7E1C76010C2D}" destId="{CB79293A-EEDC-43E4-B2F6-862AE9B8B2D3}" srcOrd="1" destOrd="0" presId="urn:microsoft.com/office/officeart/2005/8/layout/chevron2"/>
+    <dgm:cxn modelId="{C1276030-9525-489D-B74E-90E69E41EBE5}" type="presParOf" srcId="{2DEE4503-4407-4D17-A609-65FA9BC2BE43}" destId="{11BA829E-B193-435E-B127-08AAD026EA09}" srcOrd="1" destOrd="0" presId="urn:microsoft.com/office/officeart/2005/8/layout/chevron2"/>
+    <dgm:cxn modelId="{522D6EBE-B7B0-4CC3-8024-7F0A22DF6E94}" type="presParOf" srcId="{2DEE4503-4407-4D17-A609-65FA9BC2BE43}" destId="{53CA02E4-5A4D-4FB9-B974-243500B8BAD9}" srcOrd="2" destOrd="0" presId="urn:microsoft.com/office/officeart/2005/8/layout/chevron2"/>
+    <dgm:cxn modelId="{72D71771-C8EA-4FF3-9AF2-326971ECC740}" type="presParOf" srcId="{53CA02E4-5A4D-4FB9-B974-243500B8BAD9}" destId="{FCDEB0BF-1A15-4842-9292-3AA12B1B6889}" srcOrd="0" destOrd="0" presId="urn:microsoft.com/office/officeart/2005/8/layout/chevron2"/>
+    <dgm:cxn modelId="{122F3EDC-5187-452B-8BD0-28FAAA18DE75}" type="presParOf" srcId="{53CA02E4-5A4D-4FB9-B974-243500B8BAD9}" destId="{F3BDF937-815C-4C3D-8CEF-3192A27EA3DC}" srcOrd="1" destOrd="0" presId="urn:microsoft.com/office/officeart/2005/8/layout/chevron2"/>
+    <dgm:cxn modelId="{DC7CEAE3-6355-4DD2-B541-A74019552AC9}" type="presParOf" srcId="{2DEE4503-4407-4D17-A609-65FA9BC2BE43}" destId="{F28C42C1-685A-4ECD-B710-B679681240E2}" srcOrd="3" destOrd="0" presId="urn:microsoft.com/office/officeart/2005/8/layout/chevron2"/>
+    <dgm:cxn modelId="{E341EE89-8F90-4B1D-8E71-5717253F76A3}" type="presParOf" srcId="{2DEE4503-4407-4D17-A609-65FA9BC2BE43}" destId="{4BAF3AB4-5428-46BE-8EE4-36EFB382C436}" srcOrd="4" destOrd="0" presId="urn:microsoft.com/office/officeart/2005/8/layout/chevron2"/>
+    <dgm:cxn modelId="{788DC71E-EA8B-46EA-B894-5DCB2559A14C}" type="presParOf" srcId="{4BAF3AB4-5428-46BE-8EE4-36EFB382C436}" destId="{0C7BE4FD-A097-4302-9DE3-D74D6C1B369E}" srcOrd="0" destOrd="0" presId="urn:microsoft.com/office/officeart/2005/8/layout/chevron2"/>
+    <dgm:cxn modelId="{167F5B6B-E9E2-41A5-B8C0-96599F813249}" type="presParOf" srcId="{4BAF3AB4-5428-46BE-8EE4-36EFB382C436}" destId="{F1042AF1-C5B0-4195-BED3-223E85A2B6C6}" srcOrd="1" destOrd="0" presId="urn:microsoft.com/office/officeart/2005/8/layout/chevron2"/>
+    <dgm:cxn modelId="{C0A4DE1F-C1AB-4B45-BCF3-87FBB3E8CC73}" type="presParOf" srcId="{2DEE4503-4407-4D17-A609-65FA9BC2BE43}" destId="{06C5A76F-A012-49BF-A92B-3134BB24019D}" srcOrd="5" destOrd="0" presId="urn:microsoft.com/office/officeart/2005/8/layout/chevron2"/>
+    <dgm:cxn modelId="{FCE09C38-4634-4754-ACEE-32FA7FC4D87E}" type="presParOf" srcId="{2DEE4503-4407-4D17-A609-65FA9BC2BE43}" destId="{1793110E-4A37-4C29-A653-CD27FE84DA27}" srcOrd="6" destOrd="0" presId="urn:microsoft.com/office/officeart/2005/8/layout/chevron2"/>
+    <dgm:cxn modelId="{D22AFA2D-8483-469A-A55A-CA0F959FBC29}" type="presParOf" srcId="{1793110E-4A37-4C29-A653-CD27FE84DA27}" destId="{1C041D6E-4DF5-43A7-9B8C-8C6610F805F9}" srcOrd="0" destOrd="0" presId="urn:microsoft.com/office/officeart/2005/8/layout/chevron2"/>
+    <dgm:cxn modelId="{FAE8FDEA-FEB5-4BE9-80DB-3A9DA2879CF3}" type="presParOf" srcId="{1793110E-4A37-4C29-A653-CD27FE84DA27}" destId="{43A45EDA-CE86-41D2-B92A-09BFE1585692}" srcOrd="1" destOrd="0" presId="urn:microsoft.com/office/officeart/2005/8/layout/chevron2"/>
+    <dgm:cxn modelId="{E3919C76-8F08-4F8C-9456-9E6EDF2E1373}" type="presParOf" srcId="{2DEE4503-4407-4D17-A609-65FA9BC2BE43}" destId="{276BFF95-4C61-447A-AA0D-EDF0698F78C0}" srcOrd="7" destOrd="0" presId="urn:microsoft.com/office/officeart/2005/8/layout/chevron2"/>
+    <dgm:cxn modelId="{8484F7D0-C5D5-46C2-BA64-BD079E3556B8}" type="presParOf" srcId="{2DEE4503-4407-4D17-A609-65FA9BC2BE43}" destId="{79FC0ED7-CAA2-4F0C-813F-9B7722381328}" srcOrd="8" destOrd="0" presId="urn:microsoft.com/office/officeart/2005/8/layout/chevron2"/>
+    <dgm:cxn modelId="{BBA62C09-521A-427E-9945-81A3F329773C}" type="presParOf" srcId="{79FC0ED7-CAA2-4F0C-813F-9B7722381328}" destId="{03991D8D-D943-465A-BBA9-01B35A9A9A27}" srcOrd="0" destOrd="0" presId="urn:microsoft.com/office/officeart/2005/8/layout/chevron2"/>
+    <dgm:cxn modelId="{36F0B94B-6A56-4440-9033-1D4A173CBCB4}" type="presParOf" srcId="{79FC0ED7-CAA2-4F0C-813F-9B7722381328}" destId="{5F8EC6B9-7FA8-41E5-AEC8-F776C9BC2ACF}" srcOrd="1" destOrd="0" presId="urn:microsoft.com/office/officeart/2005/8/layout/chevron2"/>
+    <dgm:cxn modelId="{CEEF96B2-C8BD-48C0-BCB7-04FBB345FD39}" type="presParOf" srcId="{2DEE4503-4407-4D17-A609-65FA9BC2BE43}" destId="{427D1768-75ED-4105-B4E1-3DDAD46ED952}" srcOrd="9" destOrd="0" presId="urn:microsoft.com/office/officeart/2005/8/layout/chevron2"/>
+    <dgm:cxn modelId="{0DA9AD73-5921-49E3-B316-3A114BFC8DBF}" type="presParOf" srcId="{2DEE4503-4407-4D17-A609-65FA9BC2BE43}" destId="{F3B0C9FE-F8BE-4197-B0EE-7588CB736827}" srcOrd="10" destOrd="0" presId="urn:microsoft.com/office/officeart/2005/8/layout/chevron2"/>
+    <dgm:cxn modelId="{924A4F2E-57DB-48A7-A45C-CA6A4CC3A1ED}" type="presParOf" srcId="{F3B0C9FE-F8BE-4197-B0EE-7588CB736827}" destId="{FB0EBA03-1927-40C6-831E-7FBE2EA9D2DC}" srcOrd="0" destOrd="0" presId="urn:microsoft.com/office/officeart/2005/8/layout/chevron2"/>
+    <dgm:cxn modelId="{EE8A9FDE-3CCF-47CF-A1FA-733724C92F83}" type="presParOf" srcId="{F3B0C9FE-F8BE-4197-B0EE-7588CB736827}" destId="{A72CA3DD-D2FB-49C0-9BFA-FE00F3A81F45}" srcOrd="1" destOrd="0" presId="urn:microsoft.com/office/officeart/2005/8/layout/chevron2"/>
   </dgm:cxnLst>
   <dgm:bg/>
   <dgm:whole/>
@@ -1502,15 +3184,7 @@
                 <a:schemeClr val="tx1"/>
               </a:solidFill>
             </a:rPr>
-            <a:t>Source code, header files, documentation, </a:t>
-          </a:r>
-          <a:r>
-            <a:rPr lang="en-US" sz="2000" kern="1200" dirty="0" smtClean="0">
-              <a:solidFill>
-                <a:schemeClr val="tx1"/>
-              </a:solidFill>
-            </a:rPr>
-            <a:t>etc.</a:t>
+            <a:t>Source code, header files, documentation, etc.</a:t>
           </a:r>
           <a:endParaRPr lang="en-US" sz="2000" kern="1200" dirty="0"/>
         </a:p>
@@ -1821,6 +3495,907 @@
 </dsp:drawing>
 </file>
 
+<file path=ppt/diagrams/drawing2.xml><?xml version="1.0" encoding="utf-8"?>
+<dsp:drawing xmlns:dgm="http://schemas.openxmlformats.org/drawingml/2006/diagram" xmlns:dsp="http://schemas.microsoft.com/office/drawing/2008/diagram" xmlns:a="http://schemas.openxmlformats.org/drawingml/2006/main">
+  <dsp:spTree>
+    <dsp:nvGrpSpPr>
+      <dsp:cNvPr id="0" name=""/>
+      <dsp:cNvGrpSpPr/>
+    </dsp:nvGrpSpPr>
+    <dsp:grpSpPr/>
+    <dsp:sp modelId="{9DFE142A-7BDA-4E7E-8987-9508CDF088CA}">
+      <dsp:nvSpPr>
+        <dsp:cNvPr id="0" name=""/>
+        <dsp:cNvSpPr/>
+      </dsp:nvSpPr>
+      <dsp:spPr>
+        <a:xfrm rot="5400000">
+          <a:off x="-129224" y="131237"/>
+          <a:ext cx="861494" cy="603046"/>
+        </a:xfrm>
+        <a:prstGeom prst="chevron">
+          <a:avLst/>
+        </a:prstGeom>
+        <a:solidFill>
+          <a:schemeClr val="accent1">
+            <a:hueOff val="0"/>
+            <a:satOff val="0"/>
+            <a:lumOff val="0"/>
+            <a:alphaOff val="0"/>
+          </a:schemeClr>
+        </a:solidFill>
+        <a:ln w="42500" cap="flat" cmpd="sng" algn="ctr">
+          <a:solidFill>
+            <a:schemeClr val="accent1">
+              <a:hueOff val="0"/>
+              <a:satOff val="0"/>
+              <a:lumOff val="0"/>
+              <a:alphaOff val="0"/>
+            </a:schemeClr>
+          </a:solidFill>
+          <a:prstDash val="solid"/>
+        </a:ln>
+        <a:effectLst/>
+      </dsp:spPr>
+      <dsp:style>
+        <a:lnRef idx="2">
+          <a:scrgbClr r="0" g="0" b="0"/>
+        </a:lnRef>
+        <a:fillRef idx="1">
+          <a:scrgbClr r="0" g="0" b="0"/>
+        </a:fillRef>
+        <a:effectRef idx="0">
+          <a:scrgbClr r="0" g="0" b="0"/>
+        </a:effectRef>
+        <a:fontRef idx="minor">
+          <a:schemeClr val="lt1"/>
+        </a:fontRef>
+      </dsp:style>
+      <dsp:txBody>
+        <a:bodyPr spcFirstLastPara="0" vert="horz" wrap="square" lIns="10795" tIns="10795" rIns="10795" bIns="10795" numCol="1" spcCol="1270" anchor="ctr" anchorCtr="0">
+          <a:noAutofit/>
+        </a:bodyPr>
+        <a:lstStyle/>
+        <a:p>
+          <a:pPr lvl="0" algn="ctr" defTabSz="755650">
+            <a:lnSpc>
+              <a:spcPct val="90000"/>
+            </a:lnSpc>
+            <a:spcBef>
+              <a:spcPct val="0"/>
+            </a:spcBef>
+            <a:spcAft>
+              <a:spcPct val="35000"/>
+            </a:spcAft>
+          </a:pPr>
+          <a:r>
+            <a:rPr lang="en-US" sz="1700" kern="1200" dirty="0" smtClean="0"/>
+            <a:t>Pack</a:t>
+          </a:r>
+          <a:endParaRPr lang="en-US" sz="1700" kern="1200" dirty="0"/>
+        </a:p>
+      </dsp:txBody>
+      <dsp:txXfrm rot="-5400000">
+        <a:off x="0" y="303536"/>
+        <a:ext cx="603046" cy="258448"/>
+      </dsp:txXfrm>
+    </dsp:sp>
+    <dsp:sp modelId="{CB79293A-EEDC-43E4-B2F6-862AE9B8B2D3}">
+      <dsp:nvSpPr>
+        <dsp:cNvPr id="0" name=""/>
+        <dsp:cNvSpPr/>
+      </dsp:nvSpPr>
+      <dsp:spPr>
+        <a:xfrm rot="5400000">
+          <a:off x="4378430" y="-3773371"/>
+          <a:ext cx="559971" cy="8110740"/>
+        </a:xfrm>
+        <a:prstGeom prst="round2SameRect">
+          <a:avLst/>
+        </a:prstGeom>
+        <a:solidFill>
+          <a:schemeClr val="lt1">
+            <a:alpha val="90000"/>
+            <a:hueOff val="0"/>
+            <a:satOff val="0"/>
+            <a:lumOff val="0"/>
+            <a:alphaOff val="0"/>
+          </a:schemeClr>
+        </a:solidFill>
+        <a:ln w="42500" cap="flat" cmpd="sng" algn="ctr">
+          <a:solidFill>
+            <a:schemeClr val="accent1">
+              <a:hueOff val="0"/>
+              <a:satOff val="0"/>
+              <a:lumOff val="0"/>
+              <a:alphaOff val="0"/>
+            </a:schemeClr>
+          </a:solidFill>
+          <a:prstDash val="solid"/>
+        </a:ln>
+        <a:effectLst/>
+      </dsp:spPr>
+      <dsp:style>
+        <a:lnRef idx="2">
+          <a:scrgbClr r="0" g="0" b="0"/>
+        </a:lnRef>
+        <a:fillRef idx="1">
+          <a:scrgbClr r="0" g="0" b="0"/>
+        </a:fillRef>
+        <a:effectRef idx="0">
+          <a:scrgbClr r="0" g="0" b="0"/>
+        </a:effectRef>
+        <a:fontRef idx="minor"/>
+      </dsp:style>
+      <dsp:txBody>
+        <a:bodyPr spcFirstLastPara="0" vert="horz" wrap="square" lIns="113792" tIns="10160" rIns="10160" bIns="10160" numCol="1" spcCol="1270" anchor="ctr" anchorCtr="0">
+          <a:noAutofit/>
+        </a:bodyPr>
+        <a:lstStyle/>
+        <a:p>
+          <a:pPr marL="171450" lvl="1" indent="-171450" algn="l" defTabSz="711200">
+            <a:lnSpc>
+              <a:spcPct val="90000"/>
+            </a:lnSpc>
+            <a:spcBef>
+              <a:spcPct val="0"/>
+            </a:spcBef>
+            <a:spcAft>
+              <a:spcPct val="15000"/>
+            </a:spcAft>
+            <a:buChar char="••"/>
+          </a:pPr>
+          <a:r>
+            <a:rPr lang="en-US" sz="1600" kern="1200" dirty="0" smtClean="0"/>
+            <a:t>Create a basic Pack to be able to select device in a development tool</a:t>
+          </a:r>
+          <a:endParaRPr lang="en-US" sz="1600" kern="1200" dirty="0"/>
+        </a:p>
+      </dsp:txBody>
+      <dsp:txXfrm rot="-5400000">
+        <a:off x="603046" y="29349"/>
+        <a:ext cx="8083404" cy="505299"/>
+      </dsp:txXfrm>
+    </dsp:sp>
+    <dsp:sp modelId="{FCDEB0BF-1A15-4842-9292-3AA12B1B6889}">
+      <dsp:nvSpPr>
+        <dsp:cNvPr id="0" name=""/>
+        <dsp:cNvSpPr/>
+      </dsp:nvSpPr>
+      <dsp:spPr>
+        <a:xfrm rot="5400000">
+          <a:off x="-129224" y="894123"/>
+          <a:ext cx="861494" cy="603046"/>
+        </a:xfrm>
+        <a:prstGeom prst="chevron">
+          <a:avLst/>
+        </a:prstGeom>
+        <a:solidFill>
+          <a:srgbClr val="00A960"/>
+        </a:solidFill>
+        <a:ln w="42500" cap="flat" cmpd="sng" algn="ctr">
+          <a:solidFill>
+            <a:srgbClr val="00A960"/>
+          </a:solidFill>
+          <a:prstDash val="solid"/>
+        </a:ln>
+        <a:effectLst/>
+      </dsp:spPr>
+      <dsp:style>
+        <a:lnRef idx="2">
+          <a:scrgbClr r="0" g="0" b="0"/>
+        </a:lnRef>
+        <a:fillRef idx="1">
+          <a:scrgbClr r="0" g="0" b="0"/>
+        </a:fillRef>
+        <a:effectRef idx="0">
+          <a:scrgbClr r="0" g="0" b="0"/>
+        </a:effectRef>
+        <a:fontRef idx="minor">
+          <a:schemeClr val="lt1"/>
+        </a:fontRef>
+      </dsp:style>
+      <dsp:txBody>
+        <a:bodyPr spcFirstLastPara="0" vert="horz" wrap="square" lIns="10795" tIns="10795" rIns="10795" bIns="10795" numCol="1" spcCol="1270" anchor="ctr" anchorCtr="0">
+          <a:noAutofit/>
+        </a:bodyPr>
+        <a:lstStyle/>
+        <a:p>
+          <a:pPr lvl="0" algn="ctr" defTabSz="755650">
+            <a:lnSpc>
+              <a:spcPct val="90000"/>
+            </a:lnSpc>
+            <a:spcBef>
+              <a:spcPct val="0"/>
+            </a:spcBef>
+            <a:spcAft>
+              <a:spcPct val="35000"/>
+            </a:spcAft>
+          </a:pPr>
+          <a:r>
+            <a:rPr lang="en-US" sz="1700" kern="1200" dirty="0" smtClean="0"/>
+            <a:t>CORE</a:t>
+          </a:r>
+          <a:endParaRPr lang="en-US" sz="1700" kern="1200" dirty="0"/>
+        </a:p>
+      </dsp:txBody>
+      <dsp:txXfrm rot="-5400000">
+        <a:off x="0" y="1066422"/>
+        <a:ext cx="603046" cy="258448"/>
+      </dsp:txXfrm>
+    </dsp:sp>
+    <dsp:sp modelId="{F3BDF937-815C-4C3D-8CEF-3192A27EA3DC}">
+      <dsp:nvSpPr>
+        <dsp:cNvPr id="0" name=""/>
+        <dsp:cNvSpPr/>
+      </dsp:nvSpPr>
+      <dsp:spPr>
+        <a:xfrm rot="5400000">
+          <a:off x="4378430" y="-3010485"/>
+          <a:ext cx="559971" cy="8110740"/>
+        </a:xfrm>
+        <a:prstGeom prst="round2SameRect">
+          <a:avLst/>
+        </a:prstGeom>
+        <a:solidFill>
+          <a:schemeClr val="lt1">
+            <a:alpha val="90000"/>
+            <a:hueOff val="0"/>
+            <a:satOff val="0"/>
+            <a:lumOff val="0"/>
+            <a:alphaOff val="0"/>
+          </a:schemeClr>
+        </a:solidFill>
+        <a:ln w="42500" cap="flat" cmpd="sng" algn="ctr">
+          <a:solidFill>
+            <a:srgbClr val="00A960"/>
+          </a:solidFill>
+          <a:prstDash val="solid"/>
+        </a:ln>
+        <a:effectLst/>
+      </dsp:spPr>
+      <dsp:style>
+        <a:lnRef idx="2">
+          <a:scrgbClr r="0" g="0" b="0"/>
+        </a:lnRef>
+        <a:fillRef idx="1">
+          <a:scrgbClr r="0" g="0" b="0"/>
+        </a:fillRef>
+        <a:effectRef idx="0">
+          <a:scrgbClr r="0" g="0" b="0"/>
+        </a:effectRef>
+        <a:fontRef idx="minor"/>
+      </dsp:style>
+      <dsp:txBody>
+        <a:bodyPr spcFirstLastPara="0" vert="horz" wrap="square" lIns="113792" tIns="10160" rIns="10160" bIns="10160" numCol="1" spcCol="1270" anchor="ctr" anchorCtr="0">
+          <a:noAutofit/>
+        </a:bodyPr>
+        <a:lstStyle/>
+        <a:p>
+          <a:pPr marL="171450" lvl="1" indent="-171450" algn="l" defTabSz="711200">
+            <a:lnSpc>
+              <a:spcPct val="90000"/>
+            </a:lnSpc>
+            <a:spcBef>
+              <a:spcPct val="0"/>
+            </a:spcBef>
+            <a:spcAft>
+              <a:spcPct val="15000"/>
+            </a:spcAft>
+            <a:buChar char="••"/>
+          </a:pPr>
+          <a:r>
+            <a:rPr lang="en-US" sz="1600" kern="1200" dirty="0" smtClean="0"/>
+            <a:t>Create startup_&lt;device&gt;.s with reset handler and exception/interrupt vectors</a:t>
+          </a:r>
+          <a:endParaRPr lang="en-US" sz="1600" kern="1200" dirty="0"/>
+        </a:p>
+        <a:p>
+          <a:pPr marL="171450" lvl="1" indent="-171450" algn="l" defTabSz="711200">
+            <a:lnSpc>
+              <a:spcPct val="90000"/>
+            </a:lnSpc>
+            <a:spcBef>
+              <a:spcPct val="0"/>
+            </a:spcBef>
+            <a:spcAft>
+              <a:spcPct val="15000"/>
+            </a:spcAft>
+            <a:buChar char="••"/>
+          </a:pPr>
+          <a:r>
+            <a:rPr lang="en-US" sz="1600" kern="1200" dirty="0" smtClean="0"/>
+            <a:t>Create system_&lt;device&gt;.c/h files are used for system and clock configuration</a:t>
+          </a:r>
+          <a:endParaRPr lang="en-US" sz="1600" kern="1200" dirty="0"/>
+        </a:p>
+      </dsp:txBody>
+      <dsp:txXfrm rot="-5400000">
+        <a:off x="603046" y="792235"/>
+        <a:ext cx="8083404" cy="505299"/>
+      </dsp:txXfrm>
+    </dsp:sp>
+    <dsp:sp modelId="{0C7BE4FD-A097-4302-9DE3-D74D6C1B369E}">
+      <dsp:nvSpPr>
+        <dsp:cNvPr id="0" name=""/>
+        <dsp:cNvSpPr/>
+      </dsp:nvSpPr>
+      <dsp:spPr>
+        <a:xfrm rot="5400000">
+          <a:off x="-129224" y="1657009"/>
+          <a:ext cx="861494" cy="603046"/>
+        </a:xfrm>
+        <a:prstGeom prst="chevron">
+          <a:avLst/>
+        </a:prstGeom>
+        <a:solidFill>
+          <a:srgbClr val="D77B00"/>
+        </a:solidFill>
+        <a:ln w="42500" cap="flat" cmpd="sng" algn="ctr">
+          <a:solidFill>
+            <a:srgbClr val="D77B00"/>
+          </a:solidFill>
+          <a:prstDash val="solid"/>
+        </a:ln>
+        <a:effectLst/>
+      </dsp:spPr>
+      <dsp:style>
+        <a:lnRef idx="2">
+          <a:scrgbClr r="0" g="0" b="0"/>
+        </a:lnRef>
+        <a:fillRef idx="1">
+          <a:scrgbClr r="0" g="0" b="0"/>
+        </a:fillRef>
+        <a:effectRef idx="0">
+          <a:scrgbClr r="0" g="0" b="0"/>
+        </a:effectRef>
+        <a:fontRef idx="minor">
+          <a:schemeClr val="lt1"/>
+        </a:fontRef>
+      </dsp:style>
+      <dsp:txBody>
+        <a:bodyPr spcFirstLastPara="0" vert="horz" wrap="square" lIns="10795" tIns="10795" rIns="10795" bIns="10795" numCol="1" spcCol="1270" anchor="ctr" anchorCtr="0">
+          <a:noAutofit/>
+        </a:bodyPr>
+        <a:lstStyle/>
+        <a:p>
+          <a:pPr lvl="0" algn="ctr" defTabSz="755650">
+            <a:lnSpc>
+              <a:spcPct val="90000"/>
+            </a:lnSpc>
+            <a:spcBef>
+              <a:spcPct val="0"/>
+            </a:spcBef>
+            <a:spcAft>
+              <a:spcPct val="35000"/>
+            </a:spcAft>
+          </a:pPr>
+          <a:r>
+            <a:rPr lang="en-US" sz="1700" kern="1200" dirty="0" smtClean="0"/>
+            <a:t>SVD</a:t>
+          </a:r>
+          <a:endParaRPr lang="en-US" sz="1700" kern="1200" dirty="0"/>
+        </a:p>
+      </dsp:txBody>
+      <dsp:txXfrm rot="-5400000">
+        <a:off x="0" y="1829308"/>
+        <a:ext cx="603046" cy="258448"/>
+      </dsp:txXfrm>
+    </dsp:sp>
+    <dsp:sp modelId="{F1042AF1-C5B0-4195-BED3-223E85A2B6C6}">
+      <dsp:nvSpPr>
+        <dsp:cNvPr id="0" name=""/>
+        <dsp:cNvSpPr/>
+      </dsp:nvSpPr>
+      <dsp:spPr>
+        <a:xfrm rot="5400000">
+          <a:off x="4378430" y="-2247599"/>
+          <a:ext cx="559971" cy="8110740"/>
+        </a:xfrm>
+        <a:prstGeom prst="round2SameRect">
+          <a:avLst/>
+        </a:prstGeom>
+        <a:solidFill>
+          <a:schemeClr val="lt1">
+            <a:alpha val="90000"/>
+            <a:hueOff val="0"/>
+            <a:satOff val="0"/>
+            <a:lumOff val="0"/>
+            <a:alphaOff val="0"/>
+          </a:schemeClr>
+        </a:solidFill>
+        <a:ln w="42500" cap="flat" cmpd="sng" algn="ctr">
+          <a:solidFill>
+            <a:srgbClr val="D77B00"/>
+          </a:solidFill>
+          <a:prstDash val="solid"/>
+        </a:ln>
+        <a:effectLst/>
+      </dsp:spPr>
+      <dsp:style>
+        <a:lnRef idx="2">
+          <a:scrgbClr r="0" g="0" b="0"/>
+        </a:lnRef>
+        <a:fillRef idx="1">
+          <a:scrgbClr r="0" g="0" b="0"/>
+        </a:fillRef>
+        <a:effectRef idx="0">
+          <a:scrgbClr r="0" g="0" b="0"/>
+        </a:effectRef>
+        <a:fontRef idx="minor"/>
+      </dsp:style>
+      <dsp:txBody>
+        <a:bodyPr spcFirstLastPara="0" vert="horz" wrap="square" lIns="113792" tIns="10160" rIns="10160" bIns="10160" numCol="1" spcCol="1270" anchor="ctr" anchorCtr="0">
+          <a:noAutofit/>
+        </a:bodyPr>
+        <a:lstStyle/>
+        <a:p>
+          <a:pPr marL="171450" lvl="1" indent="-171450" algn="l" defTabSz="711200">
+            <a:lnSpc>
+              <a:spcPct val="90000"/>
+            </a:lnSpc>
+            <a:spcBef>
+              <a:spcPct val="0"/>
+            </a:spcBef>
+            <a:spcAft>
+              <a:spcPct val="15000"/>
+            </a:spcAft>
+            <a:buChar char="••"/>
+          </a:pPr>
+          <a:r>
+            <a:rPr lang="en-US" sz="1600" kern="1200" dirty="0" smtClean="0"/>
+            <a:t>Create System View Description (SVD) file</a:t>
+          </a:r>
+          <a:endParaRPr lang="en-US" sz="1600" kern="1200" dirty="0"/>
+        </a:p>
+        <a:p>
+          <a:pPr marL="171450" lvl="1" indent="-171450" algn="l" defTabSz="711200">
+            <a:lnSpc>
+              <a:spcPct val="90000"/>
+            </a:lnSpc>
+            <a:spcBef>
+              <a:spcPct val="0"/>
+            </a:spcBef>
+            <a:spcAft>
+              <a:spcPct val="15000"/>
+            </a:spcAft>
+            <a:buChar char="••"/>
+          </a:pPr>
+          <a:r>
+            <a:rPr lang="en-US" sz="1600" kern="1200" dirty="0" smtClean="0"/>
+            <a:t>Generate device header file and debug views using svdconv.exe</a:t>
+          </a:r>
+          <a:endParaRPr lang="en-US" sz="1600" kern="1200" dirty="0"/>
+        </a:p>
+      </dsp:txBody>
+      <dsp:txXfrm rot="-5400000">
+        <a:off x="603046" y="1555121"/>
+        <a:ext cx="8083404" cy="505299"/>
+      </dsp:txXfrm>
+    </dsp:sp>
+    <dsp:sp modelId="{1C041D6E-4DF5-43A7-9B8C-8C6610F805F9}">
+      <dsp:nvSpPr>
+        <dsp:cNvPr id="0" name=""/>
+        <dsp:cNvSpPr/>
+      </dsp:nvSpPr>
+      <dsp:spPr>
+        <a:xfrm rot="5400000">
+          <a:off x="-129224" y="2419894"/>
+          <a:ext cx="861494" cy="603046"/>
+        </a:xfrm>
+        <a:prstGeom prst="chevron">
+          <a:avLst/>
+        </a:prstGeom>
+        <a:solidFill>
+          <a:srgbClr val="CF364A"/>
+        </a:solidFill>
+        <a:ln w="42500" cap="flat" cmpd="sng" algn="ctr">
+          <a:solidFill>
+            <a:srgbClr val="CF364A"/>
+          </a:solidFill>
+          <a:prstDash val="solid"/>
+        </a:ln>
+        <a:effectLst/>
+      </dsp:spPr>
+      <dsp:style>
+        <a:lnRef idx="2">
+          <a:scrgbClr r="0" g="0" b="0"/>
+        </a:lnRef>
+        <a:fillRef idx="1">
+          <a:scrgbClr r="0" g="0" b="0"/>
+        </a:fillRef>
+        <a:effectRef idx="0">
+          <a:scrgbClr r="0" g="0" b="0"/>
+        </a:effectRef>
+        <a:fontRef idx="minor">
+          <a:schemeClr val="lt1"/>
+        </a:fontRef>
+      </dsp:style>
+      <dsp:txBody>
+        <a:bodyPr spcFirstLastPara="0" vert="horz" wrap="square" lIns="10795" tIns="10795" rIns="10795" bIns="10795" numCol="1" spcCol="1270" anchor="ctr" anchorCtr="0">
+          <a:noAutofit/>
+        </a:bodyPr>
+        <a:lstStyle/>
+        <a:p>
+          <a:pPr lvl="0" algn="ctr" defTabSz="755650">
+            <a:lnSpc>
+              <a:spcPct val="90000"/>
+            </a:lnSpc>
+            <a:spcBef>
+              <a:spcPct val="0"/>
+            </a:spcBef>
+            <a:spcAft>
+              <a:spcPct val="35000"/>
+            </a:spcAft>
+          </a:pPr>
+          <a:r>
+            <a:rPr lang="en-US" sz="1700" kern="1200" dirty="0" smtClean="0"/>
+            <a:t>Flash</a:t>
+          </a:r>
+          <a:endParaRPr lang="en-US" sz="1700" kern="1200" dirty="0"/>
+        </a:p>
+      </dsp:txBody>
+      <dsp:txXfrm rot="-5400000">
+        <a:off x="0" y="2592193"/>
+        <a:ext cx="603046" cy="258448"/>
+      </dsp:txXfrm>
+    </dsp:sp>
+    <dsp:sp modelId="{43A45EDA-CE86-41D2-B92A-09BFE1585692}">
+      <dsp:nvSpPr>
+        <dsp:cNvPr id="0" name=""/>
+        <dsp:cNvSpPr/>
+      </dsp:nvSpPr>
+      <dsp:spPr>
+        <a:xfrm rot="5400000">
+          <a:off x="4378430" y="-1484714"/>
+          <a:ext cx="559971" cy="8110740"/>
+        </a:xfrm>
+        <a:prstGeom prst="round2SameRect">
+          <a:avLst/>
+        </a:prstGeom>
+        <a:solidFill>
+          <a:schemeClr val="lt1">
+            <a:alpha val="90000"/>
+            <a:hueOff val="0"/>
+            <a:satOff val="0"/>
+            <a:lumOff val="0"/>
+            <a:alphaOff val="0"/>
+          </a:schemeClr>
+        </a:solidFill>
+        <a:ln w="42500" cap="flat" cmpd="sng" algn="ctr">
+          <a:solidFill>
+            <a:srgbClr val="CF364A"/>
+          </a:solidFill>
+          <a:prstDash val="solid"/>
+        </a:ln>
+        <a:effectLst/>
+      </dsp:spPr>
+      <dsp:style>
+        <a:lnRef idx="2">
+          <a:scrgbClr r="0" g="0" b="0"/>
+        </a:lnRef>
+        <a:fillRef idx="1">
+          <a:scrgbClr r="0" g="0" b="0"/>
+        </a:fillRef>
+        <a:effectRef idx="0">
+          <a:scrgbClr r="0" g="0" b="0"/>
+        </a:effectRef>
+        <a:fontRef idx="minor"/>
+      </dsp:style>
+      <dsp:txBody>
+        <a:bodyPr spcFirstLastPara="0" vert="horz" wrap="square" lIns="113792" tIns="10160" rIns="10160" bIns="10160" numCol="1" spcCol="1270" anchor="ctr" anchorCtr="0">
+          <a:noAutofit/>
+        </a:bodyPr>
+        <a:lstStyle/>
+        <a:p>
+          <a:pPr marL="171450" lvl="1" indent="-171450" algn="l" defTabSz="711200">
+            <a:lnSpc>
+              <a:spcPct val="90000"/>
+            </a:lnSpc>
+            <a:spcBef>
+              <a:spcPct val="0"/>
+            </a:spcBef>
+            <a:spcAft>
+              <a:spcPct val="15000"/>
+            </a:spcAft>
+            <a:buChar char="••"/>
+          </a:pPr>
+          <a:r>
+            <a:rPr lang="en-US" sz="1600" kern="1200" dirty="0" smtClean="0"/>
+            <a:t>Use template project from </a:t>
+          </a:r>
+          <a:r>
+            <a:rPr lang="en-US" sz="1600" b="1" kern="1200" dirty="0" smtClean="0"/>
+            <a:t>ARM::CMSIS</a:t>
+          </a:r>
+          <a:r>
+            <a:rPr lang="en-US" sz="1600" kern="1200" dirty="0" smtClean="0"/>
+            <a:t> Pack to create Flash programming algorithm</a:t>
+          </a:r>
+          <a:endParaRPr lang="en-US" sz="1600" kern="1200" dirty="0"/>
+        </a:p>
+      </dsp:txBody>
+      <dsp:txXfrm rot="-5400000">
+        <a:off x="603046" y="2318006"/>
+        <a:ext cx="8083404" cy="505299"/>
+      </dsp:txXfrm>
+    </dsp:sp>
+    <dsp:sp modelId="{03991D8D-D943-465A-BBA9-01B35A9A9A27}">
+      <dsp:nvSpPr>
+        <dsp:cNvPr id="0" name=""/>
+        <dsp:cNvSpPr/>
+      </dsp:nvSpPr>
+      <dsp:spPr>
+        <a:xfrm rot="5400000">
+          <a:off x="-129224" y="3182780"/>
+          <a:ext cx="861494" cy="603046"/>
+        </a:xfrm>
+        <a:prstGeom prst="chevron">
+          <a:avLst/>
+        </a:prstGeom>
+        <a:solidFill>
+          <a:srgbClr val="765F97"/>
+        </a:solidFill>
+        <a:ln w="42500" cap="flat" cmpd="sng" algn="ctr">
+          <a:solidFill>
+            <a:srgbClr val="765F97"/>
+          </a:solidFill>
+          <a:prstDash val="solid"/>
+        </a:ln>
+        <a:effectLst/>
+      </dsp:spPr>
+      <dsp:style>
+        <a:lnRef idx="2">
+          <a:scrgbClr r="0" g="0" b="0"/>
+        </a:lnRef>
+        <a:fillRef idx="1">
+          <a:scrgbClr r="0" g="0" b="0"/>
+        </a:fillRef>
+        <a:effectRef idx="0">
+          <a:scrgbClr r="0" g="0" b="0"/>
+        </a:effectRef>
+        <a:fontRef idx="minor">
+          <a:schemeClr val="lt1"/>
+        </a:fontRef>
+      </dsp:style>
+      <dsp:txBody>
+        <a:bodyPr spcFirstLastPara="0" vert="horz" wrap="square" lIns="10795" tIns="10795" rIns="10795" bIns="10795" numCol="1" spcCol="1270" anchor="ctr" anchorCtr="0">
+          <a:noAutofit/>
+        </a:bodyPr>
+        <a:lstStyle/>
+        <a:p>
+          <a:pPr lvl="0" algn="ctr" defTabSz="755650">
+            <a:lnSpc>
+              <a:spcPct val="90000"/>
+            </a:lnSpc>
+            <a:spcBef>
+              <a:spcPct val="0"/>
+            </a:spcBef>
+            <a:spcAft>
+              <a:spcPct val="35000"/>
+            </a:spcAft>
+          </a:pPr>
+          <a:r>
+            <a:rPr lang="en-US" sz="1700" kern="1200" dirty="0" smtClean="0"/>
+            <a:t>Debug</a:t>
+          </a:r>
+          <a:endParaRPr lang="en-US" sz="1700" kern="1200" dirty="0"/>
+        </a:p>
+      </dsp:txBody>
+      <dsp:txXfrm rot="-5400000">
+        <a:off x="0" y="3355079"/>
+        <a:ext cx="603046" cy="258448"/>
+      </dsp:txXfrm>
+    </dsp:sp>
+    <dsp:sp modelId="{5F8EC6B9-7FA8-41E5-AEC8-F776C9BC2ACF}">
+      <dsp:nvSpPr>
+        <dsp:cNvPr id="0" name=""/>
+        <dsp:cNvSpPr/>
+      </dsp:nvSpPr>
+      <dsp:spPr>
+        <a:xfrm rot="5400000">
+          <a:off x="4378430" y="-721828"/>
+          <a:ext cx="559971" cy="8110740"/>
+        </a:xfrm>
+        <a:prstGeom prst="round2SameRect">
+          <a:avLst/>
+        </a:prstGeom>
+        <a:solidFill>
+          <a:schemeClr val="bg1"/>
+        </a:solidFill>
+        <a:ln w="42500" cap="flat" cmpd="sng" algn="ctr">
+          <a:solidFill>
+            <a:srgbClr val="765F97"/>
+          </a:solidFill>
+          <a:prstDash val="solid"/>
+        </a:ln>
+        <a:effectLst/>
+      </dsp:spPr>
+      <dsp:style>
+        <a:lnRef idx="2">
+          <a:scrgbClr r="0" g="0" b="0"/>
+        </a:lnRef>
+        <a:fillRef idx="1">
+          <a:scrgbClr r="0" g="0" b="0"/>
+        </a:fillRef>
+        <a:effectRef idx="0">
+          <a:scrgbClr r="0" g="0" b="0"/>
+        </a:effectRef>
+        <a:fontRef idx="minor"/>
+      </dsp:style>
+      <dsp:txBody>
+        <a:bodyPr spcFirstLastPara="0" vert="horz" wrap="square" lIns="113792" tIns="10160" rIns="10160" bIns="10160" numCol="1" spcCol="1270" anchor="ctr" anchorCtr="0">
+          <a:noAutofit/>
+        </a:bodyPr>
+        <a:lstStyle/>
+        <a:p>
+          <a:pPr marL="171450" lvl="1" indent="-171450" algn="l" defTabSz="711200">
+            <a:lnSpc>
+              <a:spcPct val="90000"/>
+            </a:lnSpc>
+            <a:spcBef>
+              <a:spcPct val="0"/>
+            </a:spcBef>
+            <a:spcAft>
+              <a:spcPct val="15000"/>
+            </a:spcAft>
+            <a:buChar char="••"/>
+          </a:pPr>
+          <a:r>
+            <a:rPr lang="en-US" sz="1600" kern="1200" dirty="0" smtClean="0"/>
+            <a:t>Setup the CoreSight component for debug access using debug descriptions</a:t>
+          </a:r>
+          <a:endParaRPr lang="en-US" sz="1600" kern="1200" dirty="0"/>
+        </a:p>
+      </dsp:txBody>
+      <dsp:txXfrm rot="-5400000">
+        <a:off x="603046" y="3080892"/>
+        <a:ext cx="8083404" cy="505299"/>
+      </dsp:txXfrm>
+    </dsp:sp>
+    <dsp:sp modelId="{FB0EBA03-1927-40C6-831E-7FBE2EA9D2DC}">
+      <dsp:nvSpPr>
+        <dsp:cNvPr id="0" name=""/>
+        <dsp:cNvSpPr/>
+      </dsp:nvSpPr>
+      <dsp:spPr>
+        <a:xfrm rot="5400000">
+          <a:off x="-129224" y="3945665"/>
+          <a:ext cx="861494" cy="603046"/>
+        </a:xfrm>
+        <a:prstGeom prst="chevron">
+          <a:avLst/>
+        </a:prstGeom>
+        <a:solidFill>
+          <a:srgbClr val="00C3DC"/>
+        </a:solidFill>
+        <a:ln w="42500" cap="flat" cmpd="sng" algn="ctr">
+          <a:solidFill>
+            <a:srgbClr val="00C3DC"/>
+          </a:solidFill>
+          <a:prstDash val="solid"/>
+        </a:ln>
+        <a:effectLst/>
+      </dsp:spPr>
+      <dsp:style>
+        <a:lnRef idx="2">
+          <a:scrgbClr r="0" g="0" b="0"/>
+        </a:lnRef>
+        <a:fillRef idx="1">
+          <a:scrgbClr r="0" g="0" b="0"/>
+        </a:fillRef>
+        <a:effectRef idx="0">
+          <a:scrgbClr r="0" g="0" b="0"/>
+        </a:effectRef>
+        <a:fontRef idx="minor">
+          <a:schemeClr val="lt1"/>
+        </a:fontRef>
+      </dsp:style>
+      <dsp:txBody>
+        <a:bodyPr spcFirstLastPara="0" vert="horz" wrap="square" lIns="10795" tIns="10795" rIns="10795" bIns="10795" numCol="1" spcCol="1270" anchor="ctr" anchorCtr="0">
+          <a:noAutofit/>
+        </a:bodyPr>
+        <a:lstStyle/>
+        <a:p>
+          <a:pPr lvl="0" algn="ctr" defTabSz="755650">
+            <a:lnSpc>
+              <a:spcPct val="90000"/>
+            </a:lnSpc>
+            <a:spcBef>
+              <a:spcPct val="0"/>
+            </a:spcBef>
+            <a:spcAft>
+              <a:spcPct val="35000"/>
+            </a:spcAft>
+          </a:pPr>
+          <a:r>
+            <a:rPr lang="en-US" sz="1700" kern="1200" dirty="0" smtClean="0"/>
+            <a:t>Pack</a:t>
+          </a:r>
+          <a:endParaRPr lang="en-US" sz="1700" kern="1200" dirty="0"/>
+        </a:p>
+      </dsp:txBody>
+      <dsp:txXfrm rot="-5400000">
+        <a:off x="0" y="4117964"/>
+        <a:ext cx="603046" cy="258448"/>
+      </dsp:txXfrm>
+    </dsp:sp>
+    <dsp:sp modelId="{A72CA3DD-D2FB-49C0-9BFA-FE00F3A81F45}">
+      <dsp:nvSpPr>
+        <dsp:cNvPr id="0" name=""/>
+        <dsp:cNvSpPr/>
+      </dsp:nvSpPr>
+      <dsp:spPr>
+        <a:xfrm rot="5400000">
+          <a:off x="4378430" y="41057"/>
+          <a:ext cx="559971" cy="8110740"/>
+        </a:xfrm>
+        <a:prstGeom prst="round2SameRect">
+          <a:avLst/>
+        </a:prstGeom>
+        <a:solidFill>
+          <a:schemeClr val="lt1">
+            <a:alpha val="90000"/>
+            <a:hueOff val="0"/>
+            <a:satOff val="0"/>
+            <a:lumOff val="0"/>
+            <a:alphaOff val="0"/>
+          </a:schemeClr>
+        </a:solidFill>
+        <a:ln w="42500" cap="flat" cmpd="sng" algn="ctr">
+          <a:solidFill>
+            <a:srgbClr val="00C3DC"/>
+          </a:solidFill>
+          <a:prstDash val="solid"/>
+        </a:ln>
+        <a:effectLst/>
+      </dsp:spPr>
+      <dsp:style>
+        <a:lnRef idx="2">
+          <a:scrgbClr r="0" g="0" b="0"/>
+        </a:lnRef>
+        <a:fillRef idx="1">
+          <a:scrgbClr r="0" g="0" b="0"/>
+        </a:fillRef>
+        <a:effectRef idx="0">
+          <a:scrgbClr r="0" g="0" b="0"/>
+        </a:effectRef>
+        <a:fontRef idx="minor"/>
+      </dsp:style>
+      <dsp:txBody>
+        <a:bodyPr spcFirstLastPara="0" vert="horz" wrap="square" lIns="113792" tIns="10160" rIns="10160" bIns="10160" numCol="1" spcCol="1270" anchor="ctr" anchorCtr="0">
+          <a:noAutofit/>
+        </a:bodyPr>
+        <a:lstStyle/>
+        <a:p>
+          <a:pPr marL="171450" lvl="1" indent="-171450" algn="l" defTabSz="711200">
+            <a:lnSpc>
+              <a:spcPct val="90000"/>
+            </a:lnSpc>
+            <a:spcBef>
+              <a:spcPct val="0"/>
+            </a:spcBef>
+            <a:spcAft>
+              <a:spcPct val="15000"/>
+            </a:spcAft>
+            <a:buChar char="••"/>
+          </a:pPr>
+          <a:r>
+            <a:rPr lang="en-US" sz="1600" kern="1200" dirty="0" smtClean="0"/>
+            <a:t>Finalize the DFP adding the generated files and documentation, as well as features</a:t>
+          </a:r>
+          <a:endParaRPr lang="en-US" sz="1600" kern="1200" dirty="0"/>
+        </a:p>
+      </dsp:txBody>
+      <dsp:txXfrm rot="-5400000">
+        <a:off x="603046" y="3843777"/>
+        <a:ext cx="8083404" cy="505299"/>
+      </dsp:txXfrm>
+    </dsp:sp>
+  </dsp:spTree>
+</dsp:drawing>
+</file>
+
 <file path=ppt/diagrams/layout1.xml><?xml version="1.0" encoding="utf-8"?>
 <dgm:layoutDef xmlns:dgm="http://schemas.openxmlformats.org/drawingml/2006/diagram" xmlns:a="http://schemas.openxmlformats.org/drawingml/2006/main" uniqueId="urn:microsoft.com/office/officeart/2005/8/layout/hProcess9">
   <dgm:title val=""/>
@@ -1975,7 +4550,1297 @@
 </dgm:layoutDef>
 </file>
 
+<file path=ppt/diagrams/layout2.xml><?xml version="1.0" encoding="utf-8"?>
+<dgm:layoutDef xmlns:dgm="http://schemas.openxmlformats.org/drawingml/2006/diagram" xmlns:a="http://schemas.openxmlformats.org/drawingml/2006/main" uniqueId="urn:microsoft.com/office/officeart/2005/8/layout/chevron2">
+  <dgm:title val=""/>
+  <dgm:desc val=""/>
+  <dgm:catLst>
+    <dgm:cat type="process" pri="12000"/>
+    <dgm:cat type="list" pri="16000"/>
+    <dgm:cat type="convert" pri="11000"/>
+  </dgm:catLst>
+  <dgm:sampData>
+    <dgm:dataModel>
+      <dgm:ptLst>
+        <dgm:pt modelId="0" type="doc"/>
+        <dgm:pt modelId="1">
+          <dgm:prSet phldr="1"/>
+        </dgm:pt>
+        <dgm:pt modelId="11">
+          <dgm:prSet phldr="1"/>
+        </dgm:pt>
+        <dgm:pt modelId="12">
+          <dgm:prSet phldr="1"/>
+        </dgm:pt>
+        <dgm:pt modelId="2">
+          <dgm:prSet phldr="1"/>
+        </dgm:pt>
+        <dgm:pt modelId="21">
+          <dgm:prSet phldr="1"/>
+        </dgm:pt>
+        <dgm:pt modelId="22">
+          <dgm:prSet phldr="1"/>
+        </dgm:pt>
+        <dgm:pt modelId="3">
+          <dgm:prSet phldr="1"/>
+        </dgm:pt>
+        <dgm:pt modelId="31">
+          <dgm:prSet phldr="1"/>
+        </dgm:pt>
+        <dgm:pt modelId="32">
+          <dgm:prSet phldr="1"/>
+        </dgm:pt>
+      </dgm:ptLst>
+      <dgm:cxnLst>
+        <dgm:cxn modelId="4" srcId="0" destId="1" srcOrd="0" destOrd="0"/>
+        <dgm:cxn modelId="5" srcId="0" destId="2" srcOrd="1" destOrd="0"/>
+        <dgm:cxn modelId="6" srcId="0" destId="3" srcOrd="2" destOrd="0"/>
+        <dgm:cxn modelId="13" srcId="1" destId="11" srcOrd="0" destOrd="0"/>
+        <dgm:cxn modelId="14" srcId="1" destId="12" srcOrd="1" destOrd="0"/>
+        <dgm:cxn modelId="23" srcId="2" destId="21" srcOrd="0" destOrd="0"/>
+        <dgm:cxn modelId="24" srcId="2" destId="22" srcOrd="1" destOrd="0"/>
+        <dgm:cxn modelId="33" srcId="3" destId="31" srcOrd="0" destOrd="0"/>
+        <dgm:cxn modelId="34" srcId="3" destId="32" srcOrd="1" destOrd="0"/>
+      </dgm:cxnLst>
+      <dgm:bg/>
+      <dgm:whole/>
+    </dgm:dataModel>
+  </dgm:sampData>
+  <dgm:styleData>
+    <dgm:dataModel>
+      <dgm:ptLst>
+        <dgm:pt modelId="0" type="doc"/>
+        <dgm:pt modelId="1"/>
+      </dgm:ptLst>
+      <dgm:cxnLst>
+        <dgm:cxn modelId="4" srcId="0" destId="1" srcOrd="0" destOrd="0"/>
+      </dgm:cxnLst>
+      <dgm:bg/>
+      <dgm:whole/>
+    </dgm:dataModel>
+  </dgm:styleData>
+  <dgm:clrData>
+    <dgm:dataModel>
+      <dgm:ptLst>
+        <dgm:pt modelId="0" type="doc"/>
+        <dgm:pt modelId="1"/>
+        <dgm:pt modelId="11"/>
+        <dgm:pt modelId="2"/>
+        <dgm:pt modelId="21"/>
+        <dgm:pt modelId="3"/>
+        <dgm:pt modelId="31"/>
+        <dgm:pt modelId="4"/>
+        <dgm:pt modelId="41"/>
+      </dgm:ptLst>
+      <dgm:cxnLst>
+        <dgm:cxn modelId="5" srcId="0" destId="1" srcOrd="0" destOrd="0"/>
+        <dgm:cxn modelId="6" srcId="0" destId="2" srcOrd="1" destOrd="0"/>
+        <dgm:cxn modelId="7" srcId="0" destId="3" srcOrd="2" destOrd="0"/>
+        <dgm:cxn modelId="8" srcId="0" destId="4" srcOrd="3" destOrd="0"/>
+        <dgm:cxn modelId="13" srcId="1" destId="11" srcOrd="0" destOrd="0"/>
+        <dgm:cxn modelId="23" srcId="2" destId="21" srcOrd="0" destOrd="0"/>
+        <dgm:cxn modelId="33" srcId="3" destId="31" srcOrd="0" destOrd="0"/>
+        <dgm:cxn modelId="43" srcId="4" destId="41" srcOrd="0" destOrd="0"/>
+      </dgm:cxnLst>
+      <dgm:bg/>
+      <dgm:whole/>
+    </dgm:dataModel>
+  </dgm:clrData>
+  <dgm:layoutNode name="linearFlow">
+    <dgm:varLst>
+      <dgm:dir/>
+      <dgm:animLvl val="lvl"/>
+      <dgm:resizeHandles val="exact"/>
+    </dgm:varLst>
+    <dgm:alg type="lin">
+      <dgm:param type="linDir" val="fromT"/>
+      <dgm:param type="nodeHorzAlign" val="l"/>
+    </dgm:alg>
+    <dgm:shape xmlns:r="http://schemas.openxmlformats.org/officeDocument/2006/relationships" r:blip="">
+      <dgm:adjLst/>
+    </dgm:shape>
+    <dgm:presOf/>
+    <dgm:constrLst>
+      <dgm:constr type="h" for="ch" forName="composite" refType="h"/>
+      <dgm:constr type="w" for="ch" forName="composite" refType="w"/>
+      <dgm:constr type="h" for="des" forName="parentText" op="equ"/>
+      <dgm:constr type="h" for="ch" forName="sp" val="-14.88"/>
+      <dgm:constr type="h" for="ch" forName="sp" refType="w" refFor="des" refForName="parentText" op="gte" fact="-0.3"/>
+      <dgm:constr type="primFontSz" for="des" forName="parentText" op="equ" val="65"/>
+      <dgm:constr type="primFontSz" for="des" forName="descendantText" op="equ" val="65"/>
+    </dgm:constrLst>
+    <dgm:ruleLst/>
+    <dgm:forEach name="Name0" axis="ch" ptType="node">
+      <dgm:layoutNode name="composite">
+        <dgm:alg type="composite"/>
+        <dgm:shape xmlns:r="http://schemas.openxmlformats.org/officeDocument/2006/relationships" r:blip="">
+          <dgm:adjLst/>
+        </dgm:shape>
+        <dgm:presOf/>
+        <dgm:choose name="Name1">
+          <dgm:if name="Name2" func="var" arg="dir" op="equ" val="norm">
+            <dgm:constrLst>
+              <dgm:constr type="t" for="ch" forName="parentText"/>
+              <dgm:constr type="l" for="ch" forName="parentText"/>
+              <dgm:constr type="w" for="ch" forName="parentText" refType="w" fact="0.4"/>
+              <dgm:constr type="h" for="ch" forName="parentText" refType="h"/>
+              <dgm:constr type="w" for="ch" forName="parentText" refType="w" op="lte" fact="0.5"/>
+              <dgm:constr type="w" for="ch" forName="parentText" refType="h" refFor="ch" refForName="parentText" op="lte" fact="0.7"/>
+              <dgm:constr type="h" for="ch" forName="parentText" refType="w" refFor="ch" refForName="parentText" op="lte" fact="3"/>
+              <dgm:constr type="l" for="ch" forName="descendantText" refType="w" refFor="ch" refForName="parentText"/>
+              <dgm:constr type="w" for="ch" forName="descendantText" refType="w"/>
+              <dgm:constr type="wOff" for="ch" forName="descendantText" refType="w" refFor="ch" refForName="parentText" fact="-1"/>
+              <dgm:constr type="t" for="ch" forName="descendantText"/>
+              <dgm:constr type="b" for="ch" forName="descendantText" refType="h" refFor="ch" refForName="parentText"/>
+              <dgm:constr type="bOff" for="ch" forName="descendantText" refType="w" refFor="ch" refForName="parentText" fact="-0.5"/>
+            </dgm:constrLst>
+          </dgm:if>
+          <dgm:else name="Name3">
+            <dgm:constrLst>
+              <dgm:constr type="t" for="ch" forName="parentText"/>
+              <dgm:constr type="r" for="ch" forName="parentText" refType="w"/>
+              <dgm:constr type="w" for="ch" forName="parentText" refType="w" fact="0.4"/>
+              <dgm:constr type="h" for="ch" forName="parentText" refType="h"/>
+              <dgm:constr type="w" for="ch" forName="parentText" refType="w" op="lte" fact="0.5"/>
+              <dgm:constr type="w" for="ch" forName="parentText" refType="h" refFor="ch" refForName="parentText" op="lte" fact="0.7"/>
+              <dgm:constr type="h" for="ch" forName="parentText" refType="w" refFor="ch" refForName="parentText" op="lte" fact="3"/>
+              <dgm:constr type="l" for="ch" forName="descendantText"/>
+              <dgm:constr type="w" for="ch" forName="descendantText" refType="w"/>
+              <dgm:constr type="wOff" for="ch" forName="descendantText" refType="w" refFor="ch" refForName="parentText" fact="-1"/>
+              <dgm:constr type="t" for="ch" forName="descendantText"/>
+              <dgm:constr type="b" for="ch" forName="descendantText" refType="h" refFor="ch" refForName="parentText"/>
+              <dgm:constr type="bOff" for="ch" forName="descendantText" refType="w" refFor="ch" refForName="parentText" fact="-0.5"/>
+            </dgm:constrLst>
+          </dgm:else>
+        </dgm:choose>
+        <dgm:ruleLst/>
+        <dgm:layoutNode name="parentText" styleLbl="alignNode1">
+          <dgm:varLst>
+            <dgm:chMax val="1"/>
+            <dgm:bulletEnabled val="1"/>
+          </dgm:varLst>
+          <dgm:alg type="tx"/>
+          <dgm:shape xmlns:r="http://schemas.openxmlformats.org/officeDocument/2006/relationships" rot="90" type="chevron" r:blip="">
+            <dgm:adjLst/>
+          </dgm:shape>
+          <dgm:presOf axis="self" ptType="node"/>
+          <dgm:constrLst>
+            <dgm:constr type="lMarg" refType="primFontSz" fact="0.05"/>
+            <dgm:constr type="rMarg" refType="primFontSz" fact="0.05"/>
+            <dgm:constr type="tMarg" refType="primFontSz" fact="0.05"/>
+            <dgm:constr type="bMarg" refType="primFontSz" fact="0.05"/>
+          </dgm:constrLst>
+          <dgm:ruleLst>
+            <dgm:rule type="h" val="100" fact="NaN" max="NaN"/>
+            <dgm:rule type="primFontSz" val="24" fact="NaN" max="NaN"/>
+            <dgm:rule type="h" val="110" fact="NaN" max="NaN"/>
+            <dgm:rule type="primFontSz" val="18" fact="NaN" max="NaN"/>
+            <dgm:rule type="h" val="INF" fact="NaN" max="NaN"/>
+            <dgm:rule type="primFontSz" val="5" fact="NaN" max="NaN"/>
+          </dgm:ruleLst>
+        </dgm:layoutNode>
+        <dgm:layoutNode name="descendantText" styleLbl="alignAcc1">
+          <dgm:varLst>
+            <dgm:bulletEnabled val="1"/>
+          </dgm:varLst>
+          <dgm:choose name="Name4">
+            <dgm:if name="Name5" func="var" arg="dir" op="equ" val="norm">
+              <dgm:alg type="tx">
+                <dgm:param type="stBulletLvl" val="1"/>
+                <dgm:param type="txAnchorVertCh" val="mid"/>
+              </dgm:alg>
+              <dgm:shape xmlns:r="http://schemas.openxmlformats.org/officeDocument/2006/relationships" rot="90" type="round2SameRect" r:blip="">
+                <dgm:adjLst/>
+              </dgm:shape>
+            </dgm:if>
+            <dgm:else name="Name6">
+              <dgm:alg type="tx">
+                <dgm:param type="stBulletLvl" val="1"/>
+                <dgm:param type="txAnchorVertCh" val="mid"/>
+              </dgm:alg>
+              <dgm:shape xmlns:r="http://schemas.openxmlformats.org/officeDocument/2006/relationships" rot="-90" type="round2SameRect" r:blip="">
+                <dgm:adjLst/>
+              </dgm:shape>
+            </dgm:else>
+          </dgm:choose>
+          <dgm:presOf axis="des" ptType="node"/>
+          <dgm:choose name="Name7">
+            <dgm:if name="Name8" func="var" arg="dir" op="equ" val="norm">
+              <dgm:constrLst>
+                <dgm:constr type="secFontSz" refType="primFontSz"/>
+                <dgm:constr type="tMarg" refType="primFontSz" fact="0.05"/>
+                <dgm:constr type="bMarg" refType="primFontSz" fact="0.05"/>
+                <dgm:constr type="rMarg" refType="primFontSz" fact="0.05"/>
+              </dgm:constrLst>
+            </dgm:if>
+            <dgm:else name="Name9">
+              <dgm:constrLst>
+                <dgm:constr type="secFontSz" refType="primFontSz"/>
+                <dgm:constr type="tMarg" refType="primFontSz" fact="0.05"/>
+                <dgm:constr type="bMarg" refType="primFontSz" fact="0.05"/>
+                <dgm:constr type="lMarg" refType="primFontSz" fact="0.05"/>
+              </dgm:constrLst>
+            </dgm:else>
+          </dgm:choose>
+          <dgm:ruleLst>
+            <dgm:rule type="primFontSz" val="5" fact="NaN" max="NaN"/>
+          </dgm:ruleLst>
+        </dgm:layoutNode>
+      </dgm:layoutNode>
+      <dgm:forEach name="Name10" axis="followSib" ptType="sibTrans" cnt="1">
+        <dgm:layoutNode name="sp">
+          <dgm:alg type="sp"/>
+          <dgm:shape xmlns:r="http://schemas.openxmlformats.org/officeDocument/2006/relationships" r:blip="">
+            <dgm:adjLst/>
+          </dgm:shape>
+          <dgm:presOf axis="self"/>
+          <dgm:constrLst>
+            <dgm:constr type="w" val="1"/>
+            <dgm:constr type="h" val="37.5"/>
+          </dgm:constrLst>
+          <dgm:ruleLst/>
+        </dgm:layoutNode>
+      </dgm:forEach>
+    </dgm:forEach>
+  </dgm:layoutNode>
+</dgm:layoutDef>
+</file>
+
 <file path=ppt/diagrams/quickStyle1.xml><?xml version="1.0" encoding="utf-8"?>
+<dgm:styleDef xmlns:dgm="http://schemas.openxmlformats.org/drawingml/2006/diagram" xmlns:a="http://schemas.openxmlformats.org/drawingml/2006/main" uniqueId="urn:microsoft.com/office/officeart/2005/8/quickstyle/simple1">
+  <dgm:title val=""/>
+  <dgm:desc val=""/>
+  <dgm:catLst>
+    <dgm:cat type="simple" pri="10100"/>
+  </dgm:catLst>
+  <dgm:scene3d>
+    <a:camera prst="orthographicFront"/>
+    <a:lightRig rig="threePt" dir="t"/>
+  </dgm:scene3d>
+  <dgm:styleLbl name="node0">
+    <dgm:scene3d>
+      <a:camera prst="orthographicFront"/>
+      <a:lightRig rig="threePt" dir="t"/>
+    </dgm:scene3d>
+    <dgm:sp3d/>
+    <dgm:txPr/>
+    <dgm:style>
+      <a:lnRef idx="2">
+        <a:scrgbClr r="0" g="0" b="0"/>
+      </a:lnRef>
+      <a:fillRef idx="1">
+        <a:scrgbClr r="0" g="0" b="0"/>
+      </a:fillRef>
+      <a:effectRef idx="0">
+        <a:scrgbClr r="0" g="0" b="0"/>
+      </a:effectRef>
+      <a:fontRef idx="minor">
+        <a:schemeClr val="lt1"/>
+      </a:fontRef>
+    </dgm:style>
+  </dgm:styleLbl>
+  <dgm:styleLbl name="lnNode1">
+    <dgm:scene3d>
+      <a:camera prst="orthographicFront"/>
+      <a:lightRig rig="threePt" dir="t"/>
+    </dgm:scene3d>
+    <dgm:sp3d/>
+    <dgm:txPr/>
+    <dgm:style>
+      <a:lnRef idx="2">
+        <a:scrgbClr r="0" g="0" b="0"/>
+      </a:lnRef>
+      <a:fillRef idx="1">
+        <a:scrgbClr r="0" g="0" b="0"/>
+      </a:fillRef>
+      <a:effectRef idx="0">
+        <a:scrgbClr r="0" g="0" b="0"/>
+      </a:effectRef>
+      <a:fontRef idx="minor">
+        <a:schemeClr val="lt1"/>
+      </a:fontRef>
+    </dgm:style>
+  </dgm:styleLbl>
+  <dgm:styleLbl name="vennNode1">
+    <dgm:scene3d>
+      <a:camera prst="orthographicFront"/>
+      <a:lightRig rig="threePt" dir="t"/>
+    </dgm:scene3d>
+    <dgm:sp3d/>
+    <dgm:txPr/>
+    <dgm:style>
+      <a:lnRef idx="2">
+        <a:scrgbClr r="0" g="0" b="0"/>
+      </a:lnRef>
+      <a:fillRef idx="1">
+        <a:scrgbClr r="0" g="0" b="0"/>
+      </a:fillRef>
+      <a:effectRef idx="0">
+        <a:scrgbClr r="0" g="0" b="0"/>
+      </a:effectRef>
+      <a:fontRef idx="minor">
+        <a:schemeClr val="tx1"/>
+      </a:fontRef>
+    </dgm:style>
+  </dgm:styleLbl>
+  <dgm:styleLbl name="alignNode1">
+    <dgm:scene3d>
+      <a:camera prst="orthographicFront"/>
+      <a:lightRig rig="threePt" dir="t"/>
+    </dgm:scene3d>
+    <dgm:sp3d/>
+    <dgm:txPr/>
+    <dgm:style>
+      <a:lnRef idx="2">
+        <a:scrgbClr r="0" g="0" b="0"/>
+      </a:lnRef>
+      <a:fillRef idx="1">
+        <a:scrgbClr r="0" g="0" b="0"/>
+      </a:fillRef>
+      <a:effectRef idx="0">
+        <a:scrgbClr r="0" g="0" b="0"/>
+      </a:effectRef>
+      <a:fontRef idx="minor">
+        <a:schemeClr val="lt1"/>
+      </a:fontRef>
+    </dgm:style>
+  </dgm:styleLbl>
+  <dgm:styleLbl name="node1">
+    <dgm:scene3d>
+      <a:camera prst="orthographicFront"/>
+      <a:lightRig rig="threePt" dir="t"/>
+    </dgm:scene3d>
+    <dgm:sp3d/>
+    <dgm:txPr/>
+    <dgm:style>
+      <a:lnRef idx="2">
+        <a:scrgbClr r="0" g="0" b="0"/>
+      </a:lnRef>
+      <a:fillRef idx="1">
+        <a:scrgbClr r="0" g="0" b="0"/>
+      </a:fillRef>
+      <a:effectRef idx="0">
+        <a:scrgbClr r="0" g="0" b="0"/>
+      </a:effectRef>
+      <a:fontRef idx="minor">
+        <a:schemeClr val="lt1"/>
+      </a:fontRef>
+    </dgm:style>
+  </dgm:styleLbl>
+  <dgm:styleLbl name="node2">
+    <dgm:scene3d>
+      <a:camera prst="orthographicFront"/>
+      <a:lightRig rig="threePt" dir="t"/>
+    </dgm:scene3d>
+    <dgm:sp3d/>
+    <dgm:txPr/>
+    <dgm:style>
+      <a:lnRef idx="2">
+        <a:scrgbClr r="0" g="0" b="0"/>
+      </a:lnRef>
+      <a:fillRef idx="1">
+        <a:scrgbClr r="0" g="0" b="0"/>
+      </a:fillRef>
+      <a:effectRef idx="0">
+        <a:scrgbClr r="0" g="0" b="0"/>
+      </a:effectRef>
+      <a:fontRef idx="minor">
+        <a:schemeClr val="lt1"/>
+      </a:fontRef>
+    </dgm:style>
+  </dgm:styleLbl>
+  <dgm:styleLbl name="node3">
+    <dgm:scene3d>
+      <a:camera prst="orthographicFront"/>
+      <a:lightRig rig="threePt" dir="t"/>
+    </dgm:scene3d>
+    <dgm:sp3d/>
+    <dgm:txPr/>
+    <dgm:style>
+      <a:lnRef idx="2">
+        <a:scrgbClr r="0" g="0" b="0"/>
+      </a:lnRef>
+      <a:fillRef idx="1">
+        <a:scrgbClr r="0" g="0" b="0"/>
+      </a:fillRef>
+      <a:effectRef idx="0">
+        <a:scrgbClr r="0" g="0" b="0"/>
+      </a:effectRef>
+      <a:fontRef idx="minor">
+        <a:schemeClr val="lt1"/>
+      </a:fontRef>
+    </dgm:style>
+  </dgm:styleLbl>
+  <dgm:styleLbl name="node4">
+    <dgm:scene3d>
+      <a:camera prst="orthographicFront"/>
+      <a:lightRig rig="threePt" dir="t"/>
+    </dgm:scene3d>
+    <dgm:sp3d/>
+    <dgm:txPr/>
+    <dgm:style>
+      <a:lnRef idx="2">
+        <a:scrgbClr r="0" g="0" b="0"/>
+      </a:lnRef>
+      <a:fillRef idx="1">
+        <a:scrgbClr r="0" g="0" b="0"/>
+      </a:fillRef>
+      <a:effectRef idx="0">
+        <a:scrgbClr r="0" g="0" b="0"/>
+      </a:effectRef>
+      <a:fontRef idx="minor">
+        <a:schemeClr val="lt1"/>
+      </a:fontRef>
+    </dgm:style>
+  </dgm:styleLbl>
+  <dgm:styleLbl name="fgImgPlace1">
+    <dgm:scene3d>
+      <a:camera prst="orthographicFront"/>
+      <a:lightRig rig="threePt" dir="t"/>
+    </dgm:scene3d>
+    <dgm:sp3d/>
+    <dgm:txPr/>
+    <dgm:style>
+      <a:lnRef idx="2">
+        <a:scrgbClr r="0" g="0" b="0"/>
+      </a:lnRef>
+      <a:fillRef idx="1">
+        <a:scrgbClr r="0" g="0" b="0"/>
+      </a:fillRef>
+      <a:effectRef idx="0">
+        <a:scrgbClr r="0" g="0" b="0"/>
+      </a:effectRef>
+      <a:fontRef idx="minor"/>
+    </dgm:style>
+  </dgm:styleLbl>
+  <dgm:styleLbl name="alignImgPlace1">
+    <dgm:scene3d>
+      <a:camera prst="orthographicFront"/>
+      <a:lightRig rig="threePt" dir="t"/>
+    </dgm:scene3d>
+    <dgm:sp3d/>
+    <dgm:txPr/>
+    <dgm:style>
+      <a:lnRef idx="2">
+        <a:scrgbClr r="0" g="0" b="0"/>
+      </a:lnRef>
+      <a:fillRef idx="1">
+        <a:scrgbClr r="0" g="0" b="0"/>
+      </a:fillRef>
+      <a:effectRef idx="0">
+        <a:scrgbClr r="0" g="0" b="0"/>
+      </a:effectRef>
+      <a:fontRef idx="minor"/>
+    </dgm:style>
+  </dgm:styleLbl>
+  <dgm:styleLbl name="bgImgPlace1">
+    <dgm:scene3d>
+      <a:camera prst="orthographicFront"/>
+      <a:lightRig rig="threePt" dir="t"/>
+    </dgm:scene3d>
+    <dgm:sp3d/>
+    <dgm:txPr/>
+    <dgm:style>
+      <a:lnRef idx="2">
+        <a:scrgbClr r="0" g="0" b="0"/>
+      </a:lnRef>
+      <a:fillRef idx="1">
+        <a:scrgbClr r="0" g="0" b="0"/>
+      </a:fillRef>
+      <a:effectRef idx="0">
+        <a:scrgbClr r="0" g="0" b="0"/>
+      </a:effectRef>
+      <a:fontRef idx="minor"/>
+    </dgm:style>
+  </dgm:styleLbl>
+  <dgm:styleLbl name="sibTrans2D1">
+    <dgm:scene3d>
+      <a:camera prst="orthographicFront"/>
+      <a:lightRig rig="threePt" dir="t"/>
+    </dgm:scene3d>
+    <dgm:sp3d/>
+    <dgm:txPr/>
+    <dgm:style>
+      <a:lnRef idx="0">
+        <a:scrgbClr r="0" g="0" b="0"/>
+      </a:lnRef>
+      <a:fillRef idx="1">
+        <a:scrgbClr r="0" g="0" b="0"/>
+      </a:fillRef>
+      <a:effectRef idx="0">
+        <a:scrgbClr r="0" g="0" b="0"/>
+      </a:effectRef>
+      <a:fontRef idx="minor">
+        <a:schemeClr val="lt1"/>
+      </a:fontRef>
+    </dgm:style>
+  </dgm:styleLbl>
+  <dgm:styleLbl name="fgSibTrans2D1">
+    <dgm:scene3d>
+      <a:camera prst="orthographicFront"/>
+      <a:lightRig rig="threePt" dir="t"/>
+    </dgm:scene3d>
+    <dgm:sp3d/>
+    <dgm:txPr/>
+    <dgm:style>
+      <a:lnRef idx="0">
+        <a:scrgbClr r="0" g="0" b="0"/>
+      </a:lnRef>
+      <a:fillRef idx="1">
+        <a:scrgbClr r="0" g="0" b="0"/>
+      </a:fillRef>
+      <a:effectRef idx="0">
+        <a:scrgbClr r="0" g="0" b="0"/>
+      </a:effectRef>
+      <a:fontRef idx="minor">
+        <a:schemeClr val="lt1"/>
+      </a:fontRef>
+    </dgm:style>
+  </dgm:styleLbl>
+  <dgm:styleLbl name="bgSibTrans2D1">
+    <dgm:scene3d>
+      <a:camera prst="orthographicFront"/>
+      <a:lightRig rig="threePt" dir="t"/>
+    </dgm:scene3d>
+    <dgm:sp3d/>
+    <dgm:txPr/>
+    <dgm:style>
+      <a:lnRef idx="0">
+        <a:scrgbClr r="0" g="0" b="0"/>
+      </a:lnRef>
+      <a:fillRef idx="1">
+        <a:scrgbClr r="0" g="0" b="0"/>
+      </a:fillRef>
+      <a:effectRef idx="0">
+        <a:scrgbClr r="0" g="0" b="0"/>
+      </a:effectRef>
+      <a:fontRef idx="minor">
+        <a:schemeClr val="lt1"/>
+      </a:fontRef>
+    </dgm:style>
+  </dgm:styleLbl>
+  <dgm:styleLbl name="sibTrans1D1">
+    <dgm:scene3d>
+      <a:camera prst="orthographicFront"/>
+      <a:lightRig rig="threePt" dir="t"/>
+    </dgm:scene3d>
+    <dgm:sp3d/>
+    <dgm:txPr/>
+    <dgm:style>
+      <a:lnRef idx="1">
+        <a:scrgbClr r="0" g="0" b="0"/>
+      </a:lnRef>
+      <a:fillRef idx="0">
+        <a:scrgbClr r="0" g="0" b="0"/>
+      </a:fillRef>
+      <a:effectRef idx="0">
+        <a:scrgbClr r="0" g="0" b="0"/>
+      </a:effectRef>
+      <a:fontRef idx="minor"/>
+    </dgm:style>
+  </dgm:styleLbl>
+  <dgm:styleLbl name="callout">
+    <dgm:scene3d>
+      <a:camera prst="orthographicFront"/>
+      <a:lightRig rig="threePt" dir="t"/>
+    </dgm:scene3d>
+    <dgm:sp3d/>
+    <dgm:txPr/>
+    <dgm:style>
+      <a:lnRef idx="2">
+        <a:scrgbClr r="0" g="0" b="0"/>
+      </a:lnRef>
+      <a:fillRef idx="1">
+        <a:scrgbClr r="0" g="0" b="0"/>
+      </a:fillRef>
+      <a:effectRef idx="0">
+        <a:scrgbClr r="0" g="0" b="0"/>
+      </a:effectRef>
+      <a:fontRef idx="minor"/>
+    </dgm:style>
+  </dgm:styleLbl>
+  <dgm:styleLbl name="asst0">
+    <dgm:scene3d>
+      <a:camera prst="orthographicFront"/>
+      <a:lightRig rig="threePt" dir="t"/>
+    </dgm:scene3d>
+    <dgm:sp3d/>
+    <dgm:txPr/>
+    <dgm:style>
+      <a:lnRef idx="2">
+        <a:scrgbClr r="0" g="0" b="0"/>
+      </a:lnRef>
+      <a:fillRef idx="1">
+        <a:scrgbClr r="0" g="0" b="0"/>
+      </a:fillRef>
+      <a:effectRef idx="0">
+        <a:scrgbClr r="0" g="0" b="0"/>
+      </a:effectRef>
+      <a:fontRef idx="minor">
+        <a:schemeClr val="lt1"/>
+      </a:fontRef>
+    </dgm:style>
+  </dgm:styleLbl>
+  <dgm:styleLbl name="asst1">
+    <dgm:scene3d>
+      <a:camera prst="orthographicFront"/>
+      <a:lightRig rig="threePt" dir="t"/>
+    </dgm:scene3d>
+    <dgm:sp3d/>
+    <dgm:txPr/>
+    <dgm:style>
+      <a:lnRef idx="2">
+        <a:scrgbClr r="0" g="0" b="0"/>
+      </a:lnRef>
+      <a:fillRef idx="1">
+        <a:scrgbClr r="0" g="0" b="0"/>
+      </a:fillRef>
+      <a:effectRef idx="0">
+        <a:scrgbClr r="0" g="0" b="0"/>
+      </a:effectRef>
+      <a:fontRef idx="minor">
+        <a:schemeClr val="lt1"/>
+      </a:fontRef>
+    </dgm:style>
+  </dgm:styleLbl>
+  <dgm:styleLbl name="asst2">
+    <dgm:scene3d>
+      <a:camera prst="orthographicFront"/>
+      <a:lightRig rig="threePt" dir="t"/>
+    </dgm:scene3d>
+    <dgm:sp3d/>
+    <dgm:txPr/>
+    <dgm:style>
+      <a:lnRef idx="2">
+        <a:scrgbClr r="0" g="0" b="0"/>
+      </a:lnRef>
+      <a:fillRef idx="1">
+        <a:scrgbClr r="0" g="0" b="0"/>
+      </a:fillRef>
+      <a:effectRef idx="0">
+        <a:scrgbClr r="0" g="0" b="0"/>
+      </a:effectRef>
+      <a:fontRef idx="minor">
+        <a:schemeClr val="lt1"/>
+      </a:fontRef>
+    </dgm:style>
+  </dgm:styleLbl>
+  <dgm:styleLbl name="asst3">
+    <dgm:scene3d>
+      <a:camera prst="orthographicFront"/>
+      <a:lightRig rig="threePt" dir="t"/>
+    </dgm:scene3d>
+    <dgm:sp3d/>
+    <dgm:txPr/>
+    <dgm:style>
+      <a:lnRef idx="2">
+        <a:scrgbClr r="0" g="0" b="0"/>
+      </a:lnRef>
+      <a:fillRef idx="1">
+        <a:scrgbClr r="0" g="0" b="0"/>
+      </a:fillRef>
+      <a:effectRef idx="0">
+        <a:scrgbClr r="0" g="0" b="0"/>
+      </a:effectRef>
+      <a:fontRef idx="minor">
+        <a:schemeClr val="lt1"/>
+      </a:fontRef>
+    </dgm:style>
+  </dgm:styleLbl>
+  <dgm:styleLbl name="asst4">
+    <dgm:scene3d>
+      <a:camera prst="orthographicFront"/>
+      <a:lightRig rig="threePt" dir="t"/>
+    </dgm:scene3d>
+    <dgm:sp3d/>
+    <dgm:txPr/>
+    <dgm:style>
+      <a:lnRef idx="2">
+        <a:scrgbClr r="0" g="0" b="0"/>
+      </a:lnRef>
+      <a:fillRef idx="1">
+        <a:scrgbClr r="0" g="0" b="0"/>
+      </a:fillRef>
+      <a:effectRef idx="0">
+        <a:scrgbClr r="0" g="0" b="0"/>
+      </a:effectRef>
+      <a:fontRef idx="minor">
+        <a:schemeClr val="lt1"/>
+      </a:fontRef>
+    </dgm:style>
+  </dgm:styleLbl>
+  <dgm:styleLbl name="parChTrans2D1">
+    <dgm:scene3d>
+      <a:camera prst="orthographicFront"/>
+      <a:lightRig rig="threePt" dir="t"/>
+    </dgm:scene3d>
+    <dgm:sp3d/>
+    <dgm:txPr/>
+    <dgm:style>
+      <a:lnRef idx="2">
+        <a:scrgbClr r="0" g="0" b="0"/>
+      </a:lnRef>
+      <a:fillRef idx="1">
+        <a:scrgbClr r="0" g="0" b="0"/>
+      </a:fillRef>
+      <a:effectRef idx="0">
+        <a:scrgbClr r="0" g="0" b="0"/>
+      </a:effectRef>
+      <a:fontRef idx="minor">
+        <a:schemeClr val="lt1"/>
+      </a:fontRef>
+    </dgm:style>
+  </dgm:styleLbl>
+  <dgm:styleLbl name="parChTrans2D2">
+    <dgm:scene3d>
+      <a:camera prst="orthographicFront"/>
+      <a:lightRig rig="threePt" dir="t"/>
+    </dgm:scene3d>
+    <dgm:sp3d/>
+    <dgm:txPr/>
+    <dgm:style>
+      <a:lnRef idx="2">
+        <a:scrgbClr r="0" g="0" b="0"/>
+      </a:lnRef>
+      <a:fillRef idx="1">
+        <a:scrgbClr r="0" g="0" b="0"/>
+      </a:fillRef>
+      <a:effectRef idx="0">
+        <a:scrgbClr r="0" g="0" b="0"/>
+      </a:effectRef>
+      <a:fontRef idx="minor">
+        <a:schemeClr val="lt1"/>
+      </a:fontRef>
+    </dgm:style>
+  </dgm:styleLbl>
+  <dgm:styleLbl name="parChTrans2D3">
+    <dgm:scene3d>
+      <a:camera prst="orthographicFront"/>
+      <a:lightRig rig="threePt" dir="t"/>
+    </dgm:scene3d>
+    <dgm:sp3d/>
+    <dgm:txPr/>
+    <dgm:style>
+      <a:lnRef idx="2">
+        <a:scrgbClr r="0" g="0" b="0"/>
+      </a:lnRef>
+      <a:fillRef idx="1">
+        <a:scrgbClr r="0" g="0" b="0"/>
+      </a:fillRef>
+      <a:effectRef idx="0">
+        <a:scrgbClr r="0" g="0" b="0"/>
+      </a:effectRef>
+      <a:fontRef idx="minor">
+        <a:schemeClr val="lt1"/>
+      </a:fontRef>
+    </dgm:style>
+  </dgm:styleLbl>
+  <dgm:styleLbl name="parChTrans2D4">
+    <dgm:scene3d>
+      <a:camera prst="orthographicFront"/>
+      <a:lightRig rig="threePt" dir="t"/>
+    </dgm:scene3d>
+    <dgm:sp3d/>
+    <dgm:txPr/>
+    <dgm:style>
+      <a:lnRef idx="2">
+        <a:scrgbClr r="0" g="0" b="0"/>
+      </a:lnRef>
+      <a:fillRef idx="1">
+        <a:scrgbClr r="0" g="0" b="0"/>
+      </a:fillRef>
+      <a:effectRef idx="0">
+        <a:scrgbClr r="0" g="0" b="0"/>
+      </a:effectRef>
+      <a:fontRef idx="minor">
+        <a:schemeClr val="lt1"/>
+      </a:fontRef>
+    </dgm:style>
+  </dgm:styleLbl>
+  <dgm:styleLbl name="parChTrans1D1">
+    <dgm:scene3d>
+      <a:camera prst="orthographicFront"/>
+      <a:lightRig rig="threePt" dir="t"/>
+    </dgm:scene3d>
+    <dgm:sp3d/>
+    <dgm:txPr/>
+    <dgm:style>
+      <a:lnRef idx="2">
+        <a:scrgbClr r="0" g="0" b="0"/>
+      </a:lnRef>
+      <a:fillRef idx="0">
+        <a:scrgbClr r="0" g="0" b="0"/>
+      </a:fillRef>
+      <a:effectRef idx="0">
+        <a:scrgbClr r="0" g="0" b="0"/>
+      </a:effectRef>
+      <a:fontRef idx="minor"/>
+    </dgm:style>
+  </dgm:styleLbl>
+  <dgm:styleLbl name="parChTrans1D2">
+    <dgm:scene3d>
+      <a:camera prst="orthographicFront"/>
+      <a:lightRig rig="threePt" dir="t"/>
+    </dgm:scene3d>
+    <dgm:sp3d/>
+    <dgm:txPr/>
+    <dgm:style>
+      <a:lnRef idx="2">
+        <a:scrgbClr r="0" g="0" b="0"/>
+      </a:lnRef>
+      <a:fillRef idx="0">
+        <a:scrgbClr r="0" g="0" b="0"/>
+      </a:fillRef>
+      <a:effectRef idx="0">
+        <a:scrgbClr r="0" g="0" b="0"/>
+      </a:effectRef>
+      <a:fontRef idx="minor"/>
+    </dgm:style>
+  </dgm:styleLbl>
+  <dgm:styleLbl name="parChTrans1D3">
+    <dgm:scene3d>
+      <a:camera prst="orthographicFront"/>
+      <a:lightRig rig="threePt" dir="t"/>
+    </dgm:scene3d>
+    <dgm:sp3d/>
+    <dgm:txPr/>
+    <dgm:style>
+      <a:lnRef idx="2">
+        <a:scrgbClr r="0" g="0" b="0"/>
+      </a:lnRef>
+      <a:fillRef idx="0">
+        <a:scrgbClr r="0" g="0" b="0"/>
+      </a:fillRef>
+      <a:effectRef idx="0">
+        <a:scrgbClr r="0" g="0" b="0"/>
+      </a:effectRef>
+      <a:fontRef idx="minor"/>
+    </dgm:style>
+  </dgm:styleLbl>
+  <dgm:styleLbl name="parChTrans1D4">
+    <dgm:scene3d>
+      <a:camera prst="orthographicFront"/>
+      <a:lightRig rig="threePt" dir="t"/>
+    </dgm:scene3d>
+    <dgm:sp3d/>
+    <dgm:txPr/>
+    <dgm:style>
+      <a:lnRef idx="2">
+        <a:scrgbClr r="0" g="0" b="0"/>
+      </a:lnRef>
+      <a:fillRef idx="0">
+        <a:scrgbClr r="0" g="0" b="0"/>
+      </a:fillRef>
+      <a:effectRef idx="0">
+        <a:scrgbClr r="0" g="0" b="0"/>
+      </a:effectRef>
+      <a:fontRef idx="minor"/>
+    </dgm:style>
+  </dgm:styleLbl>
+  <dgm:styleLbl name="fgAcc1">
+    <dgm:scene3d>
+      <a:camera prst="orthographicFront"/>
+      <a:lightRig rig="threePt" dir="t"/>
+    </dgm:scene3d>
+    <dgm:sp3d/>
+    <dgm:txPr/>
+    <dgm:style>
+      <a:lnRef idx="2">
+        <a:scrgbClr r="0" g="0" b="0"/>
+      </a:lnRef>
+      <a:fillRef idx="1">
+        <a:scrgbClr r="0" g="0" b="0"/>
+      </a:fillRef>
+      <a:effectRef idx="0">
+        <a:scrgbClr r="0" g="0" b="0"/>
+      </a:effectRef>
+      <a:fontRef idx="minor"/>
+    </dgm:style>
+  </dgm:styleLbl>
+  <dgm:styleLbl name="conFgAcc1">
+    <dgm:scene3d>
+      <a:camera prst="orthographicFront"/>
+      <a:lightRig rig="threePt" dir="t"/>
+    </dgm:scene3d>
+    <dgm:sp3d/>
+    <dgm:txPr/>
+    <dgm:style>
+      <a:lnRef idx="2">
+        <a:scrgbClr r="0" g="0" b="0"/>
+      </a:lnRef>
+      <a:fillRef idx="1">
+        <a:scrgbClr r="0" g="0" b="0"/>
+      </a:fillRef>
+      <a:effectRef idx="0">
+        <a:scrgbClr r="0" g="0" b="0"/>
+      </a:effectRef>
+      <a:fontRef idx="minor"/>
+    </dgm:style>
+  </dgm:styleLbl>
+  <dgm:styleLbl name="alignAcc1">
+    <dgm:scene3d>
+      <a:camera prst="orthographicFront"/>
+      <a:lightRig rig="threePt" dir="t"/>
+    </dgm:scene3d>
+    <dgm:sp3d/>
+    <dgm:txPr/>
+    <dgm:style>
+      <a:lnRef idx="2">
+        <a:scrgbClr r="0" g="0" b="0"/>
+      </a:lnRef>
+      <a:fillRef idx="1">
+        <a:scrgbClr r="0" g="0" b="0"/>
+      </a:fillRef>
+      <a:effectRef idx="0">
+        <a:scrgbClr r="0" g="0" b="0"/>
+      </a:effectRef>
+      <a:fontRef idx="minor"/>
+    </dgm:style>
+  </dgm:styleLbl>
+  <dgm:styleLbl name="trAlignAcc1">
+    <dgm:scene3d>
+      <a:camera prst="orthographicFront"/>
+      <a:lightRig rig="threePt" dir="t"/>
+    </dgm:scene3d>
+    <dgm:sp3d/>
+    <dgm:txPr/>
+    <dgm:style>
+      <a:lnRef idx="1">
+        <a:scrgbClr r="0" g="0" b="0"/>
+      </a:lnRef>
+      <a:fillRef idx="1">
+        <a:scrgbClr r="0" g="0" b="0"/>
+      </a:fillRef>
+      <a:effectRef idx="0">
+        <a:scrgbClr r="0" g="0" b="0"/>
+      </a:effectRef>
+      <a:fontRef idx="minor"/>
+    </dgm:style>
+  </dgm:styleLbl>
+  <dgm:styleLbl name="bgAcc1">
+    <dgm:scene3d>
+      <a:camera prst="orthographicFront"/>
+      <a:lightRig rig="threePt" dir="t"/>
+    </dgm:scene3d>
+    <dgm:sp3d/>
+    <dgm:txPr/>
+    <dgm:style>
+      <a:lnRef idx="2">
+        <a:scrgbClr r="0" g="0" b="0"/>
+      </a:lnRef>
+      <a:fillRef idx="1">
+        <a:scrgbClr r="0" g="0" b="0"/>
+      </a:fillRef>
+      <a:effectRef idx="0">
+        <a:scrgbClr r="0" g="0" b="0"/>
+      </a:effectRef>
+      <a:fontRef idx="minor"/>
+    </dgm:style>
+  </dgm:styleLbl>
+  <dgm:styleLbl name="solidFgAcc1">
+    <dgm:scene3d>
+      <a:camera prst="orthographicFront"/>
+      <a:lightRig rig="threePt" dir="t"/>
+    </dgm:scene3d>
+    <dgm:sp3d/>
+    <dgm:txPr/>
+    <dgm:style>
+      <a:lnRef idx="2">
+        <a:scrgbClr r="0" g="0" b="0"/>
+      </a:lnRef>
+      <a:fillRef idx="1">
+        <a:scrgbClr r="0" g="0" b="0"/>
+      </a:fillRef>
+      <a:effectRef idx="0">
+        <a:scrgbClr r="0" g="0" b="0"/>
+      </a:effectRef>
+      <a:fontRef idx="minor"/>
+    </dgm:style>
+  </dgm:styleLbl>
+  <dgm:styleLbl name="solidAlignAcc1">
+    <dgm:scene3d>
+      <a:camera prst="orthographicFront"/>
+      <a:lightRig rig="threePt" dir="t"/>
+    </dgm:scene3d>
+    <dgm:sp3d/>
+    <dgm:txPr/>
+    <dgm:style>
+      <a:lnRef idx="2">
+        <a:scrgbClr r="0" g="0" b="0"/>
+      </a:lnRef>
+      <a:fillRef idx="1">
+        <a:scrgbClr r="0" g="0" b="0"/>
+      </a:fillRef>
+      <a:effectRef idx="0">
+        <a:scrgbClr r="0" g="0" b="0"/>
+      </a:effectRef>
+      <a:fontRef idx="minor"/>
+    </dgm:style>
+  </dgm:styleLbl>
+  <dgm:styleLbl name="solidBgAcc1">
+    <dgm:scene3d>
+      <a:camera prst="orthographicFront"/>
+      <a:lightRig rig="threePt" dir="t"/>
+    </dgm:scene3d>
+    <dgm:sp3d/>
+    <dgm:txPr/>
+    <dgm:style>
+      <a:lnRef idx="2">
+        <a:scrgbClr r="0" g="0" b="0"/>
+      </a:lnRef>
+      <a:fillRef idx="1">
+        <a:scrgbClr r="0" g="0" b="0"/>
+      </a:fillRef>
+      <a:effectRef idx="0">
+        <a:scrgbClr r="0" g="0" b="0"/>
+      </a:effectRef>
+      <a:fontRef idx="minor"/>
+    </dgm:style>
+  </dgm:styleLbl>
+  <dgm:styleLbl name="fgAccFollowNode1">
+    <dgm:scene3d>
+      <a:camera prst="orthographicFront"/>
+      <a:lightRig rig="threePt" dir="t"/>
+    </dgm:scene3d>
+    <dgm:sp3d/>
+    <dgm:txPr/>
+    <dgm:style>
+      <a:lnRef idx="2">
+        <a:scrgbClr r="0" g="0" b="0"/>
+      </a:lnRef>
+      <a:fillRef idx="1">
+        <a:scrgbClr r="0" g="0" b="0"/>
+      </a:fillRef>
+      <a:effectRef idx="0">
+        <a:scrgbClr r="0" g="0" b="0"/>
+      </a:effectRef>
+      <a:fontRef idx="minor"/>
+    </dgm:style>
+  </dgm:styleLbl>
+  <dgm:styleLbl name="alignAccFollowNode1">
+    <dgm:scene3d>
+      <a:camera prst="orthographicFront"/>
+      <a:lightRig rig="threePt" dir="t"/>
+    </dgm:scene3d>
+    <dgm:sp3d/>
+    <dgm:txPr/>
+    <dgm:style>
+      <a:lnRef idx="2">
+        <a:scrgbClr r="0" g="0" b="0"/>
+      </a:lnRef>
+      <a:fillRef idx="1">
+        <a:scrgbClr r="0" g="0" b="0"/>
+      </a:fillRef>
+      <a:effectRef idx="0">
+        <a:scrgbClr r="0" g="0" b="0"/>
+      </a:effectRef>
+      <a:fontRef idx="minor"/>
+    </dgm:style>
+  </dgm:styleLbl>
+  <dgm:styleLbl name="bgAccFollowNode1">
+    <dgm:scene3d>
+      <a:camera prst="orthographicFront"/>
+      <a:lightRig rig="threePt" dir="t"/>
+    </dgm:scene3d>
+    <dgm:sp3d/>
+    <dgm:txPr/>
+    <dgm:style>
+      <a:lnRef idx="2">
+        <a:scrgbClr r="0" g="0" b="0"/>
+      </a:lnRef>
+      <a:fillRef idx="1">
+        <a:scrgbClr r="0" g="0" b="0"/>
+      </a:fillRef>
+      <a:effectRef idx="0">
+        <a:scrgbClr r="0" g="0" b="0"/>
+      </a:effectRef>
+      <a:fontRef idx="minor"/>
+    </dgm:style>
+  </dgm:styleLbl>
+  <dgm:styleLbl name="fgAcc0">
+    <dgm:scene3d>
+      <a:camera prst="orthographicFront"/>
+      <a:lightRig rig="threePt" dir="t"/>
+    </dgm:scene3d>
+    <dgm:sp3d/>
+    <dgm:txPr/>
+    <dgm:style>
+      <a:lnRef idx="2">
+        <a:scrgbClr r="0" g="0" b="0"/>
+      </a:lnRef>
+      <a:fillRef idx="1">
+        <a:scrgbClr r="0" g="0" b="0"/>
+      </a:fillRef>
+      <a:effectRef idx="0">
+        <a:scrgbClr r="0" g="0" b="0"/>
+      </a:effectRef>
+      <a:fontRef idx="minor"/>
+    </dgm:style>
+  </dgm:styleLbl>
+  <dgm:styleLbl name="fgAcc2">
+    <dgm:scene3d>
+      <a:camera prst="orthographicFront"/>
+      <a:lightRig rig="threePt" dir="t"/>
+    </dgm:scene3d>
+    <dgm:sp3d/>
+    <dgm:txPr/>
+    <dgm:style>
+      <a:lnRef idx="2">
+        <a:scrgbClr r="0" g="0" b="0"/>
+      </a:lnRef>
+      <a:fillRef idx="1">
+        <a:scrgbClr r="0" g="0" b="0"/>
+      </a:fillRef>
+      <a:effectRef idx="0">
+        <a:scrgbClr r="0" g="0" b="0"/>
+      </a:effectRef>
+      <a:fontRef idx="minor"/>
+    </dgm:style>
+  </dgm:styleLbl>
+  <dgm:styleLbl name="fgAcc3">
+    <dgm:scene3d>
+      <a:camera prst="orthographicFront"/>
+      <a:lightRig rig="threePt" dir="t"/>
+    </dgm:scene3d>
+    <dgm:sp3d/>
+    <dgm:txPr/>
+    <dgm:style>
+      <a:lnRef idx="2">
+        <a:scrgbClr r="0" g="0" b="0"/>
+      </a:lnRef>
+      <a:fillRef idx="1">
+        <a:scrgbClr r="0" g="0" b="0"/>
+      </a:fillRef>
+      <a:effectRef idx="0">
+        <a:scrgbClr r="0" g="0" b="0"/>
+      </a:effectRef>
+      <a:fontRef idx="minor"/>
+    </dgm:style>
+  </dgm:styleLbl>
+  <dgm:styleLbl name="fgAcc4">
+    <dgm:scene3d>
+      <a:camera prst="orthographicFront"/>
+      <a:lightRig rig="threePt" dir="t"/>
+    </dgm:scene3d>
+    <dgm:sp3d/>
+    <dgm:txPr/>
+    <dgm:style>
+      <a:lnRef idx="2">
+        <a:scrgbClr r="0" g="0" b="0"/>
+      </a:lnRef>
+      <a:fillRef idx="1">
+        <a:scrgbClr r="0" g="0" b="0"/>
+      </a:fillRef>
+      <a:effectRef idx="0">
+        <a:scrgbClr r="0" g="0" b="0"/>
+      </a:effectRef>
+      <a:fontRef idx="minor"/>
+    </dgm:style>
+  </dgm:styleLbl>
+  <dgm:styleLbl name="bgShp">
+    <dgm:scene3d>
+      <a:camera prst="orthographicFront"/>
+      <a:lightRig rig="threePt" dir="t"/>
+    </dgm:scene3d>
+    <dgm:sp3d/>
+    <dgm:txPr/>
+    <dgm:style>
+      <a:lnRef idx="0">
+        <a:scrgbClr r="0" g="0" b="0"/>
+      </a:lnRef>
+      <a:fillRef idx="1">
+        <a:scrgbClr r="0" g="0" b="0"/>
+      </a:fillRef>
+      <a:effectRef idx="0">
+        <a:scrgbClr r="0" g="0" b="0"/>
+      </a:effectRef>
+      <a:fontRef idx="minor"/>
+    </dgm:style>
+  </dgm:styleLbl>
+  <dgm:styleLbl name="dkBgShp">
+    <dgm:scene3d>
+      <a:camera prst="orthographicFront"/>
+      <a:lightRig rig="threePt" dir="t"/>
+    </dgm:scene3d>
+    <dgm:sp3d/>
+    <dgm:txPr/>
+    <dgm:style>
+      <a:lnRef idx="0">
+        <a:scrgbClr r="0" g="0" b="0"/>
+      </a:lnRef>
+      <a:fillRef idx="1">
+        <a:scrgbClr r="0" g="0" b="0"/>
+      </a:fillRef>
+      <a:effectRef idx="0">
+        <a:scrgbClr r="0" g="0" b="0"/>
+      </a:effectRef>
+      <a:fontRef idx="minor"/>
+    </dgm:style>
+  </dgm:styleLbl>
+  <dgm:styleLbl name="trBgShp">
+    <dgm:scene3d>
+      <a:camera prst="orthographicFront"/>
+      <a:lightRig rig="threePt" dir="t"/>
+    </dgm:scene3d>
+    <dgm:sp3d/>
+    <dgm:txPr/>
+    <dgm:style>
+      <a:lnRef idx="0">
+        <a:scrgbClr r="0" g="0" b="0"/>
+      </a:lnRef>
+      <a:fillRef idx="1">
+        <a:scrgbClr r="0" g="0" b="0"/>
+      </a:fillRef>
+      <a:effectRef idx="0">
+        <a:scrgbClr r="0" g="0" b="0"/>
+      </a:effectRef>
+      <a:fontRef idx="minor"/>
+    </dgm:style>
+  </dgm:styleLbl>
+  <dgm:styleLbl name="fgShp">
+    <dgm:scene3d>
+      <a:camera prst="orthographicFront"/>
+      <a:lightRig rig="threePt" dir="t"/>
+    </dgm:scene3d>
+    <dgm:sp3d/>
+    <dgm:txPr/>
+    <dgm:style>
+      <a:lnRef idx="2">
+        <a:scrgbClr r="0" g="0" b="0"/>
+      </a:lnRef>
+      <a:fillRef idx="1">
+        <a:scrgbClr r="0" g="0" b="0"/>
+      </a:fillRef>
+      <a:effectRef idx="0">
+        <a:scrgbClr r="0" g="0" b="0"/>
+      </a:effectRef>
+      <a:fontRef idx="minor"/>
+    </dgm:style>
+  </dgm:styleLbl>
+  <dgm:styleLbl name="revTx">
+    <dgm:scene3d>
+      <a:camera prst="orthographicFront"/>
+      <a:lightRig rig="threePt" dir="t"/>
+    </dgm:scene3d>
+    <dgm:sp3d/>
+    <dgm:txPr/>
+    <dgm:style>
+      <a:lnRef idx="0">
+        <a:scrgbClr r="0" g="0" b="0"/>
+      </a:lnRef>
+      <a:fillRef idx="0">
+        <a:scrgbClr r="0" g="0" b="0"/>
+      </a:fillRef>
+      <a:effectRef idx="0">
+        <a:scrgbClr r="0" g="0" b="0"/>
+      </a:effectRef>
+      <a:fontRef idx="minor"/>
+    </dgm:style>
+  </dgm:styleLbl>
+</dgm:styleDef>
+</file>
+
+<file path=ppt/diagrams/quickStyle2.xml><?xml version="1.0" encoding="utf-8"?>
 <dgm:styleDef xmlns:dgm="http://schemas.openxmlformats.org/drawingml/2006/diagram" xmlns:a="http://schemas.openxmlformats.org/drawingml/2006/main" uniqueId="urn:microsoft.com/office/officeart/2005/8/quickstyle/simple1">
   <dgm:title val=""/>
   <dgm:desc val=""/>
@@ -3092,7 +6957,7 @@
             <a:fld id="{E72D30EF-8F20-0B47-8B5D-39A8BC29E860}" type="datetimeFigureOut">
               <a:rPr lang="en-US" smtClean="0"/>
               <a:pPr/>
-              <a:t>9/17/2014</a:t>
+              <a:t>12/15/2016</a:t>
             </a:fld>
             <a:endParaRPr lang="en-US"/>
           </a:p>
@@ -3260,7 +7125,7 @@
             <a:fld id="{77EDD36E-1E02-F241-9611-1F1D9EAAD326}" type="datetimeFigureOut">
               <a:rPr lang="en-US" smtClean="0"/>
               <a:pPr/>
-              <a:t>9/17/2014</a:t>
+              <a:t>12/15/2016</a:t>
             </a:fld>
             <a:endParaRPr lang="en-US"/>
           </a:p>
@@ -8695,6 +12560,89 @@
 </p:sld>
 </file>
 
+<file path=ppt/slides/slide3.xml><?xml version="1.0" encoding="utf-8"?>
+<p:sld xmlns:a="http://schemas.openxmlformats.org/drawingml/2006/main" xmlns:r="http://schemas.openxmlformats.org/officeDocument/2006/relationships" xmlns:p="http://schemas.openxmlformats.org/presentationml/2006/main">
+  <p:cSld>
+    <p:spTree>
+      <p:nvGrpSpPr>
+        <p:cNvPr id="1" name=""/>
+        <p:cNvGrpSpPr/>
+        <p:nvPr/>
+      </p:nvGrpSpPr>
+      <p:grpSpPr>
+        <a:xfrm>
+          <a:off x="0" y="0"/>
+          <a:ext cx="0" cy="0"/>
+          <a:chOff x="0" y="0"/>
+          <a:chExt cx="0" cy="0"/>
+        </a:xfrm>
+      </p:grpSpPr>
+      <p:graphicFrame>
+        <p:nvGraphicFramePr>
+          <p:cNvPr id="4" name="Content Placeholder 3"/>
+          <p:cNvGraphicFramePr>
+            <a:graphicFrameLocks noGrp="1"/>
+          </p:cNvGraphicFramePr>
+          <p:nvPr>
+            <p:ph sz="half" idx="1"/>
+            <p:extLst>
+              <p:ext uri="{D42A27DB-BD31-4B8C-83A1-F6EECF244321}">
+                <p14:modId xmlns:p14="http://schemas.microsoft.com/office/powerpoint/2010/main" val="3155067191"/>
+              </p:ext>
+            </p:extLst>
+          </p:nvPr>
+        </p:nvGraphicFramePr>
+        <p:xfrm>
+          <a:off x="481013" y="1439863"/>
+          <a:ext cx="8713787" cy="4679950"/>
+        </p:xfrm>
+        <a:graphic>
+          <a:graphicData uri="http://schemas.openxmlformats.org/drawingml/2006/diagram">
+            <dgm:relIds xmlns:dgm="http://schemas.openxmlformats.org/drawingml/2006/diagram" xmlns:r="http://schemas.openxmlformats.org/officeDocument/2006/relationships" r:dm="rId2" r:lo="rId3" r:qs="rId4" r:cs="rId5"/>
+          </a:graphicData>
+        </a:graphic>
+      </p:graphicFrame>
+      <p:sp>
+        <p:nvSpPr>
+          <p:cNvPr id="2" name="Title 1"/>
+          <p:cNvSpPr>
+            <a:spLocks noGrp="1"/>
+          </p:cNvSpPr>
+          <p:nvPr>
+            <p:ph type="title"/>
+          </p:nvPr>
+        </p:nvSpPr>
+        <p:spPr/>
+        <p:txBody>
+          <a:bodyPr>
+            <a:normAutofit fontScale="90000"/>
+          </a:bodyPr>
+          <a:lstStyle/>
+          <a:p>
+            <a:endParaRPr lang="en-US"/>
+          </a:p>
+        </p:txBody>
+      </p:sp>
+    </p:spTree>
+    <p:extLst>
+      <p:ext uri="{BB962C8B-B14F-4D97-AF65-F5344CB8AC3E}">
+        <p14:creationId xmlns:p14="http://schemas.microsoft.com/office/powerpoint/2010/main" val="2969907070"/>
+      </p:ext>
+    </p:extLst>
+  </p:cSld>
+  <p:clrMapOvr>
+    <a:masterClrMapping/>
+  </p:clrMapOvr>
+  <p:timing>
+    <p:tnLst>
+      <p:par>
+        <p:cTn id="1" dur="indefinite" restart="never" nodeType="tmRoot"/>
+      </p:par>
+    </p:tnLst>
+  </p:timing>
+</p:sld>
+</file>
+
 <file path=ppt/theme/theme1.xml><?xml version="1.0" encoding="utf-8"?>
 <a:theme xmlns:a="http://schemas.openxmlformats.org/drawingml/2006/main" name="ARM PPT Template 2014 Public">
   <a:themeElements>
@@ -9673,33 +13621,6 @@
 </file>
 
 <file path=customXml/item1.xml><?xml version="1.0" encoding="utf-8"?>
-<p:properties xmlns:p="http://schemas.microsoft.com/office/2006/metadata/properties" xmlns:xsi="http://www.w3.org/2001/XMLSchema-instance">
-  <documentManagement>
-    <AlternateThumbnailUrl xmlns="http://schemas.microsoft.com/sharepoint/v3">
-      <Url xsi:nil="true"/>
-      <Description xsi:nil="true"/>
-    </AlternateThumbnailUrl>
-    <ImageCreateDate xmlns="http://schemas.microsoft.com/sharepoint/v3" xsi:nil="true"/>
-    <Description xmlns="http://schemas.microsoft.com/sharepoint/v3" xsi:nil="true"/>
-    <_dlc_DocId xmlns="f2ad5090-61a8-4b8c-ab70-68f4ff4d1933">ARM-ECM-0151353</_dlc_DocId>
-    <_dlc_DocIdUrl xmlns="f2ad5090-61a8-4b8c-ab70-68f4ff4d1933">
-      <Url>http://teamsites.arm.com/sites/marketing/branding/_layouts/DocIdRedir.aspx?ID=ARM-ECM-0151353</Url>
-      <Description>ARM-ECM-0151353</Description>
-    </_dlc_DocIdUrl>
-  </documentManagement>
-</p:properties>
-</file>
-
-<file path=customXml/item2.xml><?xml version="1.0" encoding="utf-8"?>
-<?mso-contentType ?>
-<FormTemplates xmlns="http://schemas.microsoft.com/sharepoint/v3/contenttype/forms">
-  <Display>DocumentLibraryForm</Display>
-  <Edit>DocumentLibraryForm</Edit>
-  <New>DocumentLibraryForm</New>
-</FormTemplates>
-</file>
-
-<file path=customXml/item3.xml><?xml version="1.0" encoding="utf-8"?>
 <ct:contentTypeSchema xmlns:ct="http://schemas.microsoft.com/office/2006/metadata/contentType" xmlns:ma="http://schemas.microsoft.com/office/2006/metadata/properties/metaAttributes" ct:_="" ma:_="" ma:contentTypeName="Picture" ma:contentTypeID="0x010102005A5C1BE65173D647975D08D04557E024" ma:contentTypeVersion="3" ma:contentTypeDescription="Upload an image or a photograph." ma:contentTypeScope="" ma:versionID="4e02033e9a8407b55ee482baa8e8773d">
   <xsd:schema xmlns:xsd="http://www.w3.org/2001/XMLSchema" xmlns:xs="http://www.w3.org/2001/XMLSchema" xmlns:p="http://schemas.microsoft.com/office/2006/metadata/properties" xmlns:ns1="http://schemas.microsoft.com/sharepoint/v3" xmlns:ns2="f2ad5090-61a8-4b8c-ab70-68f4ff4d1933" targetNamespace="http://schemas.microsoft.com/office/2006/metadata/properties" ma:root="true" ma:fieldsID="56baf7bb33d679821ced92383ddba583" ns1:_="" ns2:_="">
     <xsd:import namespace="http://schemas.microsoft.com/sharepoint/v3"/>
@@ -9900,6 +13821,33 @@
 </ct:contentTypeSchema>
 </file>
 
+<file path=customXml/item2.xml><?xml version="1.0" encoding="utf-8"?>
+<?mso-contentType ?>
+<FormTemplates xmlns="http://schemas.microsoft.com/sharepoint/v3/contenttype/forms">
+  <Display>DocumentLibraryForm</Display>
+  <Edit>DocumentLibraryForm</Edit>
+  <New>DocumentLibraryForm</New>
+</FormTemplates>
+</file>
+
+<file path=customXml/item3.xml><?xml version="1.0" encoding="utf-8"?>
+<p:properties xmlns:p="http://schemas.microsoft.com/office/2006/metadata/properties" xmlns:xsi="http://www.w3.org/2001/XMLSchema-instance">
+  <documentManagement>
+    <AlternateThumbnailUrl xmlns="http://schemas.microsoft.com/sharepoint/v3">
+      <Url xsi:nil="true"/>
+      <Description xsi:nil="true"/>
+    </AlternateThumbnailUrl>
+    <ImageCreateDate xmlns="http://schemas.microsoft.com/sharepoint/v3" xsi:nil="true"/>
+    <Description xmlns="http://schemas.microsoft.com/sharepoint/v3" xsi:nil="true"/>
+    <_dlc_DocId xmlns="f2ad5090-61a8-4b8c-ab70-68f4ff4d1933">ARM-ECM-0151353</_dlc_DocId>
+    <_dlc_DocIdUrl xmlns="f2ad5090-61a8-4b8c-ab70-68f4ff4d1933">
+      <Url>http://teamsites.arm.com/sites/marketing/branding/_layouts/DocIdRedir.aspx?ID=ARM-ECM-0151353</Url>
+      <Description>ARM-ECM-0151353</Description>
+    </_dlc_DocIdUrl>
+  </documentManagement>
+</p:properties>
+</file>
+
 <file path=customXml/item4.xml><?xml version="1.0" encoding="utf-8"?>
 <?mso-contentType ?>
 <spe:Receivers xmlns:spe="http://schemas.microsoft.com/sharepoint/events">
@@ -9947,31 +13895,6 @@
 </file>
 
 <file path=customXml/itemProps1.xml><?xml version="1.0" encoding="utf-8"?>
-<ds:datastoreItem xmlns:ds="http://schemas.openxmlformats.org/officeDocument/2006/customXml" ds:itemID="{AE6E82D6-7FB8-4D99-A7B6-3C5BB1D894B9}">
-  <ds:schemaRefs>
-    <ds:schemaRef ds:uri="f2ad5090-61a8-4b8c-ab70-68f4ff4d1933"/>
-    <ds:schemaRef ds:uri="http://schemas.microsoft.com/office/2006/metadata/properties"/>
-    <ds:schemaRef ds:uri="http://schemas.microsoft.com/office/2006/documentManagement/types"/>
-    <ds:schemaRef ds:uri="http://purl.org/dc/terms/"/>
-    <ds:schemaRef ds:uri="http://www.w3.org/XML/1998/namespace"/>
-    <ds:schemaRef ds:uri="http://schemas.openxmlformats.org/package/2006/metadata/core-properties"/>
-    <ds:schemaRef ds:uri="http://purl.org/dc/dcmitype/"/>
-    <ds:schemaRef ds:uri="http://schemas.microsoft.com/office/infopath/2007/PartnerControls"/>
-    <ds:schemaRef ds:uri="http://schemas.microsoft.com/sharepoint/v3"/>
-    <ds:schemaRef ds:uri="http://purl.org/dc/elements/1.1/"/>
-  </ds:schemaRefs>
-</ds:datastoreItem>
-</file>
-
-<file path=customXml/itemProps2.xml><?xml version="1.0" encoding="utf-8"?>
-<ds:datastoreItem xmlns:ds="http://schemas.openxmlformats.org/officeDocument/2006/customXml" ds:itemID="{9C777C69-0744-4BF3-8514-FB149EBD2248}">
-  <ds:schemaRefs>
-    <ds:schemaRef ds:uri="http://schemas.microsoft.com/sharepoint/v3/contenttype/forms"/>
-  </ds:schemaRefs>
-</ds:datastoreItem>
-</file>
-
-<file path=customXml/itemProps3.xml><?xml version="1.0" encoding="utf-8"?>
 <ds:datastoreItem xmlns:ds="http://schemas.openxmlformats.org/officeDocument/2006/customXml" ds:itemID="{E2FEA05E-38D0-44EA-8B8D-2375FC6AAF09}">
   <ds:schemaRefs>
     <ds:schemaRef ds:uri="http://schemas.microsoft.com/office/2006/metadata/contentType"/>
@@ -9990,6 +13913,31 @@
 </ds:datastoreItem>
 </file>
 
+<file path=customXml/itemProps2.xml><?xml version="1.0" encoding="utf-8"?>
+<ds:datastoreItem xmlns:ds="http://schemas.openxmlformats.org/officeDocument/2006/customXml" ds:itemID="{9C777C69-0744-4BF3-8514-FB149EBD2248}">
+  <ds:schemaRefs>
+    <ds:schemaRef ds:uri="http://schemas.microsoft.com/sharepoint/v3/contenttype/forms"/>
+  </ds:schemaRefs>
+</ds:datastoreItem>
+</file>
+
+<file path=customXml/itemProps3.xml><?xml version="1.0" encoding="utf-8"?>
+<ds:datastoreItem xmlns:ds="http://schemas.openxmlformats.org/officeDocument/2006/customXml" ds:itemID="{AE6E82D6-7FB8-4D99-A7B6-3C5BB1D894B9}">
+  <ds:schemaRefs>
+    <ds:schemaRef ds:uri="f2ad5090-61a8-4b8c-ab70-68f4ff4d1933"/>
+    <ds:schemaRef ds:uri="http://schemas.microsoft.com/office/2006/metadata/properties"/>
+    <ds:schemaRef ds:uri="http://schemas.microsoft.com/office/2006/documentManagement/types"/>
+    <ds:schemaRef ds:uri="http://purl.org/dc/terms/"/>
+    <ds:schemaRef ds:uri="http://www.w3.org/XML/1998/namespace"/>
+    <ds:schemaRef ds:uri="http://schemas.openxmlformats.org/package/2006/metadata/core-properties"/>
+    <ds:schemaRef ds:uri="http://purl.org/dc/dcmitype/"/>
+    <ds:schemaRef ds:uri="http://schemas.microsoft.com/office/infopath/2007/PartnerControls"/>
+    <ds:schemaRef ds:uri="http://schemas.microsoft.com/sharepoint/v3"/>
+    <ds:schemaRef ds:uri="http://purl.org/dc/elements/1.1/"/>
+  </ds:schemaRefs>
+</ds:datastoreItem>
+</file>
+
 <file path=customXml/itemProps4.xml><?xml version="1.0" encoding="utf-8"?>
 <ds:datastoreItem xmlns:ds="http://schemas.openxmlformats.org/officeDocument/2006/customXml" ds:itemID="{C8CB23D7-89E5-42FF-A5EB-008A06AB37C7}">
   <ds:schemaRefs>

</xml_diff>

<commit_message>
Reviewed CMSIS-Pack Indes Files section and updated Publish a Pack section as requested by SDCMSIS-562.
</commit_message>
<xml_diff>
--- a/CMSIS/DoxyGen/Pack/src/CMSIS-Pack.pptx
+++ b/CMSIS/DoxyGen/Pack/src/CMSIS-Pack.pptx
@@ -5,15 +5,17 @@
     <p:sldMasterId id="2147483716" r:id="rId5"/>
   </p:sldMasterIdLst>
   <p:notesMasterIdLst>
-    <p:notesMasterId r:id="rId9"/>
+    <p:notesMasterId r:id="rId11"/>
   </p:notesMasterIdLst>
   <p:handoutMasterIdLst>
-    <p:handoutMasterId r:id="rId10"/>
+    <p:handoutMasterId r:id="rId12"/>
   </p:handoutMasterIdLst>
   <p:sldIdLst>
     <p:sldId id="279" r:id="rId6"/>
     <p:sldId id="280" r:id="rId7"/>
     <p:sldId id="281" r:id="rId8"/>
+    <p:sldId id="282" r:id="rId9"/>
+    <p:sldId id="283" r:id="rId10"/>
   </p:sldIdLst>
   <p:sldSz cx="12188825" cy="6858000"/>
   <p:notesSz cx="6794500" cy="9918700"/>
@@ -2072,23 +2074,23 @@
     </dgm:pt>
   </dgm:ptLst>
   <dgm:cxnLst>
+    <dgm:cxn modelId="{B6B27B43-1222-4658-8435-CEBD78548228}" srcId="{9F68795F-2190-433E-8335-581472B9F264}" destId="{10BD4C43-335F-4F26-8509-AE0A3104735E}" srcOrd="0" destOrd="0" parTransId="{05D19A37-D7C2-4758-B963-62838C8E69ED}" sibTransId="{D15F90E9-7F3C-4F53-9FD6-3873FD74BCD3}"/>
+    <dgm:cxn modelId="{131A62AF-19AA-4D3A-9B44-5F3DE03F1503}" srcId="{19D99FA6-8D29-484F-8F9E-963934186247}" destId="{C2DC6BCB-58EF-40EC-8D94-2BECCEF22457}" srcOrd="2" destOrd="0" parTransId="{FF3E2932-32AF-4862-823A-055C615ABADD}" sibTransId="{FD7C0BB5-A77E-4359-9626-23BE3A1D1823}"/>
+    <dgm:cxn modelId="{50CCD34F-D890-4E5A-9884-0B19D707AE0A}" srcId="{97D18895-AFB3-45B7-928B-B6522EBAFD97}" destId="{CA81B55A-4B86-4E8A-8321-7CF01B1EFEB9}" srcOrd="0" destOrd="0" parTransId="{FC334487-FE6F-44CB-9059-C592F9F91A84}" sibTransId="{81E104B4-BB71-4F05-915C-84B6059C936A}"/>
+    <dgm:cxn modelId="{263F98B0-058B-4283-B0B3-C52ED0AA1EF5}" srcId="{19D99FA6-8D29-484F-8F9E-963934186247}" destId="{9F68795F-2190-433E-8335-581472B9F264}" srcOrd="0" destOrd="0" parTransId="{9E76810B-A53F-4FA5-9026-8CD7831B1E5D}" sibTransId="{409C664D-37F9-4CA4-91BB-9620185DD979}"/>
+    <dgm:cxn modelId="{E21D6374-196C-413A-8E2D-E9E329F3E79B}" type="presOf" srcId="{10BD4C43-335F-4F26-8509-AE0A3104735E}" destId="{C90621DF-EC09-4CCA-9B44-CE15A2C8E155}" srcOrd="0" destOrd="1" presId="urn:microsoft.com/office/officeart/2005/8/layout/hProcess9"/>
+    <dgm:cxn modelId="{7E721132-4C81-41CC-BC5D-5CFE4FC20C06}" type="presOf" srcId="{02F0EBE7-A51E-4585-878C-6905FD954334}" destId="{87DD2403-CC57-4BE7-806A-5E2FD598AFF9}" srcOrd="0" destOrd="1" presId="urn:microsoft.com/office/officeart/2005/8/layout/hProcess9"/>
+    <dgm:cxn modelId="{69229F1B-3FF6-4DA3-8F9E-44676C375EC9}" srcId="{19D99FA6-8D29-484F-8F9E-963934186247}" destId="{97D18895-AFB3-45B7-928B-B6522EBAFD97}" srcOrd="1" destOrd="0" parTransId="{672CF2CE-2B2C-4D38-A526-8579FD388DD2}" sibTransId="{C2C8F478-2489-4626-94E5-096A8AF13A1D}"/>
+    <dgm:cxn modelId="{E7D48016-125B-435B-9D9C-F0CDCDC638AD}" type="presOf" srcId="{FB728F9B-DAED-4152-A191-2EAFD3CE6201}" destId="{1A29F33B-5654-4790-8C4C-D8330C5003CD}" srcOrd="0" destOrd="1" presId="urn:microsoft.com/office/officeart/2005/8/layout/hProcess9"/>
+    <dgm:cxn modelId="{67E3C733-0666-40F6-B819-A74B69DD09E1}" type="presOf" srcId="{C2DC6BCB-58EF-40EC-8D94-2BECCEF22457}" destId="{87DD2403-CC57-4BE7-806A-5E2FD598AFF9}" srcOrd="0" destOrd="0" presId="urn:microsoft.com/office/officeart/2005/8/layout/hProcess9"/>
     <dgm:cxn modelId="{F434006E-2FF4-499C-8254-782364BC69FA}" srcId="{19D99FA6-8D29-484F-8F9E-963934186247}" destId="{6A13DA54-29D6-40EF-8DE3-1192761460DB}" srcOrd="3" destOrd="0" parTransId="{4E6631B7-5C83-43A7-BB6E-B056D87E9A6D}" sibTransId="{D98797D1-8FEF-4C97-9DB1-DFCD90C2F535}"/>
-    <dgm:cxn modelId="{50CCD34F-D890-4E5A-9884-0B19D707AE0A}" srcId="{97D18895-AFB3-45B7-928B-B6522EBAFD97}" destId="{CA81B55A-4B86-4E8A-8321-7CF01B1EFEB9}" srcOrd="0" destOrd="0" parTransId="{FC334487-FE6F-44CB-9059-C592F9F91A84}" sibTransId="{81E104B4-BB71-4F05-915C-84B6059C936A}"/>
-    <dgm:cxn modelId="{43ADDEFC-4A84-499B-A7FF-465936FD6B89}" srcId="{C2DC6BCB-58EF-40EC-8D94-2BECCEF22457}" destId="{02F0EBE7-A51E-4585-878C-6905FD954334}" srcOrd="0" destOrd="0" parTransId="{9CF97DA2-E710-4010-9C21-AB2F89EB88CE}" sibTransId="{F6290414-5A73-46B7-8D10-0A701FA93632}"/>
-    <dgm:cxn modelId="{E7D48016-125B-435B-9D9C-F0CDCDC638AD}" type="presOf" srcId="{FB728F9B-DAED-4152-A191-2EAFD3CE6201}" destId="{1A29F33B-5654-4790-8C4C-D8330C5003CD}" srcOrd="0" destOrd="1" presId="urn:microsoft.com/office/officeart/2005/8/layout/hProcess9"/>
-    <dgm:cxn modelId="{131A62AF-19AA-4D3A-9B44-5F3DE03F1503}" srcId="{19D99FA6-8D29-484F-8F9E-963934186247}" destId="{C2DC6BCB-58EF-40EC-8D94-2BECCEF22457}" srcOrd="2" destOrd="0" parTransId="{FF3E2932-32AF-4862-823A-055C615ABADD}" sibTransId="{FD7C0BB5-A77E-4359-9626-23BE3A1D1823}"/>
+    <dgm:cxn modelId="{D5AD1412-FB4A-4BA0-8502-4C0BD5FF8F5B}" type="presOf" srcId="{19D99FA6-8D29-484F-8F9E-963934186247}" destId="{3177BB53-307F-46E6-8C42-D565EF669EAF}" srcOrd="0" destOrd="0" presId="urn:microsoft.com/office/officeart/2005/8/layout/hProcess9"/>
+    <dgm:cxn modelId="{2220A4A9-4C2F-4B00-BC95-860DC8552F96}" type="presOf" srcId="{CA81B55A-4B86-4E8A-8321-7CF01B1EFEB9}" destId="{A8886D96-0572-43B9-A738-7AF22DEAF85D}" srcOrd="0" destOrd="1" presId="urn:microsoft.com/office/officeart/2005/8/layout/hProcess9"/>
     <dgm:cxn modelId="{917DF737-3C04-4D06-954F-B221E0AD27BB}" srcId="{6A13DA54-29D6-40EF-8DE3-1192761460DB}" destId="{FB728F9B-DAED-4152-A191-2EAFD3CE6201}" srcOrd="0" destOrd="0" parTransId="{B6BE5A03-FCAD-43FD-A5EC-D18BAE195D42}" sibTransId="{61D18ADC-5A55-483C-9960-27831A897C9D}"/>
     <dgm:cxn modelId="{71EEA935-3B36-4151-8D9D-343A517E66F6}" type="presOf" srcId="{97D18895-AFB3-45B7-928B-B6522EBAFD97}" destId="{A8886D96-0572-43B9-A738-7AF22DEAF85D}" srcOrd="0" destOrd="0" presId="urn:microsoft.com/office/officeart/2005/8/layout/hProcess9"/>
-    <dgm:cxn modelId="{B6B27B43-1222-4658-8435-CEBD78548228}" srcId="{9F68795F-2190-433E-8335-581472B9F264}" destId="{10BD4C43-335F-4F26-8509-AE0A3104735E}" srcOrd="0" destOrd="0" parTransId="{05D19A37-D7C2-4758-B963-62838C8E69ED}" sibTransId="{D15F90E9-7F3C-4F53-9FD6-3873FD74BCD3}"/>
-    <dgm:cxn modelId="{7E721132-4C81-41CC-BC5D-5CFE4FC20C06}" type="presOf" srcId="{02F0EBE7-A51E-4585-878C-6905FD954334}" destId="{87DD2403-CC57-4BE7-806A-5E2FD598AFF9}" srcOrd="0" destOrd="1" presId="urn:microsoft.com/office/officeart/2005/8/layout/hProcess9"/>
     <dgm:cxn modelId="{5F1EAF4A-3E59-491B-BF52-596E4A57A798}" type="presOf" srcId="{9F68795F-2190-433E-8335-581472B9F264}" destId="{C90621DF-EC09-4CCA-9B44-CE15A2C8E155}" srcOrd="0" destOrd="0" presId="urn:microsoft.com/office/officeart/2005/8/layout/hProcess9"/>
-    <dgm:cxn modelId="{E21D6374-196C-413A-8E2D-E9E329F3E79B}" type="presOf" srcId="{10BD4C43-335F-4F26-8509-AE0A3104735E}" destId="{C90621DF-EC09-4CCA-9B44-CE15A2C8E155}" srcOrd="0" destOrd="1" presId="urn:microsoft.com/office/officeart/2005/8/layout/hProcess9"/>
-    <dgm:cxn modelId="{263F98B0-058B-4283-B0B3-C52ED0AA1EF5}" srcId="{19D99FA6-8D29-484F-8F9E-963934186247}" destId="{9F68795F-2190-433E-8335-581472B9F264}" srcOrd="0" destOrd="0" parTransId="{9E76810B-A53F-4FA5-9026-8CD7831B1E5D}" sibTransId="{409C664D-37F9-4CA4-91BB-9620185DD979}"/>
+    <dgm:cxn modelId="{43ADDEFC-4A84-499B-A7FF-465936FD6B89}" srcId="{C2DC6BCB-58EF-40EC-8D94-2BECCEF22457}" destId="{02F0EBE7-A51E-4585-878C-6905FD954334}" srcOrd="0" destOrd="0" parTransId="{9CF97DA2-E710-4010-9C21-AB2F89EB88CE}" sibTransId="{F6290414-5A73-46B7-8D10-0A701FA93632}"/>
     <dgm:cxn modelId="{9471EAF6-0286-4E4A-93F7-FCC70DE09A66}" type="presOf" srcId="{6A13DA54-29D6-40EF-8DE3-1192761460DB}" destId="{1A29F33B-5654-4790-8C4C-D8330C5003CD}" srcOrd="0" destOrd="0" presId="urn:microsoft.com/office/officeart/2005/8/layout/hProcess9"/>
-    <dgm:cxn modelId="{69229F1B-3FF6-4DA3-8F9E-44676C375EC9}" srcId="{19D99FA6-8D29-484F-8F9E-963934186247}" destId="{97D18895-AFB3-45B7-928B-B6522EBAFD97}" srcOrd="1" destOrd="0" parTransId="{672CF2CE-2B2C-4D38-A526-8579FD388DD2}" sibTransId="{C2C8F478-2489-4626-94E5-096A8AF13A1D}"/>
-    <dgm:cxn modelId="{67E3C733-0666-40F6-B819-A74B69DD09E1}" type="presOf" srcId="{C2DC6BCB-58EF-40EC-8D94-2BECCEF22457}" destId="{87DD2403-CC57-4BE7-806A-5E2FD598AFF9}" srcOrd="0" destOrd="0" presId="urn:microsoft.com/office/officeart/2005/8/layout/hProcess9"/>
-    <dgm:cxn modelId="{D5AD1412-FB4A-4BA0-8502-4C0BD5FF8F5B}" type="presOf" srcId="{19D99FA6-8D29-484F-8F9E-963934186247}" destId="{3177BB53-307F-46E6-8C42-D565EF669EAF}" srcOrd="0" destOrd="0" presId="urn:microsoft.com/office/officeart/2005/8/layout/hProcess9"/>
-    <dgm:cxn modelId="{2220A4A9-4C2F-4B00-BC95-860DC8552F96}" type="presOf" srcId="{CA81B55A-4B86-4E8A-8321-7CF01B1EFEB9}" destId="{A8886D96-0572-43B9-A738-7AF22DEAF85D}" srcOrd="0" destOrd="1" presId="urn:microsoft.com/office/officeart/2005/8/layout/hProcess9"/>
     <dgm:cxn modelId="{7C2C805B-754D-4ACF-B1B4-7A95A939C274}" type="presParOf" srcId="{3177BB53-307F-46E6-8C42-D565EF669EAF}" destId="{6DA11162-CE5A-41C5-B6A2-AA987F68E645}" srcOrd="0" destOrd="0" presId="urn:microsoft.com/office/officeart/2005/8/layout/hProcess9"/>
     <dgm:cxn modelId="{F8BF48C0-1C47-480E-9BFE-44D0620CDA9D}" type="presParOf" srcId="{3177BB53-307F-46E6-8C42-D565EF669EAF}" destId="{9F6F832C-ED24-4392-A1F7-DFA523B2391B}" srcOrd="1" destOrd="0" presId="urn:microsoft.com/office/officeart/2005/8/layout/hProcess9"/>
     <dgm:cxn modelId="{E7D809D7-8062-4775-B3EE-69BE56113CF5}" type="presParOf" srcId="{9F6F832C-ED24-4392-A1F7-DFA523B2391B}" destId="{C90621DF-EC09-4CCA-9B44-CE15A2C8E155}" srcOrd="0" destOrd="0" presId="urn:microsoft.com/office/officeart/2005/8/layout/hProcess9"/>
@@ -2997,8 +2999,8 @@
     <dgm:cxn modelId="{F6AE1862-A2BF-4021-AA22-D38C66185759}" srcId="{C0AFDC70-32E0-4B9F-932E-27382B633E08}" destId="{D651B15E-07DF-42FC-9782-10247930488F}" srcOrd="1" destOrd="0" parTransId="{6DEB5D5C-BE96-43C5-AB17-F999072D6C1A}" sibTransId="{4AF67BC8-A56D-4026-9461-D8FCF954C3E7}"/>
     <dgm:cxn modelId="{384003D5-C3B0-48B8-946D-4F60DBE8DF5A}" type="presOf" srcId="{A899E859-3E80-48D1-A0B7-5A63B9EFC7E2}" destId="{5F8EC6B9-7FA8-41E5-AEC8-F776C9BC2ACF}" srcOrd="0" destOrd="0" presId="urn:microsoft.com/office/officeart/2005/8/layout/chevron2"/>
     <dgm:cxn modelId="{83D3A29F-B58C-48A2-AC7B-F273481DEEFA}" type="presOf" srcId="{88D7EFD8-C24E-4900-965C-615A00BF7A18}" destId="{F1042AF1-C5B0-4195-BED3-223E85A2B6C6}" srcOrd="0" destOrd="0" presId="urn:microsoft.com/office/officeart/2005/8/layout/chevron2"/>
+    <dgm:cxn modelId="{D2B987E1-8CEA-435E-8D28-577CF4C1845D}" srcId="{C0AFDC70-32E0-4B9F-932E-27382B633E08}" destId="{0282634B-803E-473F-A3DB-94DCCFB53278}" srcOrd="4" destOrd="0" parTransId="{9CF309C0-A2DC-4281-A04C-C9636E9B8004}" sibTransId="{E6D8037E-EB17-475B-804B-A373CABD384B}"/>
     <dgm:cxn modelId="{4495C053-D333-47E3-8957-3958E928B02A}" srcId="{8F439D51-B6B7-43F0-A14D-CBB8F59A87C3}" destId="{F360982B-F2E2-4E1C-97C7-4DD023CF475A}" srcOrd="1" destOrd="0" parTransId="{4AC6B4D8-D4FA-4368-BD5D-D377DFBF8655}" sibTransId="{5374B0DD-9F00-4486-88D6-26582C980520}"/>
-    <dgm:cxn modelId="{D2B987E1-8CEA-435E-8D28-577CF4C1845D}" srcId="{C0AFDC70-32E0-4B9F-932E-27382B633E08}" destId="{0282634B-803E-473F-A3DB-94DCCFB53278}" srcOrd="4" destOrd="0" parTransId="{9CF309C0-A2DC-4281-A04C-C9636E9B8004}" sibTransId="{E6D8037E-EB17-475B-804B-A373CABD384B}"/>
     <dgm:cxn modelId="{34E794F6-997A-4961-AE06-5DC765D71CDC}" srcId="{D651B15E-07DF-42FC-9782-10247930488F}" destId="{B69B01B5-3268-4099-A8E3-4A4F3FB1D043}" srcOrd="0" destOrd="0" parTransId="{F6675C08-3040-46F4-824D-D746F191516C}" sibTransId="{AA09ADC0-9421-44F0-89E2-39EAECADA555}"/>
     <dgm:cxn modelId="{579A652A-D964-463F-9AE8-EDEC4775AA53}" srcId="{C0AFDC70-32E0-4B9F-932E-27382B633E08}" destId="{354A7675-6CB2-48EB-A031-71267C4E7163}" srcOrd="0" destOrd="0" parTransId="{AB4A92BE-79F2-4F9A-95F7-870769F2AD9B}" sibTransId="{C0EFA3C1-CFF3-4B10-AB83-126E5BBD1075}"/>
     <dgm:cxn modelId="{790F8E87-ED9C-4D49-A0EE-ED553D4D7024}" srcId="{8F439D51-B6B7-43F0-A14D-CBB8F59A87C3}" destId="{88D7EFD8-C24E-4900-965C-615A00BF7A18}" srcOrd="0" destOrd="0" parTransId="{04B59200-97A9-4893-8DD6-D674CEDEE23B}" sibTransId="{71427AF1-D5CA-493C-BA3B-1CD68B805A4C}"/>
@@ -6957,7 +6959,7 @@
             <a:fld id="{E72D30EF-8F20-0B47-8B5D-39A8BC29E860}" type="datetimeFigureOut">
               <a:rPr lang="en-US" smtClean="0"/>
               <a:pPr/>
-              <a:t>12/15/2016</a:t>
+              <a:t>1/31/2017</a:t>
             </a:fld>
             <a:endParaRPr lang="en-US"/>
           </a:p>
@@ -7125,7 +7127,7 @@
             <a:fld id="{77EDD36E-1E02-F241-9611-1F1D9EAAD326}" type="datetimeFigureOut">
               <a:rPr lang="en-US" smtClean="0"/>
               <a:pPr/>
-              <a:t>12/15/2016</a:t>
+              <a:t>1/31/2017</a:t>
             </a:fld>
             <a:endParaRPr lang="en-US"/>
           </a:p>
@@ -7395,6 +7397,199 @@
     </a:lvl9pPr>
   </p:notesStyle>
 </p:notesMaster>
+</file>
+
+<file path=ppt/notesSlides/notesSlide1.xml><?xml version="1.0" encoding="utf-8"?>
+<p:notes xmlns:a="http://schemas.openxmlformats.org/drawingml/2006/main" xmlns:r="http://schemas.openxmlformats.org/officeDocument/2006/relationships" xmlns:p="http://schemas.openxmlformats.org/presentationml/2006/main">
+  <p:cSld>
+    <p:spTree>
+      <p:nvGrpSpPr>
+        <p:cNvPr id="1" name=""/>
+        <p:cNvGrpSpPr/>
+        <p:nvPr/>
+      </p:nvGrpSpPr>
+      <p:grpSpPr>
+        <a:xfrm>
+          <a:off x="0" y="0"/>
+          <a:ext cx="0" cy="0"/>
+          <a:chOff x="0" y="0"/>
+          <a:chExt cx="0" cy="0"/>
+        </a:xfrm>
+      </p:grpSpPr>
+      <p:sp>
+        <p:nvSpPr>
+          <p:cNvPr id="2" name="Slide Image Placeholder 1"/>
+          <p:cNvSpPr>
+            <a:spLocks noGrp="1" noRot="1" noChangeAspect="1"/>
+          </p:cNvSpPr>
+          <p:nvPr>
+            <p:ph type="sldImg"/>
+          </p:nvPr>
+        </p:nvSpPr>
+        <p:spPr/>
+      </p:sp>
+      <p:sp>
+        <p:nvSpPr>
+          <p:cNvPr id="3" name="Notes Placeholder 2"/>
+          <p:cNvSpPr>
+            <a:spLocks noGrp="1"/>
+          </p:cNvSpPr>
+          <p:nvPr>
+            <p:ph type="body" idx="1"/>
+          </p:nvPr>
+        </p:nvSpPr>
+        <p:spPr/>
+        <p:txBody>
+          <a:bodyPr/>
+          <a:lstStyle/>
+          <a:p>
+            <a:endParaRPr lang="en-US"/>
+          </a:p>
+        </p:txBody>
+      </p:sp>
+      <p:sp>
+        <p:nvSpPr>
+          <p:cNvPr id="4" name="Slide Number Placeholder 3"/>
+          <p:cNvSpPr>
+            <a:spLocks noGrp="1"/>
+          </p:cNvSpPr>
+          <p:nvPr>
+            <p:ph type="sldNum" sz="quarter" idx="10"/>
+          </p:nvPr>
+        </p:nvSpPr>
+        <p:spPr/>
+        <p:txBody>
+          <a:bodyPr/>
+          <a:lstStyle/>
+          <a:p>
+            <a:fld id="{579786E7-EDAB-724E-B5AE-1BDD6B8AC677}" type="slidenum">
+              <a:rPr lang="en-US" smtClean="0"/>
+              <a:pPr/>
+              <a:t>4</a:t>
+            </a:fld>
+            <a:endParaRPr lang="en-US"/>
+          </a:p>
+        </p:txBody>
+      </p:sp>
+    </p:spTree>
+    <p:extLst>
+      <p:ext uri="{BB962C8B-B14F-4D97-AF65-F5344CB8AC3E}">
+        <p14:creationId xmlns:p14="http://schemas.microsoft.com/office/powerpoint/2010/main" val="3269980850"/>
+      </p:ext>
+    </p:extLst>
+  </p:cSld>
+  <p:clrMapOvr>
+    <a:masterClrMapping/>
+  </p:clrMapOvr>
+</p:notes>
+</file>
+
+<file path=ppt/notesSlides/notesSlide2.xml><?xml version="1.0" encoding="utf-8"?>
+<p:notes xmlns:a="http://schemas.openxmlformats.org/drawingml/2006/main" xmlns:r="http://schemas.openxmlformats.org/officeDocument/2006/relationships" xmlns:p="http://schemas.openxmlformats.org/presentationml/2006/main">
+  <p:cSld>
+    <p:spTree>
+      <p:nvGrpSpPr>
+        <p:cNvPr id="1" name=""/>
+        <p:cNvGrpSpPr/>
+        <p:nvPr/>
+      </p:nvGrpSpPr>
+      <p:grpSpPr>
+        <a:xfrm>
+          <a:off x="0" y="0"/>
+          <a:ext cx="0" cy="0"/>
+          <a:chOff x="0" y="0"/>
+          <a:chExt cx="0" cy="0"/>
+        </a:xfrm>
+      </p:grpSpPr>
+      <p:sp>
+        <p:nvSpPr>
+          <p:cNvPr id="2" name="Slide Image Placeholder 1"/>
+          <p:cNvSpPr>
+            <a:spLocks noGrp="1" noRot="1" noChangeAspect="1"/>
+          </p:cNvSpPr>
+          <p:nvPr>
+            <p:ph type="sldImg"/>
+          </p:nvPr>
+        </p:nvSpPr>
+        <p:spPr/>
+      </p:sp>
+      <p:sp>
+        <p:nvSpPr>
+          <p:cNvPr id="3" name="Notes Placeholder 2"/>
+          <p:cNvSpPr>
+            <a:spLocks noGrp="1"/>
+          </p:cNvSpPr>
+          <p:nvPr>
+            <p:ph type="body" idx="1"/>
+          </p:nvPr>
+        </p:nvSpPr>
+        <p:spPr/>
+        <p:txBody>
+          <a:bodyPr/>
+          <a:lstStyle/>
+          <a:p>
+            <a:pPr marL="0" marR="0" indent="0" algn="l" defTabSz="457200" rtl="0" eaLnBrk="1" fontAlgn="auto" latinLnBrk="0" hangingPunct="1">
+              <a:lnSpc>
+                <a:spcPct val="100000"/>
+              </a:lnSpc>
+              <a:spcBef>
+                <a:spcPts val="0"/>
+              </a:spcBef>
+              <a:spcAft>
+                <a:spcPts val="0"/>
+              </a:spcAft>
+              <a:buClrTx/>
+              <a:buSzTx/>
+              <a:buFontTx/>
+              <a:buNone/>
+              <a:tabLst/>
+              <a:defRPr/>
+            </a:pPr>
+            <a:r>
+              <a:rPr lang="en-US" altLang="en-US" dirty="0" smtClean="0"/>
+              <a:t>Pack Installer copies relevant files of a PACK to tool/project environment</a:t>
+            </a:r>
+          </a:p>
+          <a:p>
+            <a:endParaRPr lang="en-GB" dirty="0"/>
+          </a:p>
+        </p:txBody>
+      </p:sp>
+      <p:sp>
+        <p:nvSpPr>
+          <p:cNvPr id="4" name="Slide Number Placeholder 3"/>
+          <p:cNvSpPr>
+            <a:spLocks noGrp="1"/>
+          </p:cNvSpPr>
+          <p:nvPr>
+            <p:ph type="sldNum" sz="quarter" idx="10"/>
+          </p:nvPr>
+        </p:nvSpPr>
+        <p:spPr/>
+        <p:txBody>
+          <a:bodyPr/>
+          <a:lstStyle/>
+          <a:p>
+            <a:fld id="{579786E7-EDAB-724E-B5AE-1BDD6B8AC677}" type="slidenum">
+              <a:rPr lang="en-US" smtClean="0"/>
+              <a:pPr/>
+              <a:t>5</a:t>
+            </a:fld>
+            <a:endParaRPr lang="en-US"/>
+          </a:p>
+        </p:txBody>
+      </p:sp>
+    </p:spTree>
+    <p:extLst>
+      <p:ext uri="{BB962C8B-B14F-4D97-AF65-F5344CB8AC3E}">
+        <p14:creationId xmlns:p14="http://schemas.microsoft.com/office/powerpoint/2010/main" val="3769136744"/>
+      </p:ext>
+    </p:extLst>
+  </p:cSld>
+  <p:clrMapOvr>
+    <a:masterClrMapping/>
+  </p:clrMapOvr>
+</p:notes>
 </file>
 
 <file path=ppt/slideLayouts/slideLayout1.xml><?xml version="1.0" encoding="utf-8"?>
@@ -12627,6 +12822,2481 @@
     <p:extLst>
       <p:ext uri="{BB962C8B-B14F-4D97-AF65-F5344CB8AC3E}">
         <p14:creationId xmlns:p14="http://schemas.microsoft.com/office/powerpoint/2010/main" val="2969907070"/>
+      </p:ext>
+    </p:extLst>
+  </p:cSld>
+  <p:clrMapOvr>
+    <a:masterClrMapping/>
+  </p:clrMapOvr>
+  <p:timing>
+    <p:tnLst>
+      <p:par>
+        <p:cTn id="1" dur="indefinite" restart="never" nodeType="tmRoot"/>
+      </p:par>
+    </p:tnLst>
+  </p:timing>
+</p:sld>
+</file>
+
+<file path=ppt/slides/slide4.xml><?xml version="1.0" encoding="utf-8"?>
+<p:sld xmlns:a="http://schemas.openxmlformats.org/drawingml/2006/main" xmlns:r="http://schemas.openxmlformats.org/officeDocument/2006/relationships" xmlns:p="http://schemas.openxmlformats.org/presentationml/2006/main">
+  <p:cSld>
+    <p:spTree>
+      <p:nvGrpSpPr>
+        <p:cNvPr id="1" name=""/>
+        <p:cNvGrpSpPr/>
+        <p:nvPr/>
+      </p:nvGrpSpPr>
+      <p:grpSpPr>
+        <a:xfrm>
+          <a:off x="0" y="0"/>
+          <a:ext cx="0" cy="0"/>
+          <a:chOff x="0" y="0"/>
+          <a:chExt cx="0" cy="0"/>
+        </a:xfrm>
+      </p:grpSpPr>
+      <p:sp>
+        <p:nvSpPr>
+          <p:cNvPr id="2" name="Title 1"/>
+          <p:cNvSpPr>
+            <a:spLocks noGrp="1"/>
+          </p:cNvSpPr>
+          <p:nvPr>
+            <p:ph type="title"/>
+          </p:nvPr>
+        </p:nvSpPr>
+        <p:spPr/>
+        <p:txBody>
+          <a:bodyPr>
+            <a:normAutofit fontScale="90000"/>
+          </a:bodyPr>
+          <a:lstStyle/>
+          <a:p>
+            <a:r>
+              <a:rPr lang="en-US" dirty="0" smtClean="0"/>
+              <a:t>Local Installation</a:t>
+            </a:r>
+            <a:endParaRPr lang="en-GB" dirty="0"/>
+          </a:p>
+        </p:txBody>
+      </p:sp>
+      <p:sp>
+        <p:nvSpPr>
+          <p:cNvPr id="20" name="Rectangle 19"/>
+          <p:cNvSpPr/>
+          <p:nvPr/>
+        </p:nvSpPr>
+        <p:spPr>
+          <a:xfrm>
+            <a:off x="7934633" y="3142049"/>
+            <a:ext cx="2052000" cy="1439999"/>
+          </a:xfrm>
+          <a:prstGeom prst="rect">
+            <a:avLst/>
+          </a:prstGeom>
+          <a:solidFill>
+            <a:srgbClr val="765F97"/>
+          </a:solidFill>
+          <a:ln>
+            <a:noFill/>
+          </a:ln>
+          <a:effectLst/>
+        </p:spPr>
+        <p:style>
+          <a:lnRef idx="1">
+            <a:schemeClr val="accent1"/>
+          </a:lnRef>
+          <a:fillRef idx="3">
+            <a:schemeClr val="accent1"/>
+          </a:fillRef>
+          <a:effectRef idx="2">
+            <a:schemeClr val="accent1"/>
+          </a:effectRef>
+          <a:fontRef idx="minor">
+            <a:schemeClr val="lt1"/>
+          </a:fontRef>
+        </p:style>
+        <p:txBody>
+          <a:bodyPr rtlCol="0" anchor="ctr"/>
+          <a:lstStyle/>
+          <a:p>
+            <a:pPr algn="ctr"/>
+            <a:r>
+              <a:rPr lang="en-US" dirty="0" smtClean="0"/>
+              <a:t>Development </a:t>
+            </a:r>
+            <a:r>
+              <a:rPr lang="en-US" dirty="0" smtClean="0"/>
+              <a:t>Tool</a:t>
+            </a:r>
+            <a:endParaRPr lang="en-GB" dirty="0"/>
+          </a:p>
+        </p:txBody>
+      </p:sp>
+      <p:sp>
+        <p:nvSpPr>
+          <p:cNvPr id="21" name="Rectangle 20"/>
+          <p:cNvSpPr/>
+          <p:nvPr/>
+        </p:nvSpPr>
+        <p:spPr>
+          <a:xfrm>
+            <a:off x="4832950" y="3142049"/>
+            <a:ext cx="1980000" cy="1440000"/>
+          </a:xfrm>
+          <a:prstGeom prst="rect">
+            <a:avLst/>
+          </a:prstGeom>
+          <a:solidFill>
+            <a:srgbClr val="128CAB"/>
+          </a:solidFill>
+          <a:ln>
+            <a:noFill/>
+          </a:ln>
+          <a:effectLst/>
+        </p:spPr>
+        <p:style>
+          <a:lnRef idx="1">
+            <a:schemeClr val="accent1"/>
+          </a:lnRef>
+          <a:fillRef idx="3">
+            <a:schemeClr val="accent1"/>
+          </a:fillRef>
+          <a:effectRef idx="2">
+            <a:schemeClr val="accent1"/>
+          </a:effectRef>
+          <a:fontRef idx="minor">
+            <a:schemeClr val="lt1"/>
+          </a:fontRef>
+        </p:style>
+        <p:txBody>
+          <a:bodyPr rtlCol="0" anchor="ctr"/>
+          <a:lstStyle/>
+          <a:p>
+            <a:pPr algn="ctr"/>
+            <a:r>
+              <a:rPr lang="en-US" dirty="0" smtClean="0"/>
+              <a:t>Pack Management Tool</a:t>
+            </a:r>
+            <a:endParaRPr lang="en-GB" dirty="0"/>
+          </a:p>
+        </p:txBody>
+      </p:sp>
+      <p:cxnSp>
+        <p:nvCxnSpPr>
+          <p:cNvPr id="22" name="Straight Arrow Connector 21"/>
+          <p:cNvCxnSpPr>
+            <a:stCxn id="21" idx="3"/>
+            <a:endCxn id="20" idx="1"/>
+          </p:cNvCxnSpPr>
+          <p:nvPr/>
+        </p:nvCxnSpPr>
+        <p:spPr>
+          <a:xfrm>
+            <a:off x="6812950" y="3862049"/>
+            <a:ext cx="1121683" cy="0"/>
+          </a:xfrm>
+          <a:prstGeom prst="straightConnector1">
+            <a:avLst/>
+          </a:prstGeom>
+          <a:ln w="19050">
+            <a:solidFill>
+              <a:srgbClr val="808082"/>
+            </a:solidFill>
+            <a:headEnd type="none" w="med" len="sm"/>
+            <a:tailEnd type="triangle" w="med" len="sm"/>
+          </a:ln>
+          <a:effectLst/>
+        </p:spPr>
+        <p:style>
+          <a:lnRef idx="2">
+            <a:schemeClr val="accent1"/>
+          </a:lnRef>
+          <a:fillRef idx="0">
+            <a:schemeClr val="accent1"/>
+          </a:fillRef>
+          <a:effectRef idx="1">
+            <a:schemeClr val="accent1"/>
+          </a:effectRef>
+          <a:fontRef idx="minor">
+            <a:schemeClr val="tx1"/>
+          </a:fontRef>
+        </p:style>
+      </p:cxnSp>
+      <p:sp>
+        <p:nvSpPr>
+          <p:cNvPr id="23" name="Rectangle 22"/>
+          <p:cNvSpPr/>
+          <p:nvPr/>
+        </p:nvSpPr>
+        <p:spPr>
+          <a:xfrm>
+            <a:off x="4795116" y="5316318"/>
+            <a:ext cx="2052000" cy="720000"/>
+          </a:xfrm>
+          <a:prstGeom prst="rect">
+            <a:avLst/>
+          </a:prstGeom>
+          <a:solidFill>
+            <a:srgbClr val="58595B"/>
+          </a:solidFill>
+          <a:ln>
+            <a:noFill/>
+          </a:ln>
+          <a:effectLst/>
+        </p:spPr>
+        <p:style>
+          <a:lnRef idx="1">
+            <a:schemeClr val="accent1"/>
+          </a:lnRef>
+          <a:fillRef idx="3">
+            <a:schemeClr val="accent1"/>
+          </a:fillRef>
+          <a:effectRef idx="2">
+            <a:schemeClr val="accent1"/>
+          </a:effectRef>
+          <a:fontRef idx="minor">
+            <a:schemeClr val="lt1"/>
+          </a:fontRef>
+        </p:style>
+        <p:txBody>
+          <a:bodyPr rtlCol="0" anchor="t"/>
+          <a:lstStyle/>
+          <a:p>
+            <a:pPr algn="ctr"/>
+            <a:r>
+              <a:rPr lang="en-US" dirty="0" smtClean="0">
+                <a:solidFill>
+                  <a:schemeClr val="bg1"/>
+                </a:solidFill>
+              </a:rPr>
+              <a:t>Local D.1.PACK File</a:t>
+            </a:r>
+            <a:endParaRPr lang="en-GB" dirty="0">
+              <a:solidFill>
+                <a:schemeClr val="bg1"/>
+              </a:solidFill>
+            </a:endParaRPr>
+          </a:p>
+        </p:txBody>
+      </p:sp>
+      <p:cxnSp>
+        <p:nvCxnSpPr>
+          <p:cNvPr id="24" name="Straight Arrow Connector 23"/>
+          <p:cNvCxnSpPr>
+            <a:stCxn id="23" idx="0"/>
+          </p:cNvCxnSpPr>
+          <p:nvPr/>
+        </p:nvCxnSpPr>
+        <p:spPr>
+          <a:xfrm flipV="1">
+            <a:off x="5821116" y="4582050"/>
+            <a:ext cx="1834" cy="734268"/>
+          </a:xfrm>
+          <a:prstGeom prst="straightConnector1">
+            <a:avLst/>
+          </a:prstGeom>
+          <a:ln w="19050">
+            <a:solidFill>
+              <a:srgbClr val="808082"/>
+            </a:solidFill>
+            <a:headEnd type="none" w="med" len="sm"/>
+            <a:tailEnd type="triangle" w="med" len="sm"/>
+          </a:ln>
+          <a:effectLst/>
+        </p:spPr>
+        <p:style>
+          <a:lnRef idx="2">
+            <a:schemeClr val="accent1"/>
+          </a:lnRef>
+          <a:fillRef idx="0">
+            <a:schemeClr val="accent1"/>
+          </a:fillRef>
+          <a:effectRef idx="1">
+            <a:schemeClr val="accent1"/>
+          </a:effectRef>
+          <a:fontRef idx="minor">
+            <a:schemeClr val="tx1"/>
+          </a:fontRef>
+        </p:style>
+      </p:cxnSp>
+      <p:sp>
+        <p:nvSpPr>
+          <p:cNvPr id="25" name="Rectangle 24"/>
+          <p:cNvSpPr/>
+          <p:nvPr/>
+        </p:nvSpPr>
+        <p:spPr>
+          <a:xfrm>
+            <a:off x="7108814" y="5316319"/>
+            <a:ext cx="2052000" cy="719999"/>
+          </a:xfrm>
+          <a:prstGeom prst="rect">
+            <a:avLst/>
+          </a:prstGeom>
+          <a:solidFill>
+            <a:srgbClr val="D77B00">
+              <a:alpha val="40000"/>
+            </a:srgbClr>
+          </a:solidFill>
+          <a:ln>
+            <a:noFill/>
+          </a:ln>
+          <a:effectLst/>
+        </p:spPr>
+        <p:style>
+          <a:lnRef idx="1">
+            <a:schemeClr val="accent1"/>
+          </a:lnRef>
+          <a:fillRef idx="3">
+            <a:schemeClr val="accent1"/>
+          </a:fillRef>
+          <a:effectRef idx="2">
+            <a:schemeClr val="accent1"/>
+          </a:effectRef>
+          <a:fontRef idx="minor">
+            <a:schemeClr val="lt1"/>
+          </a:fontRef>
+        </p:style>
+        <p:txBody>
+          <a:bodyPr rtlCol="0" anchor="t"/>
+          <a:lstStyle/>
+          <a:p>
+            <a:pPr algn="ctr"/>
+            <a:r>
+              <a:rPr lang="en-US" dirty="0" smtClean="0">
+                <a:solidFill>
+                  <a:schemeClr val="tx1"/>
+                </a:solidFill>
+              </a:rPr>
+              <a:t>Web Page </a:t>
+            </a:r>
+            <a:r>
+              <a:rPr lang="en-US" dirty="0" smtClean="0">
+                <a:solidFill>
+                  <a:schemeClr val="tx1"/>
+                </a:solidFill>
+              </a:rPr>
+              <a:t>Vendor3</a:t>
+            </a:r>
+            <a:endParaRPr lang="en-GB" dirty="0">
+              <a:solidFill>
+                <a:schemeClr val="tx1"/>
+              </a:solidFill>
+            </a:endParaRPr>
+          </a:p>
+        </p:txBody>
+      </p:sp>
+      <p:sp>
+        <p:nvSpPr>
+          <p:cNvPr id="26" name="Rectangle 25"/>
+          <p:cNvSpPr/>
+          <p:nvPr/>
+        </p:nvSpPr>
+        <p:spPr>
+          <a:xfrm>
+            <a:off x="7223528" y="5734406"/>
+            <a:ext cx="828000" cy="216000"/>
+          </a:xfrm>
+          <a:prstGeom prst="rect">
+            <a:avLst/>
+          </a:prstGeom>
+          <a:solidFill>
+            <a:srgbClr val="808082"/>
+          </a:solidFill>
+          <a:ln>
+            <a:noFill/>
+          </a:ln>
+          <a:effectLst/>
+        </p:spPr>
+        <p:style>
+          <a:lnRef idx="1">
+            <a:schemeClr val="accent1"/>
+          </a:lnRef>
+          <a:fillRef idx="3">
+            <a:schemeClr val="accent1"/>
+          </a:fillRef>
+          <a:effectRef idx="2">
+            <a:schemeClr val="accent1"/>
+          </a:effectRef>
+          <a:fontRef idx="minor">
+            <a:schemeClr val="lt1"/>
+          </a:fontRef>
+        </p:style>
+        <p:txBody>
+          <a:bodyPr rtlCol="0" anchor="ctr"/>
+          <a:lstStyle/>
+          <a:p>
+            <a:pPr algn="ctr"/>
+            <a:r>
+              <a:rPr lang="en-US" sz="1200" dirty="0" smtClean="0"/>
+              <a:t>D.PDSC</a:t>
+            </a:r>
+            <a:endParaRPr lang="en-GB" sz="1200" dirty="0"/>
+          </a:p>
+        </p:txBody>
+      </p:sp>
+      <p:sp>
+        <p:nvSpPr>
+          <p:cNvPr id="27" name="Rectangle 26"/>
+          <p:cNvSpPr/>
+          <p:nvPr/>
+        </p:nvSpPr>
+        <p:spPr>
+          <a:xfrm>
+            <a:off x="8221073" y="5733175"/>
+            <a:ext cx="828000" cy="216000"/>
+          </a:xfrm>
+          <a:prstGeom prst="rect">
+            <a:avLst/>
+          </a:prstGeom>
+          <a:solidFill>
+            <a:srgbClr val="58595B"/>
+          </a:solidFill>
+          <a:ln>
+            <a:noFill/>
+          </a:ln>
+          <a:effectLst/>
+        </p:spPr>
+        <p:style>
+          <a:lnRef idx="1">
+            <a:schemeClr val="accent1"/>
+          </a:lnRef>
+          <a:fillRef idx="3">
+            <a:schemeClr val="accent1"/>
+          </a:fillRef>
+          <a:effectRef idx="2">
+            <a:schemeClr val="accent1"/>
+          </a:effectRef>
+          <a:fontRef idx="minor">
+            <a:schemeClr val="lt1"/>
+          </a:fontRef>
+        </p:style>
+        <p:txBody>
+          <a:bodyPr rtlCol="0" anchor="ctr"/>
+          <a:lstStyle/>
+          <a:p>
+            <a:pPr algn="ctr"/>
+            <a:r>
+              <a:rPr lang="en-US" sz="1200" dirty="0" smtClean="0"/>
+              <a:t>D.2.PACK</a:t>
+            </a:r>
+            <a:endParaRPr lang="en-GB" sz="1200" dirty="0"/>
+          </a:p>
+        </p:txBody>
+      </p:sp>
+      <p:cxnSp>
+        <p:nvCxnSpPr>
+          <p:cNvPr id="28" name="Straight Arrow Connector 27"/>
+          <p:cNvCxnSpPr>
+            <a:stCxn id="26" idx="3"/>
+            <a:endCxn id="27" idx="1"/>
+          </p:cNvCxnSpPr>
+          <p:nvPr/>
+        </p:nvCxnSpPr>
+        <p:spPr>
+          <a:xfrm flipV="1">
+            <a:off x="8051528" y="5841175"/>
+            <a:ext cx="169545" cy="1231"/>
+          </a:xfrm>
+          <a:prstGeom prst="straightConnector1">
+            <a:avLst/>
+          </a:prstGeom>
+          <a:ln w="19050">
+            <a:solidFill>
+              <a:srgbClr val="808082"/>
+            </a:solidFill>
+            <a:headEnd type="triangle" w="med" len="sm"/>
+            <a:tailEnd type="triangle" w="med" len="sm"/>
+          </a:ln>
+          <a:effectLst/>
+        </p:spPr>
+        <p:style>
+          <a:lnRef idx="2">
+            <a:schemeClr val="accent1"/>
+          </a:lnRef>
+          <a:fillRef idx="0">
+            <a:schemeClr val="accent1"/>
+          </a:fillRef>
+          <a:effectRef idx="1">
+            <a:schemeClr val="accent1"/>
+          </a:effectRef>
+          <a:fontRef idx="minor">
+            <a:schemeClr val="tx1"/>
+          </a:fontRef>
+        </p:style>
+      </p:cxnSp>
+      <p:sp>
+        <p:nvSpPr>
+          <p:cNvPr id="29" name="TextBox 28"/>
+          <p:cNvSpPr txBox="1"/>
+          <p:nvPr/>
+        </p:nvSpPr>
+        <p:spPr>
+          <a:xfrm>
+            <a:off x="5966832" y="4727123"/>
+            <a:ext cx="2046515" cy="269966"/>
+          </a:xfrm>
+          <a:prstGeom prst="rect">
+            <a:avLst/>
+          </a:prstGeom>
+        </p:spPr>
+        <p:txBody>
+          <a:bodyPr vert="horz" wrap="square" lIns="0" tIns="0" rIns="0" bIns="0" rtlCol="0" anchor="ctr">
+            <a:normAutofit/>
+          </a:bodyPr>
+          <a:lstStyle/>
+          <a:p>
+            <a:pPr algn="ctr"/>
+            <a:r>
+              <a:rPr lang="en-US" sz="1200" dirty="0" smtClean="0">
+                <a:solidFill>
+                  <a:srgbClr val="58595B"/>
+                </a:solidFill>
+              </a:rPr>
+              <a:t>Update from &lt;</a:t>
+            </a:r>
+            <a:r>
+              <a:rPr lang="en-US" sz="1200" dirty="0" err="1" smtClean="0">
+                <a:solidFill>
+                  <a:srgbClr val="58595B"/>
+                </a:solidFill>
+              </a:rPr>
+              <a:t>url</a:t>
+            </a:r>
+            <a:r>
+              <a:rPr lang="en-US" sz="1200" dirty="0" smtClean="0">
+                <a:solidFill>
+                  <a:srgbClr val="58595B"/>
+                </a:solidFill>
+              </a:rPr>
+              <a:t>&gt;</a:t>
+            </a:r>
+            <a:endParaRPr lang="en-GB" sz="1200" dirty="0" smtClean="0">
+              <a:solidFill>
+                <a:srgbClr val="58595B"/>
+              </a:solidFill>
+            </a:endParaRPr>
+          </a:p>
+        </p:txBody>
+      </p:sp>
+      <p:sp>
+        <p:nvSpPr>
+          <p:cNvPr id="30" name="Rectangle 29"/>
+          <p:cNvSpPr/>
+          <p:nvPr/>
+        </p:nvSpPr>
+        <p:spPr>
+          <a:xfrm>
+            <a:off x="4890129" y="5734406"/>
+            <a:ext cx="1857113" cy="216000"/>
+          </a:xfrm>
+          <a:prstGeom prst="rect">
+            <a:avLst/>
+          </a:prstGeom>
+          <a:solidFill>
+            <a:srgbClr val="808082"/>
+          </a:solidFill>
+          <a:ln>
+            <a:noFill/>
+          </a:ln>
+          <a:effectLst/>
+        </p:spPr>
+        <p:style>
+          <a:lnRef idx="1">
+            <a:schemeClr val="accent1"/>
+          </a:lnRef>
+          <a:fillRef idx="3">
+            <a:schemeClr val="accent1"/>
+          </a:fillRef>
+          <a:effectRef idx="2">
+            <a:schemeClr val="accent1"/>
+          </a:effectRef>
+          <a:fontRef idx="minor">
+            <a:schemeClr val="lt1"/>
+          </a:fontRef>
+        </p:style>
+        <p:txBody>
+          <a:bodyPr rtlCol="0" anchor="ctr"/>
+          <a:lstStyle/>
+          <a:p>
+            <a:pPr algn="ctr"/>
+            <a:r>
+              <a:rPr lang="en-US" sz="1200" dirty="0" smtClean="0"/>
+              <a:t>D.PDSC with &lt;</a:t>
+            </a:r>
+            <a:r>
+              <a:rPr lang="en-US" sz="1200" dirty="0" err="1" smtClean="0"/>
+              <a:t>url</a:t>
+            </a:r>
+            <a:r>
+              <a:rPr lang="en-US" sz="1200" dirty="0" smtClean="0"/>
+              <a:t>&gt;</a:t>
+            </a:r>
+            <a:endParaRPr lang="en-GB" sz="1200" dirty="0"/>
+          </a:p>
+        </p:txBody>
+      </p:sp>
+      <p:cxnSp>
+        <p:nvCxnSpPr>
+          <p:cNvPr id="31" name="Elbow Connector 30"/>
+          <p:cNvCxnSpPr/>
+          <p:nvPr/>
+        </p:nvCxnSpPr>
+        <p:spPr>
+          <a:xfrm rot="16200000" flipV="1">
+            <a:off x="6611747" y="3793252"/>
+            <a:ext cx="734270" cy="2311864"/>
+          </a:xfrm>
+          <a:prstGeom prst="bentConnector3">
+            <a:avLst>
+              <a:gd name="adj1" fmla="val 47406"/>
+            </a:avLst>
+          </a:prstGeom>
+          <a:ln w="19050">
+            <a:solidFill>
+              <a:srgbClr val="808082"/>
+            </a:solidFill>
+            <a:headEnd type="none" w="med" len="sm"/>
+            <a:tailEnd type="triangle" w="med" len="sm"/>
+          </a:ln>
+          <a:effectLst/>
+        </p:spPr>
+        <p:style>
+          <a:lnRef idx="2">
+            <a:schemeClr val="accent1"/>
+          </a:lnRef>
+          <a:fillRef idx="0">
+            <a:schemeClr val="accent1"/>
+          </a:fillRef>
+          <a:effectRef idx="1">
+            <a:schemeClr val="accent1"/>
+          </a:effectRef>
+          <a:fontRef idx="minor">
+            <a:schemeClr val="tx1"/>
+          </a:fontRef>
+        </p:style>
+      </p:cxnSp>
+    </p:spTree>
+    <p:extLst>
+      <p:ext uri="{BB962C8B-B14F-4D97-AF65-F5344CB8AC3E}">
+        <p14:creationId xmlns:p14="http://schemas.microsoft.com/office/powerpoint/2010/main" val="3749109805"/>
+      </p:ext>
+    </p:extLst>
+  </p:cSld>
+  <p:clrMapOvr>
+    <a:masterClrMapping/>
+  </p:clrMapOvr>
+  <p:timing>
+    <p:tnLst>
+      <p:par>
+        <p:cTn id="1" dur="indefinite" restart="never" nodeType="tmRoot"/>
+      </p:par>
+    </p:tnLst>
+  </p:timing>
+</p:sld>
+</file>
+
+<file path=ppt/slides/slide5.xml><?xml version="1.0" encoding="utf-8"?>
+<p:sld xmlns:a="http://schemas.openxmlformats.org/drawingml/2006/main" xmlns:r="http://schemas.openxmlformats.org/officeDocument/2006/relationships" xmlns:p="http://schemas.openxmlformats.org/presentationml/2006/main">
+  <p:cSld>
+    <p:spTree>
+      <p:nvGrpSpPr>
+        <p:cNvPr id="1" name=""/>
+        <p:cNvGrpSpPr/>
+        <p:nvPr/>
+      </p:nvGrpSpPr>
+      <p:grpSpPr>
+        <a:xfrm>
+          <a:off x="0" y="0"/>
+          <a:ext cx="0" cy="0"/>
+          <a:chOff x="0" y="0"/>
+          <a:chExt cx="0" cy="0"/>
+        </a:xfrm>
+      </p:grpSpPr>
+      <p:sp>
+        <p:nvSpPr>
+          <p:cNvPr id="34" name="Rectangle 33"/>
+          <p:cNvSpPr/>
+          <p:nvPr/>
+        </p:nvSpPr>
+        <p:spPr>
+          <a:xfrm>
+            <a:off x="1714294" y="1123950"/>
+            <a:ext cx="2052000" cy="2333354"/>
+          </a:xfrm>
+          <a:prstGeom prst="rect">
+            <a:avLst/>
+          </a:prstGeom>
+          <a:solidFill>
+            <a:srgbClr val="D77B00">
+              <a:alpha val="40000"/>
+            </a:srgbClr>
+          </a:solidFill>
+          <a:ln>
+            <a:noFill/>
+          </a:ln>
+          <a:effectLst/>
+        </p:spPr>
+        <p:style>
+          <a:lnRef idx="1">
+            <a:schemeClr val="accent1"/>
+          </a:lnRef>
+          <a:fillRef idx="3">
+            <a:schemeClr val="accent1"/>
+          </a:fillRef>
+          <a:effectRef idx="2">
+            <a:schemeClr val="accent1"/>
+          </a:effectRef>
+          <a:fontRef idx="minor">
+            <a:schemeClr val="lt1"/>
+          </a:fontRef>
+        </p:style>
+        <p:txBody>
+          <a:bodyPr rtlCol="0" anchor="t"/>
+          <a:lstStyle/>
+          <a:p>
+            <a:pPr algn="ctr"/>
+            <a:r>
+              <a:rPr lang="en-US" dirty="0" smtClean="0">
+                <a:solidFill>
+                  <a:schemeClr val="tx1"/>
+                </a:solidFill>
+              </a:rPr>
+              <a:t>Web Page </a:t>
+            </a:r>
+            <a:r>
+              <a:rPr lang="en-US" dirty="0" smtClean="0">
+                <a:solidFill>
+                  <a:schemeClr val="tx1"/>
+                </a:solidFill>
+              </a:rPr>
+              <a:t>Vendor1</a:t>
+            </a:r>
+            <a:endParaRPr lang="en-GB" dirty="0">
+              <a:solidFill>
+                <a:schemeClr val="tx1"/>
+              </a:solidFill>
+            </a:endParaRPr>
+          </a:p>
+        </p:txBody>
+      </p:sp>
+      <p:sp>
+        <p:nvSpPr>
+          <p:cNvPr id="6" name="Rectangle 5"/>
+          <p:cNvSpPr/>
+          <p:nvPr/>
+        </p:nvSpPr>
+        <p:spPr>
+          <a:xfrm>
+            <a:off x="7934633" y="3142049"/>
+            <a:ext cx="2052000" cy="1439999"/>
+          </a:xfrm>
+          <a:prstGeom prst="rect">
+            <a:avLst/>
+          </a:prstGeom>
+          <a:solidFill>
+            <a:srgbClr val="765F97"/>
+          </a:solidFill>
+          <a:ln>
+            <a:noFill/>
+          </a:ln>
+          <a:effectLst/>
+        </p:spPr>
+        <p:style>
+          <a:lnRef idx="1">
+            <a:schemeClr val="accent1"/>
+          </a:lnRef>
+          <a:fillRef idx="3">
+            <a:schemeClr val="accent1"/>
+          </a:fillRef>
+          <a:effectRef idx="2">
+            <a:schemeClr val="accent1"/>
+          </a:effectRef>
+          <a:fontRef idx="minor">
+            <a:schemeClr val="lt1"/>
+          </a:fontRef>
+        </p:style>
+        <p:txBody>
+          <a:bodyPr rtlCol="0" anchor="ctr"/>
+          <a:lstStyle/>
+          <a:p>
+            <a:pPr algn="ctr"/>
+            <a:r>
+              <a:rPr lang="en-US" dirty="0" smtClean="0"/>
+              <a:t>Development </a:t>
+            </a:r>
+            <a:r>
+              <a:rPr lang="en-US" dirty="0" smtClean="0"/>
+              <a:t>Tool</a:t>
+            </a:r>
+            <a:endParaRPr lang="en-GB" dirty="0"/>
+          </a:p>
+        </p:txBody>
+      </p:sp>
+      <p:sp>
+        <p:nvSpPr>
+          <p:cNvPr id="7" name="Rectangle 6"/>
+          <p:cNvSpPr/>
+          <p:nvPr/>
+        </p:nvSpPr>
+        <p:spPr>
+          <a:xfrm>
+            <a:off x="4832950" y="3142049"/>
+            <a:ext cx="1980000" cy="1440000"/>
+          </a:xfrm>
+          <a:prstGeom prst="rect">
+            <a:avLst/>
+          </a:prstGeom>
+          <a:solidFill>
+            <a:srgbClr val="128CAB"/>
+          </a:solidFill>
+          <a:ln>
+            <a:noFill/>
+          </a:ln>
+          <a:effectLst/>
+        </p:spPr>
+        <p:style>
+          <a:lnRef idx="1">
+            <a:schemeClr val="accent1"/>
+          </a:lnRef>
+          <a:fillRef idx="3">
+            <a:schemeClr val="accent1"/>
+          </a:fillRef>
+          <a:effectRef idx="2">
+            <a:schemeClr val="accent1"/>
+          </a:effectRef>
+          <a:fontRef idx="minor">
+            <a:schemeClr val="lt1"/>
+          </a:fontRef>
+        </p:style>
+        <p:txBody>
+          <a:bodyPr rtlCol="0" anchor="ctr"/>
+          <a:lstStyle/>
+          <a:p>
+            <a:pPr algn="ctr"/>
+            <a:r>
+              <a:rPr lang="en-US" dirty="0" smtClean="0"/>
+              <a:t>Pack Management Tool</a:t>
+            </a:r>
+            <a:endParaRPr lang="en-GB" dirty="0"/>
+          </a:p>
+        </p:txBody>
+      </p:sp>
+      <p:sp>
+        <p:nvSpPr>
+          <p:cNvPr id="9" name="Rectangle 8"/>
+          <p:cNvSpPr/>
+          <p:nvPr/>
+        </p:nvSpPr>
+        <p:spPr>
+          <a:xfrm>
+            <a:off x="4832950" y="1123950"/>
+            <a:ext cx="1980000" cy="1254911"/>
+          </a:xfrm>
+          <a:prstGeom prst="rect">
+            <a:avLst/>
+          </a:prstGeom>
+          <a:solidFill>
+            <a:srgbClr val="00C3DC">
+              <a:alpha val="40000"/>
+            </a:srgbClr>
+          </a:solidFill>
+          <a:ln>
+            <a:noFill/>
+          </a:ln>
+          <a:effectLst/>
+        </p:spPr>
+        <p:style>
+          <a:lnRef idx="1">
+            <a:schemeClr val="accent1"/>
+          </a:lnRef>
+          <a:fillRef idx="3">
+            <a:schemeClr val="accent1"/>
+          </a:fillRef>
+          <a:effectRef idx="2">
+            <a:schemeClr val="accent1"/>
+          </a:effectRef>
+          <a:fontRef idx="minor">
+            <a:schemeClr val="lt1"/>
+          </a:fontRef>
+        </p:style>
+        <p:txBody>
+          <a:bodyPr rtlCol="0" anchor="t"/>
+          <a:lstStyle/>
+          <a:p>
+            <a:pPr algn="ctr"/>
+            <a:r>
+              <a:rPr lang="en-US" dirty="0" smtClean="0">
+                <a:solidFill>
+                  <a:schemeClr val="tx1"/>
+                </a:solidFill>
+              </a:rPr>
+              <a:t>Pack Index Server</a:t>
+            </a:r>
+            <a:endParaRPr lang="en-GB" dirty="0">
+              <a:solidFill>
+                <a:schemeClr val="tx1"/>
+              </a:solidFill>
+            </a:endParaRPr>
+          </a:p>
+        </p:txBody>
+      </p:sp>
+      <p:sp>
+        <p:nvSpPr>
+          <p:cNvPr id="12" name="Rectangle 11"/>
+          <p:cNvSpPr/>
+          <p:nvPr/>
+        </p:nvSpPr>
+        <p:spPr>
+          <a:xfrm>
+            <a:off x="4921116" y="1524711"/>
+            <a:ext cx="1800000" cy="288000"/>
+          </a:xfrm>
+          <a:prstGeom prst="rect">
+            <a:avLst/>
+          </a:prstGeom>
+          <a:solidFill>
+            <a:srgbClr val="808082"/>
+          </a:solidFill>
+          <a:ln>
+            <a:noFill/>
+          </a:ln>
+          <a:effectLst/>
+        </p:spPr>
+        <p:style>
+          <a:lnRef idx="1">
+            <a:schemeClr val="accent1"/>
+          </a:lnRef>
+          <a:fillRef idx="3">
+            <a:schemeClr val="accent1"/>
+          </a:fillRef>
+          <a:effectRef idx="2">
+            <a:schemeClr val="accent1"/>
+          </a:effectRef>
+          <a:fontRef idx="minor">
+            <a:schemeClr val="lt1"/>
+          </a:fontRef>
+        </p:style>
+        <p:txBody>
+          <a:bodyPr rtlCol="0" anchor="ctr"/>
+          <a:lstStyle/>
+          <a:p>
+            <a:pPr algn="ctr"/>
+            <a:r>
+              <a:rPr lang="en-US" sz="1600" dirty="0" err="1" smtClean="0"/>
+              <a:t>vendor.vidx</a:t>
+            </a:r>
+            <a:endParaRPr lang="en-GB" sz="1600" dirty="0"/>
+          </a:p>
+        </p:txBody>
+      </p:sp>
+      <p:sp>
+        <p:nvSpPr>
+          <p:cNvPr id="16" name="Rectangle 15"/>
+          <p:cNvSpPr/>
+          <p:nvPr/>
+        </p:nvSpPr>
+        <p:spPr>
+          <a:xfrm>
+            <a:off x="1808372" y="2828005"/>
+            <a:ext cx="828000" cy="216000"/>
+          </a:xfrm>
+          <a:prstGeom prst="rect">
+            <a:avLst/>
+          </a:prstGeom>
+          <a:solidFill>
+            <a:srgbClr val="58595B"/>
+          </a:solidFill>
+          <a:ln>
+            <a:noFill/>
+          </a:ln>
+          <a:effectLst/>
+        </p:spPr>
+        <p:style>
+          <a:lnRef idx="1">
+            <a:schemeClr val="accent1"/>
+          </a:lnRef>
+          <a:fillRef idx="3">
+            <a:schemeClr val="accent1"/>
+          </a:fillRef>
+          <a:effectRef idx="2">
+            <a:schemeClr val="accent1"/>
+          </a:effectRef>
+          <a:fontRef idx="minor">
+            <a:schemeClr val="lt1"/>
+          </a:fontRef>
+        </p:style>
+        <p:txBody>
+          <a:bodyPr rtlCol="0" anchor="ctr"/>
+          <a:lstStyle/>
+          <a:p>
+            <a:pPr algn="ctr"/>
+            <a:r>
+              <a:rPr lang="en-US" sz="1200" dirty="0" smtClean="0"/>
+              <a:t>A.2.PACK</a:t>
+            </a:r>
+            <a:endParaRPr lang="en-GB" sz="1200" dirty="0"/>
+          </a:p>
+        </p:txBody>
+      </p:sp>
+      <p:sp>
+        <p:nvSpPr>
+          <p:cNvPr id="23" name="Rectangle 22"/>
+          <p:cNvSpPr/>
+          <p:nvPr/>
+        </p:nvSpPr>
+        <p:spPr>
+          <a:xfrm>
+            <a:off x="1808372" y="3152301"/>
+            <a:ext cx="828000" cy="216000"/>
+          </a:xfrm>
+          <a:prstGeom prst="rect">
+            <a:avLst/>
+          </a:prstGeom>
+          <a:solidFill>
+            <a:srgbClr val="58595B"/>
+          </a:solidFill>
+          <a:ln>
+            <a:noFill/>
+          </a:ln>
+          <a:effectLst/>
+        </p:spPr>
+        <p:style>
+          <a:lnRef idx="1">
+            <a:schemeClr val="accent1"/>
+          </a:lnRef>
+          <a:fillRef idx="3">
+            <a:schemeClr val="accent1"/>
+          </a:fillRef>
+          <a:effectRef idx="2">
+            <a:schemeClr val="accent1"/>
+          </a:effectRef>
+          <a:fontRef idx="minor">
+            <a:schemeClr val="lt1"/>
+          </a:fontRef>
+        </p:style>
+        <p:txBody>
+          <a:bodyPr rtlCol="0" anchor="ctr"/>
+          <a:lstStyle/>
+          <a:p>
+            <a:pPr algn="ctr"/>
+            <a:r>
+              <a:rPr lang="en-US" sz="1200" dirty="0" smtClean="0"/>
+              <a:t>A.3.PACK</a:t>
+            </a:r>
+            <a:endParaRPr lang="en-GB" sz="1200" dirty="0"/>
+          </a:p>
+        </p:txBody>
+      </p:sp>
+      <p:sp>
+        <p:nvSpPr>
+          <p:cNvPr id="26" name="Rectangle 25"/>
+          <p:cNvSpPr/>
+          <p:nvPr/>
+        </p:nvSpPr>
+        <p:spPr>
+          <a:xfrm>
+            <a:off x="1818943" y="1997070"/>
+            <a:ext cx="828000" cy="216000"/>
+          </a:xfrm>
+          <a:prstGeom prst="rect">
+            <a:avLst/>
+          </a:prstGeom>
+          <a:solidFill>
+            <a:srgbClr val="58595B"/>
+          </a:solidFill>
+          <a:ln>
+            <a:noFill/>
+          </a:ln>
+          <a:effectLst/>
+        </p:spPr>
+        <p:style>
+          <a:lnRef idx="1">
+            <a:schemeClr val="accent1"/>
+          </a:lnRef>
+          <a:fillRef idx="3">
+            <a:schemeClr val="accent1"/>
+          </a:fillRef>
+          <a:effectRef idx="2">
+            <a:schemeClr val="accent1"/>
+          </a:effectRef>
+          <a:fontRef idx="minor">
+            <a:schemeClr val="lt1"/>
+          </a:fontRef>
+        </p:style>
+        <p:txBody>
+          <a:bodyPr rtlCol="0" anchor="ctr"/>
+          <a:lstStyle/>
+          <a:p>
+            <a:pPr algn="ctr"/>
+            <a:r>
+              <a:rPr lang="en-US" sz="1200" dirty="0" smtClean="0"/>
+              <a:t>C.1.PACK</a:t>
+            </a:r>
+            <a:endParaRPr lang="en-GB" sz="1200" dirty="0"/>
+          </a:p>
+        </p:txBody>
+      </p:sp>
+      <p:cxnSp>
+        <p:nvCxnSpPr>
+          <p:cNvPr id="28" name="Straight Arrow Connector 27"/>
+          <p:cNvCxnSpPr>
+            <a:stCxn id="26" idx="3"/>
+            <a:endCxn id="25" idx="1"/>
+          </p:cNvCxnSpPr>
+          <p:nvPr/>
+        </p:nvCxnSpPr>
+        <p:spPr>
+          <a:xfrm>
+            <a:off x="2646943" y="2105070"/>
+            <a:ext cx="206126" cy="0"/>
+          </a:xfrm>
+          <a:prstGeom prst="straightConnector1">
+            <a:avLst/>
+          </a:prstGeom>
+          <a:ln w="19050">
+            <a:solidFill>
+              <a:srgbClr val="808082"/>
+            </a:solidFill>
+            <a:headEnd type="none" w="med" len="sm"/>
+            <a:tailEnd type="none" w="med" len="sm"/>
+          </a:ln>
+          <a:effectLst/>
+        </p:spPr>
+        <p:style>
+          <a:lnRef idx="2">
+            <a:schemeClr val="accent1"/>
+          </a:lnRef>
+          <a:fillRef idx="0">
+            <a:schemeClr val="accent1"/>
+          </a:fillRef>
+          <a:effectRef idx="1">
+            <a:schemeClr val="accent1"/>
+          </a:effectRef>
+          <a:fontRef idx="minor">
+            <a:schemeClr val="tx1"/>
+          </a:fontRef>
+        </p:style>
+      </p:cxnSp>
+      <p:cxnSp>
+        <p:nvCxnSpPr>
+          <p:cNvPr id="30" name="Straight Connector 29"/>
+          <p:cNvCxnSpPr/>
+          <p:nvPr/>
+        </p:nvCxnSpPr>
+        <p:spPr>
+          <a:xfrm flipH="1" flipV="1">
+            <a:off x="2747177" y="1997071"/>
+            <a:ext cx="2829" cy="381791"/>
+          </a:xfrm>
+          <a:prstGeom prst="line">
+            <a:avLst/>
+          </a:prstGeom>
+          <a:ln>
+            <a:solidFill>
+              <a:srgbClr val="FF0000"/>
+            </a:solidFill>
+            <a:headEnd type="none"/>
+            <a:tailEnd type="none"/>
+          </a:ln>
+        </p:spPr>
+        <p:style>
+          <a:lnRef idx="2">
+            <a:schemeClr val="accent1"/>
+          </a:lnRef>
+          <a:fillRef idx="0">
+            <a:schemeClr val="accent1"/>
+          </a:fillRef>
+          <a:effectRef idx="1">
+            <a:schemeClr val="accent1"/>
+          </a:effectRef>
+          <a:fontRef idx="minor">
+            <a:schemeClr val="tx1"/>
+          </a:fontRef>
+        </p:style>
+      </p:cxnSp>
+      <p:sp>
+        <p:nvSpPr>
+          <p:cNvPr id="32" name="TextBox 31"/>
+          <p:cNvSpPr txBox="1"/>
+          <p:nvPr/>
+        </p:nvSpPr>
+        <p:spPr>
+          <a:xfrm>
+            <a:off x="1399854" y="2213391"/>
+            <a:ext cx="1316334" cy="224404"/>
+          </a:xfrm>
+          <a:prstGeom prst="rect">
+            <a:avLst/>
+          </a:prstGeom>
+        </p:spPr>
+        <p:txBody>
+          <a:bodyPr vert="horz" wrap="square" lIns="0" tIns="0" rIns="0" bIns="0" rtlCol="0" anchor="ctr">
+            <a:normAutofit/>
+          </a:bodyPr>
+          <a:lstStyle/>
+          <a:p>
+            <a:pPr algn="r"/>
+            <a:r>
+              <a:rPr lang="en-US" sz="1200" dirty="0" smtClean="0"/>
+              <a:t>Access Protection</a:t>
+            </a:r>
+            <a:endParaRPr lang="en-GB" sz="1200" dirty="0" smtClean="0"/>
+          </a:p>
+        </p:txBody>
+      </p:sp>
+      <p:sp>
+        <p:nvSpPr>
+          <p:cNvPr id="66" name="Rectangle 65"/>
+          <p:cNvSpPr/>
+          <p:nvPr/>
+        </p:nvSpPr>
+        <p:spPr>
+          <a:xfrm>
+            <a:off x="1808372" y="2507281"/>
+            <a:ext cx="828000" cy="216000"/>
+          </a:xfrm>
+          <a:prstGeom prst="rect">
+            <a:avLst/>
+          </a:prstGeom>
+          <a:solidFill>
+            <a:srgbClr val="58595B"/>
+          </a:solidFill>
+          <a:ln>
+            <a:noFill/>
+          </a:ln>
+          <a:effectLst/>
+        </p:spPr>
+        <p:style>
+          <a:lnRef idx="1">
+            <a:schemeClr val="accent1"/>
+          </a:lnRef>
+          <a:fillRef idx="3">
+            <a:schemeClr val="accent1"/>
+          </a:fillRef>
+          <a:effectRef idx="2">
+            <a:schemeClr val="accent1"/>
+          </a:effectRef>
+          <a:fontRef idx="minor">
+            <a:schemeClr val="lt1"/>
+          </a:fontRef>
+        </p:style>
+        <p:txBody>
+          <a:bodyPr rtlCol="0" anchor="ctr"/>
+          <a:lstStyle/>
+          <a:p>
+            <a:pPr algn="ctr"/>
+            <a:r>
+              <a:rPr lang="en-US" sz="1200" dirty="0" smtClean="0"/>
+              <a:t>A.1.PACK</a:t>
+            </a:r>
+            <a:endParaRPr lang="en-GB" sz="1200" dirty="0"/>
+          </a:p>
+        </p:txBody>
+      </p:sp>
+      <p:cxnSp>
+        <p:nvCxnSpPr>
+          <p:cNvPr id="67" name="Straight Arrow Connector 66"/>
+          <p:cNvCxnSpPr>
+            <a:stCxn id="66" idx="3"/>
+            <a:endCxn id="65" idx="1"/>
+          </p:cNvCxnSpPr>
+          <p:nvPr/>
+        </p:nvCxnSpPr>
+        <p:spPr>
+          <a:xfrm>
+            <a:off x="2636372" y="2615281"/>
+            <a:ext cx="206126" cy="0"/>
+          </a:xfrm>
+          <a:prstGeom prst="straightConnector1">
+            <a:avLst/>
+          </a:prstGeom>
+          <a:ln w="19050">
+            <a:solidFill>
+              <a:srgbClr val="808082"/>
+            </a:solidFill>
+            <a:headEnd type="none" w="med" len="sm"/>
+            <a:tailEnd type="none" w="med" len="sm"/>
+          </a:ln>
+          <a:effectLst/>
+        </p:spPr>
+        <p:style>
+          <a:lnRef idx="2">
+            <a:schemeClr val="accent1"/>
+          </a:lnRef>
+          <a:fillRef idx="0">
+            <a:schemeClr val="accent1"/>
+          </a:fillRef>
+          <a:effectRef idx="1">
+            <a:schemeClr val="accent1"/>
+          </a:effectRef>
+          <a:fontRef idx="minor">
+            <a:schemeClr val="tx1"/>
+          </a:fontRef>
+        </p:style>
+      </p:cxnSp>
+      <p:cxnSp>
+        <p:nvCxnSpPr>
+          <p:cNvPr id="70" name="Elbow Connector 69"/>
+          <p:cNvCxnSpPr>
+            <a:stCxn id="16" idx="3"/>
+            <a:endCxn id="65" idx="1"/>
+          </p:cNvCxnSpPr>
+          <p:nvPr/>
+        </p:nvCxnSpPr>
+        <p:spPr>
+          <a:xfrm flipV="1">
+            <a:off x="2636372" y="2615281"/>
+            <a:ext cx="206126" cy="320724"/>
+          </a:xfrm>
+          <a:prstGeom prst="bentConnector3">
+            <a:avLst/>
+          </a:prstGeom>
+          <a:ln w="19050">
+            <a:solidFill>
+              <a:srgbClr val="808082"/>
+            </a:solidFill>
+            <a:headEnd type="none" w="med" len="sm"/>
+            <a:tailEnd type="none" w="med" len="sm"/>
+          </a:ln>
+          <a:effectLst/>
+        </p:spPr>
+        <p:style>
+          <a:lnRef idx="2">
+            <a:schemeClr val="accent1"/>
+          </a:lnRef>
+          <a:fillRef idx="0">
+            <a:schemeClr val="accent1"/>
+          </a:fillRef>
+          <a:effectRef idx="1">
+            <a:schemeClr val="accent1"/>
+          </a:effectRef>
+          <a:fontRef idx="minor">
+            <a:schemeClr val="tx1"/>
+          </a:fontRef>
+        </p:style>
+      </p:cxnSp>
+      <p:cxnSp>
+        <p:nvCxnSpPr>
+          <p:cNvPr id="71" name="Elbow Connector 70"/>
+          <p:cNvCxnSpPr>
+            <a:stCxn id="23" idx="3"/>
+            <a:endCxn id="65" idx="1"/>
+          </p:cNvCxnSpPr>
+          <p:nvPr/>
+        </p:nvCxnSpPr>
+        <p:spPr>
+          <a:xfrm flipV="1">
+            <a:off x="2636372" y="2615281"/>
+            <a:ext cx="206126" cy="645020"/>
+          </a:xfrm>
+          <a:prstGeom prst="bentConnector3">
+            <a:avLst>
+              <a:gd name="adj1" fmla="val 50000"/>
+            </a:avLst>
+          </a:prstGeom>
+          <a:ln w="19050">
+            <a:solidFill>
+              <a:srgbClr val="808082"/>
+            </a:solidFill>
+            <a:headEnd type="none" w="med" len="sm"/>
+            <a:tailEnd type="none" w="med" len="sm"/>
+          </a:ln>
+          <a:effectLst/>
+        </p:spPr>
+        <p:style>
+          <a:lnRef idx="2">
+            <a:schemeClr val="accent1"/>
+          </a:lnRef>
+          <a:fillRef idx="0">
+            <a:schemeClr val="accent1"/>
+          </a:fillRef>
+          <a:effectRef idx="1">
+            <a:schemeClr val="accent1"/>
+          </a:effectRef>
+          <a:fontRef idx="minor">
+            <a:schemeClr val="tx1"/>
+          </a:fontRef>
+        </p:style>
+      </p:cxnSp>
+      <p:cxnSp>
+        <p:nvCxnSpPr>
+          <p:cNvPr id="100" name="Straight Arrow Connector 99"/>
+          <p:cNvCxnSpPr>
+            <a:stCxn id="82" idx="2"/>
+            <a:endCxn id="7" idx="0"/>
+          </p:cNvCxnSpPr>
+          <p:nvPr/>
+        </p:nvCxnSpPr>
+        <p:spPr>
+          <a:xfrm>
+            <a:off x="5818685" y="2283898"/>
+            <a:ext cx="0" cy="858151"/>
+          </a:xfrm>
+          <a:prstGeom prst="straightConnector1">
+            <a:avLst/>
+          </a:prstGeom>
+          <a:ln w="19050">
+            <a:solidFill>
+              <a:srgbClr val="808082"/>
+            </a:solidFill>
+            <a:headEnd type="none" w="med" len="sm"/>
+            <a:tailEnd type="triangle" w="med" len="sm"/>
+          </a:ln>
+          <a:effectLst/>
+        </p:spPr>
+        <p:style>
+          <a:lnRef idx="2">
+            <a:schemeClr val="accent1"/>
+          </a:lnRef>
+          <a:fillRef idx="0">
+            <a:schemeClr val="accent1"/>
+          </a:fillRef>
+          <a:effectRef idx="1">
+            <a:schemeClr val="accent1"/>
+          </a:effectRef>
+          <a:fontRef idx="minor">
+            <a:schemeClr val="tx1"/>
+          </a:fontRef>
+        </p:style>
+      </p:cxnSp>
+      <p:cxnSp>
+        <p:nvCxnSpPr>
+          <p:cNvPr id="111" name="Elbow Connector 110"/>
+          <p:cNvCxnSpPr>
+            <a:stCxn id="23" idx="1"/>
+            <a:endCxn id="7" idx="1"/>
+          </p:cNvCxnSpPr>
+          <p:nvPr/>
+        </p:nvCxnSpPr>
+        <p:spPr>
+          <a:xfrm rot="10800000" flipH="1" flipV="1">
+            <a:off x="1808372" y="3260301"/>
+            <a:ext cx="3024578" cy="601748"/>
+          </a:xfrm>
+          <a:prstGeom prst="bentConnector3">
+            <a:avLst>
+              <a:gd name="adj1" fmla="val -7558"/>
+            </a:avLst>
+          </a:prstGeom>
+          <a:ln w="19050">
+            <a:solidFill>
+              <a:srgbClr val="808082"/>
+            </a:solidFill>
+            <a:headEnd type="none" w="med" len="sm"/>
+            <a:tailEnd type="triangle" w="med" len="sm"/>
+          </a:ln>
+          <a:effectLst/>
+        </p:spPr>
+        <p:style>
+          <a:lnRef idx="2">
+            <a:schemeClr val="accent1"/>
+          </a:lnRef>
+          <a:fillRef idx="0">
+            <a:schemeClr val="accent1"/>
+          </a:fillRef>
+          <a:effectRef idx="1">
+            <a:schemeClr val="accent1"/>
+          </a:effectRef>
+          <a:fontRef idx="minor">
+            <a:schemeClr val="tx1"/>
+          </a:fontRef>
+        </p:style>
+      </p:cxnSp>
+      <p:cxnSp>
+        <p:nvCxnSpPr>
+          <p:cNvPr id="130" name="Elbow Connector 129"/>
+          <p:cNvCxnSpPr>
+            <a:stCxn id="65" idx="2"/>
+            <a:endCxn id="7" idx="1"/>
+          </p:cNvCxnSpPr>
+          <p:nvPr/>
+        </p:nvCxnSpPr>
+        <p:spPr>
+          <a:xfrm rot="16200000" flipH="1">
+            <a:off x="3475340" y="2504439"/>
+            <a:ext cx="1138768" cy="1576452"/>
+          </a:xfrm>
+          <a:prstGeom prst="bentConnector2">
+            <a:avLst/>
+          </a:prstGeom>
+          <a:ln w="19050">
+            <a:solidFill>
+              <a:srgbClr val="808082"/>
+            </a:solidFill>
+            <a:headEnd type="none" w="med" len="sm"/>
+            <a:tailEnd type="triangle" w="med" len="sm"/>
+          </a:ln>
+          <a:effectLst/>
+        </p:spPr>
+        <p:style>
+          <a:lnRef idx="2">
+            <a:schemeClr val="accent1"/>
+          </a:lnRef>
+          <a:fillRef idx="0">
+            <a:schemeClr val="accent1"/>
+          </a:fillRef>
+          <a:effectRef idx="1">
+            <a:schemeClr val="accent1"/>
+          </a:effectRef>
+          <a:fontRef idx="minor">
+            <a:schemeClr val="tx1"/>
+          </a:fontRef>
+        </p:style>
+      </p:cxnSp>
+      <p:cxnSp>
+        <p:nvCxnSpPr>
+          <p:cNvPr id="152" name="Straight Arrow Connector 151"/>
+          <p:cNvCxnSpPr>
+            <a:stCxn id="7" idx="3"/>
+            <a:endCxn id="6" idx="1"/>
+          </p:cNvCxnSpPr>
+          <p:nvPr/>
+        </p:nvCxnSpPr>
+        <p:spPr>
+          <a:xfrm>
+            <a:off x="6812950" y="3862049"/>
+            <a:ext cx="1121683" cy="0"/>
+          </a:xfrm>
+          <a:prstGeom prst="straightConnector1">
+            <a:avLst/>
+          </a:prstGeom>
+          <a:ln w="19050">
+            <a:solidFill>
+              <a:srgbClr val="808082"/>
+            </a:solidFill>
+            <a:headEnd type="none" w="med" len="sm"/>
+            <a:tailEnd type="triangle" w="med" len="sm"/>
+          </a:ln>
+          <a:effectLst/>
+        </p:spPr>
+        <p:style>
+          <a:lnRef idx="2">
+            <a:schemeClr val="accent1"/>
+          </a:lnRef>
+          <a:fillRef idx="0">
+            <a:schemeClr val="accent1"/>
+          </a:fillRef>
+          <a:effectRef idx="1">
+            <a:schemeClr val="accent1"/>
+          </a:effectRef>
+          <a:fontRef idx="minor">
+            <a:schemeClr val="tx1"/>
+          </a:fontRef>
+        </p:style>
+      </p:cxnSp>
+      <p:sp>
+        <p:nvSpPr>
+          <p:cNvPr id="31" name="Rectangle 30"/>
+          <p:cNvSpPr/>
+          <p:nvPr/>
+        </p:nvSpPr>
+        <p:spPr>
+          <a:xfrm>
+            <a:off x="7934633" y="1123950"/>
+            <a:ext cx="2052000" cy="1704056"/>
+          </a:xfrm>
+          <a:prstGeom prst="rect">
+            <a:avLst/>
+          </a:prstGeom>
+          <a:solidFill>
+            <a:srgbClr val="D77B00">
+              <a:alpha val="40000"/>
+            </a:srgbClr>
+          </a:solidFill>
+          <a:ln>
+            <a:noFill/>
+          </a:ln>
+          <a:effectLst/>
+        </p:spPr>
+        <p:style>
+          <a:lnRef idx="1">
+            <a:schemeClr val="accent1"/>
+          </a:lnRef>
+          <a:fillRef idx="3">
+            <a:schemeClr val="accent1"/>
+          </a:fillRef>
+          <a:effectRef idx="2">
+            <a:schemeClr val="accent1"/>
+          </a:effectRef>
+          <a:fontRef idx="minor">
+            <a:schemeClr val="lt1"/>
+          </a:fontRef>
+        </p:style>
+        <p:txBody>
+          <a:bodyPr rtlCol="0" anchor="t"/>
+          <a:lstStyle/>
+          <a:p>
+            <a:pPr algn="ctr"/>
+            <a:r>
+              <a:rPr lang="en-US" dirty="0" smtClean="0">
+                <a:solidFill>
+                  <a:schemeClr val="tx1"/>
+                </a:solidFill>
+              </a:rPr>
+              <a:t>Web Page </a:t>
+            </a:r>
+            <a:r>
+              <a:rPr lang="en-US" dirty="0" smtClean="0">
+                <a:solidFill>
+                  <a:schemeClr val="tx1"/>
+                </a:solidFill>
+              </a:rPr>
+              <a:t>Vendor2</a:t>
+            </a:r>
+            <a:endParaRPr lang="en-GB" dirty="0">
+              <a:solidFill>
+                <a:schemeClr val="tx1"/>
+              </a:solidFill>
+            </a:endParaRPr>
+          </a:p>
+        </p:txBody>
+      </p:sp>
+      <p:sp>
+        <p:nvSpPr>
+          <p:cNvPr id="33" name="Rectangle 32"/>
+          <p:cNvSpPr/>
+          <p:nvPr/>
+        </p:nvSpPr>
+        <p:spPr>
+          <a:xfrm>
+            <a:off x="9046892" y="2316884"/>
+            <a:ext cx="828000" cy="216000"/>
+          </a:xfrm>
+          <a:prstGeom prst="rect">
+            <a:avLst/>
+          </a:prstGeom>
+          <a:solidFill>
+            <a:srgbClr val="58595B"/>
+          </a:solidFill>
+          <a:ln>
+            <a:noFill/>
+          </a:ln>
+          <a:effectLst/>
+        </p:spPr>
+        <p:style>
+          <a:lnRef idx="1">
+            <a:schemeClr val="accent1"/>
+          </a:lnRef>
+          <a:fillRef idx="3">
+            <a:schemeClr val="accent1"/>
+          </a:fillRef>
+          <a:effectRef idx="2">
+            <a:schemeClr val="accent1"/>
+          </a:effectRef>
+          <a:fontRef idx="minor">
+            <a:schemeClr val="lt1"/>
+          </a:fontRef>
+        </p:style>
+        <p:txBody>
+          <a:bodyPr rtlCol="0" anchor="ctr"/>
+          <a:lstStyle/>
+          <a:p>
+            <a:pPr algn="ctr"/>
+            <a:r>
+              <a:rPr lang="en-US" sz="1200" dirty="0"/>
+              <a:t>B</a:t>
+            </a:r>
+            <a:r>
+              <a:rPr lang="en-US" sz="1200" dirty="0" smtClean="0"/>
+              <a:t>.2.PACK</a:t>
+            </a:r>
+            <a:endParaRPr lang="en-GB" sz="1200" dirty="0"/>
+          </a:p>
+        </p:txBody>
+      </p:sp>
+      <p:sp>
+        <p:nvSpPr>
+          <p:cNvPr id="35" name="Rectangle 34"/>
+          <p:cNvSpPr/>
+          <p:nvPr/>
+        </p:nvSpPr>
+        <p:spPr>
+          <a:xfrm>
+            <a:off x="8012765" y="1997391"/>
+            <a:ext cx="864582" cy="216000"/>
+          </a:xfrm>
+          <a:prstGeom prst="rect">
+            <a:avLst/>
+          </a:prstGeom>
+          <a:solidFill>
+            <a:srgbClr val="808082"/>
+          </a:solidFill>
+          <a:ln>
+            <a:noFill/>
+          </a:ln>
+          <a:effectLst/>
+        </p:spPr>
+        <p:style>
+          <a:lnRef idx="1">
+            <a:schemeClr val="accent1"/>
+          </a:lnRef>
+          <a:fillRef idx="3">
+            <a:schemeClr val="accent1"/>
+          </a:fillRef>
+          <a:effectRef idx="2">
+            <a:schemeClr val="accent1"/>
+          </a:effectRef>
+          <a:fontRef idx="minor">
+            <a:schemeClr val="lt1"/>
+          </a:fontRef>
+        </p:style>
+        <p:txBody>
+          <a:bodyPr rtlCol="0" anchor="ctr"/>
+          <a:lstStyle/>
+          <a:p>
+            <a:pPr algn="ctr"/>
+            <a:r>
+              <a:rPr lang="en-US" sz="1200" dirty="0" smtClean="0"/>
+              <a:t>B.PDSC</a:t>
+            </a:r>
+            <a:endParaRPr lang="en-GB" sz="1200" dirty="0"/>
+          </a:p>
+        </p:txBody>
+      </p:sp>
+      <p:sp>
+        <p:nvSpPr>
+          <p:cNvPr id="36" name="Rectangle 35"/>
+          <p:cNvSpPr/>
+          <p:nvPr/>
+        </p:nvSpPr>
+        <p:spPr>
+          <a:xfrm>
+            <a:off x="9046892" y="1996160"/>
+            <a:ext cx="828000" cy="216000"/>
+          </a:xfrm>
+          <a:prstGeom prst="rect">
+            <a:avLst/>
+          </a:prstGeom>
+          <a:solidFill>
+            <a:srgbClr val="58595B"/>
+          </a:solidFill>
+          <a:ln>
+            <a:noFill/>
+          </a:ln>
+          <a:effectLst/>
+        </p:spPr>
+        <p:style>
+          <a:lnRef idx="1">
+            <a:schemeClr val="accent1"/>
+          </a:lnRef>
+          <a:fillRef idx="3">
+            <a:schemeClr val="accent1"/>
+          </a:fillRef>
+          <a:effectRef idx="2">
+            <a:schemeClr val="accent1"/>
+          </a:effectRef>
+          <a:fontRef idx="minor">
+            <a:schemeClr val="lt1"/>
+          </a:fontRef>
+        </p:style>
+        <p:txBody>
+          <a:bodyPr rtlCol="0" anchor="ctr"/>
+          <a:lstStyle/>
+          <a:p>
+            <a:pPr algn="ctr"/>
+            <a:r>
+              <a:rPr lang="en-US" sz="1200" dirty="0" smtClean="0"/>
+              <a:t>B.1.PACK</a:t>
+            </a:r>
+            <a:endParaRPr lang="en-GB" sz="1200" dirty="0"/>
+          </a:p>
+        </p:txBody>
+      </p:sp>
+      <p:cxnSp>
+        <p:nvCxnSpPr>
+          <p:cNvPr id="37" name="Straight Arrow Connector 36"/>
+          <p:cNvCxnSpPr>
+            <a:stCxn id="35" idx="3"/>
+            <a:endCxn id="36" idx="1"/>
+          </p:cNvCxnSpPr>
+          <p:nvPr/>
+        </p:nvCxnSpPr>
+        <p:spPr>
+          <a:xfrm flipV="1">
+            <a:off x="8877347" y="2104160"/>
+            <a:ext cx="169545" cy="1231"/>
+          </a:xfrm>
+          <a:prstGeom prst="straightConnector1">
+            <a:avLst/>
+          </a:prstGeom>
+          <a:ln w="19050">
+            <a:solidFill>
+              <a:srgbClr val="808082"/>
+            </a:solidFill>
+            <a:headEnd type="none" w="med" len="sm"/>
+            <a:tailEnd type="none" w="med" len="sm"/>
+          </a:ln>
+          <a:effectLst/>
+        </p:spPr>
+        <p:style>
+          <a:lnRef idx="2">
+            <a:schemeClr val="accent1"/>
+          </a:lnRef>
+          <a:fillRef idx="0">
+            <a:schemeClr val="accent1"/>
+          </a:fillRef>
+          <a:effectRef idx="1">
+            <a:schemeClr val="accent1"/>
+          </a:effectRef>
+          <a:fontRef idx="minor">
+            <a:schemeClr val="tx1"/>
+          </a:fontRef>
+        </p:style>
+      </p:cxnSp>
+      <p:cxnSp>
+        <p:nvCxnSpPr>
+          <p:cNvPr id="38" name="Elbow Connector 37"/>
+          <p:cNvCxnSpPr>
+            <a:stCxn id="33" idx="1"/>
+            <a:endCxn id="35" idx="3"/>
+          </p:cNvCxnSpPr>
+          <p:nvPr/>
+        </p:nvCxnSpPr>
+        <p:spPr>
+          <a:xfrm rot="10800000">
+            <a:off x="8877348" y="2105392"/>
+            <a:ext cx="169545" cy="319493"/>
+          </a:xfrm>
+          <a:prstGeom prst="bentConnector3">
+            <a:avLst>
+              <a:gd name="adj1" fmla="val 50000"/>
+            </a:avLst>
+          </a:prstGeom>
+          <a:ln w="19050">
+            <a:solidFill>
+              <a:srgbClr val="808082"/>
+            </a:solidFill>
+            <a:headEnd type="none" w="med" len="sm"/>
+            <a:tailEnd type="none" w="med" len="sm"/>
+          </a:ln>
+          <a:effectLst/>
+        </p:spPr>
+        <p:style>
+          <a:lnRef idx="2">
+            <a:schemeClr val="accent1"/>
+          </a:lnRef>
+          <a:fillRef idx="0">
+            <a:schemeClr val="accent1"/>
+          </a:fillRef>
+          <a:effectRef idx="1">
+            <a:schemeClr val="accent1"/>
+          </a:effectRef>
+          <a:fontRef idx="minor">
+            <a:schemeClr val="tx1"/>
+          </a:fontRef>
+        </p:style>
+      </p:cxnSp>
+      <p:sp>
+        <p:nvSpPr>
+          <p:cNvPr id="39" name="TextBox 38"/>
+          <p:cNvSpPr txBox="1"/>
+          <p:nvPr/>
+        </p:nvSpPr>
+        <p:spPr>
+          <a:xfrm>
+            <a:off x="3766294" y="1398745"/>
+            <a:ext cx="1066656" cy="269966"/>
+          </a:xfrm>
+          <a:prstGeom prst="rect">
+            <a:avLst/>
+          </a:prstGeom>
+        </p:spPr>
+        <p:txBody>
+          <a:bodyPr vert="horz" wrap="square" lIns="0" tIns="0" rIns="0" bIns="0" rtlCol="0" anchor="ctr">
+            <a:normAutofit/>
+          </a:bodyPr>
+          <a:lstStyle/>
+          <a:p>
+            <a:pPr algn="ctr"/>
+            <a:r>
+              <a:rPr lang="en-US" sz="1200" dirty="0" smtClean="0">
+                <a:solidFill>
+                  <a:srgbClr val="58595B"/>
+                </a:solidFill>
+              </a:rPr>
+              <a:t>is read by</a:t>
+            </a:r>
+            <a:endParaRPr lang="en-GB" sz="1200" dirty="0" smtClean="0">
+              <a:solidFill>
+                <a:srgbClr val="58595B"/>
+              </a:solidFill>
+            </a:endParaRPr>
+          </a:p>
+        </p:txBody>
+      </p:sp>
+      <p:sp>
+        <p:nvSpPr>
+          <p:cNvPr id="56" name="Rectangle 55"/>
+          <p:cNvSpPr/>
+          <p:nvPr/>
+        </p:nvSpPr>
+        <p:spPr>
+          <a:xfrm>
+            <a:off x="2673069" y="1560711"/>
+            <a:ext cx="1008000" cy="216000"/>
+          </a:xfrm>
+          <a:prstGeom prst="rect">
+            <a:avLst/>
+          </a:prstGeom>
+          <a:solidFill>
+            <a:srgbClr val="CF364A"/>
+          </a:solidFill>
+          <a:ln>
+            <a:noFill/>
+          </a:ln>
+          <a:effectLst/>
+        </p:spPr>
+        <p:style>
+          <a:lnRef idx="1">
+            <a:schemeClr val="accent1"/>
+          </a:lnRef>
+          <a:fillRef idx="3">
+            <a:schemeClr val="accent1"/>
+          </a:fillRef>
+          <a:effectRef idx="2">
+            <a:schemeClr val="accent1"/>
+          </a:effectRef>
+          <a:fontRef idx="minor">
+            <a:schemeClr val="lt1"/>
+          </a:fontRef>
+        </p:style>
+        <p:txBody>
+          <a:bodyPr rtlCol="0" anchor="ctr"/>
+          <a:lstStyle/>
+          <a:p>
+            <a:pPr algn="ctr"/>
+            <a:r>
+              <a:rPr lang="en-US" sz="1200" dirty="0" smtClean="0"/>
+              <a:t>vendor1.pidx</a:t>
+            </a:r>
+            <a:endParaRPr lang="en-GB" sz="1200" dirty="0"/>
+          </a:p>
+        </p:txBody>
+      </p:sp>
+      <p:sp>
+        <p:nvSpPr>
+          <p:cNvPr id="58" name="Rectangle 57"/>
+          <p:cNvSpPr/>
+          <p:nvPr/>
+        </p:nvSpPr>
+        <p:spPr>
+          <a:xfrm>
+            <a:off x="8008457" y="1560711"/>
+            <a:ext cx="1008000" cy="216000"/>
+          </a:xfrm>
+          <a:prstGeom prst="rect">
+            <a:avLst/>
+          </a:prstGeom>
+          <a:solidFill>
+            <a:srgbClr val="CF364A"/>
+          </a:solidFill>
+          <a:ln>
+            <a:noFill/>
+          </a:ln>
+          <a:effectLst/>
+        </p:spPr>
+        <p:style>
+          <a:lnRef idx="1">
+            <a:schemeClr val="accent1"/>
+          </a:lnRef>
+          <a:fillRef idx="3">
+            <a:schemeClr val="accent1"/>
+          </a:fillRef>
+          <a:effectRef idx="2">
+            <a:schemeClr val="accent1"/>
+          </a:effectRef>
+          <a:fontRef idx="minor">
+            <a:schemeClr val="lt1"/>
+          </a:fontRef>
+        </p:style>
+        <p:txBody>
+          <a:bodyPr rtlCol="0" anchor="ctr"/>
+          <a:lstStyle/>
+          <a:p>
+            <a:pPr algn="ctr"/>
+            <a:r>
+              <a:rPr lang="en-US" sz="1200" dirty="0" smtClean="0"/>
+              <a:t>vendor2.pidx</a:t>
+            </a:r>
+            <a:endParaRPr lang="en-GB" sz="1200" dirty="0"/>
+          </a:p>
+        </p:txBody>
+      </p:sp>
+      <p:cxnSp>
+        <p:nvCxnSpPr>
+          <p:cNvPr id="18" name="Straight Arrow Connector 17"/>
+          <p:cNvCxnSpPr>
+            <a:stCxn id="12" idx="1"/>
+            <a:endCxn id="56" idx="3"/>
+          </p:cNvCxnSpPr>
+          <p:nvPr/>
+        </p:nvCxnSpPr>
+        <p:spPr>
+          <a:xfrm flipH="1">
+            <a:off x="3681069" y="1668711"/>
+            <a:ext cx="1240047" cy="0"/>
+          </a:xfrm>
+          <a:prstGeom prst="straightConnector1">
+            <a:avLst/>
+          </a:prstGeom>
+          <a:ln w="19050">
+            <a:solidFill>
+              <a:srgbClr val="808082"/>
+            </a:solidFill>
+            <a:headEnd type="triangle" w="med" len="med"/>
+            <a:tailEnd type="none" w="med" len="med"/>
+          </a:ln>
+          <a:effectLst/>
+        </p:spPr>
+        <p:style>
+          <a:lnRef idx="2">
+            <a:schemeClr val="accent1"/>
+          </a:lnRef>
+          <a:fillRef idx="0">
+            <a:schemeClr val="accent1"/>
+          </a:fillRef>
+          <a:effectRef idx="1">
+            <a:schemeClr val="accent1"/>
+          </a:effectRef>
+          <a:fontRef idx="minor">
+            <a:schemeClr val="tx1"/>
+          </a:fontRef>
+        </p:style>
+      </p:cxnSp>
+      <p:sp>
+        <p:nvSpPr>
+          <p:cNvPr id="65" name="Rectangle 64"/>
+          <p:cNvSpPr/>
+          <p:nvPr/>
+        </p:nvSpPr>
+        <p:spPr>
+          <a:xfrm>
+            <a:off x="2842498" y="2507281"/>
+            <a:ext cx="828000" cy="216000"/>
+          </a:xfrm>
+          <a:prstGeom prst="rect">
+            <a:avLst/>
+          </a:prstGeom>
+          <a:solidFill>
+            <a:srgbClr val="808082"/>
+          </a:solidFill>
+          <a:ln>
+            <a:noFill/>
+          </a:ln>
+          <a:effectLst/>
+        </p:spPr>
+        <p:style>
+          <a:lnRef idx="1">
+            <a:schemeClr val="accent1"/>
+          </a:lnRef>
+          <a:fillRef idx="3">
+            <a:schemeClr val="accent1"/>
+          </a:fillRef>
+          <a:effectRef idx="2">
+            <a:schemeClr val="accent1"/>
+          </a:effectRef>
+          <a:fontRef idx="minor">
+            <a:schemeClr val="lt1"/>
+          </a:fontRef>
+        </p:style>
+        <p:txBody>
+          <a:bodyPr rtlCol="0" anchor="ctr"/>
+          <a:lstStyle/>
+          <a:p>
+            <a:pPr algn="ctr"/>
+            <a:r>
+              <a:rPr lang="en-US" sz="1200" dirty="0" smtClean="0"/>
+              <a:t>A.PDSC</a:t>
+            </a:r>
+            <a:endParaRPr lang="en-GB" sz="1200" dirty="0"/>
+          </a:p>
+        </p:txBody>
+      </p:sp>
+      <p:sp>
+        <p:nvSpPr>
+          <p:cNvPr id="82" name="Rectangle 81"/>
+          <p:cNvSpPr/>
+          <p:nvPr/>
+        </p:nvSpPr>
+        <p:spPr>
+          <a:xfrm>
+            <a:off x="4918685" y="1995898"/>
+            <a:ext cx="1800000" cy="288000"/>
+          </a:xfrm>
+          <a:prstGeom prst="rect">
+            <a:avLst/>
+          </a:prstGeom>
+          <a:solidFill>
+            <a:srgbClr val="808082"/>
+          </a:solidFill>
+          <a:ln>
+            <a:noFill/>
+          </a:ln>
+          <a:effectLst/>
+        </p:spPr>
+        <p:style>
+          <a:lnRef idx="1">
+            <a:schemeClr val="accent1"/>
+          </a:lnRef>
+          <a:fillRef idx="3">
+            <a:schemeClr val="accent1"/>
+          </a:fillRef>
+          <a:effectRef idx="2">
+            <a:schemeClr val="accent1"/>
+          </a:effectRef>
+          <a:fontRef idx="minor">
+            <a:schemeClr val="lt1"/>
+          </a:fontRef>
+        </p:style>
+        <p:txBody>
+          <a:bodyPr rtlCol="0" anchor="ctr"/>
+          <a:lstStyle/>
+          <a:p>
+            <a:pPr algn="ctr"/>
+            <a:r>
+              <a:rPr lang="en-US" sz="1600" dirty="0" err="1" smtClean="0"/>
+              <a:t>index.pidx</a:t>
+            </a:r>
+            <a:endParaRPr lang="en-GB" sz="1600" dirty="0"/>
+          </a:p>
+        </p:txBody>
+      </p:sp>
+      <p:cxnSp>
+        <p:nvCxnSpPr>
+          <p:cNvPr id="95" name="Straight Arrow Connector 94"/>
+          <p:cNvCxnSpPr>
+            <a:endCxn id="25" idx="0"/>
+          </p:cNvCxnSpPr>
+          <p:nvPr/>
+        </p:nvCxnSpPr>
+        <p:spPr>
+          <a:xfrm>
+            <a:off x="3267069" y="1781070"/>
+            <a:ext cx="0" cy="216000"/>
+          </a:xfrm>
+          <a:prstGeom prst="straightConnector1">
+            <a:avLst/>
+          </a:prstGeom>
+          <a:ln w="19050">
+            <a:solidFill>
+              <a:srgbClr val="808082"/>
+            </a:solidFill>
+            <a:headEnd type="none" w="med" len="med"/>
+            <a:tailEnd type="triangle" w="med" len="med"/>
+          </a:ln>
+          <a:effectLst/>
+        </p:spPr>
+        <p:style>
+          <a:lnRef idx="2">
+            <a:schemeClr val="accent1"/>
+          </a:lnRef>
+          <a:fillRef idx="0">
+            <a:schemeClr val="accent1"/>
+          </a:fillRef>
+          <a:effectRef idx="1">
+            <a:schemeClr val="accent1"/>
+          </a:effectRef>
+          <a:fontRef idx="minor">
+            <a:schemeClr val="tx1"/>
+          </a:fontRef>
+        </p:style>
+      </p:cxnSp>
+      <p:cxnSp>
+        <p:nvCxnSpPr>
+          <p:cNvPr id="98" name="Straight Arrow Connector 97"/>
+          <p:cNvCxnSpPr/>
+          <p:nvPr/>
+        </p:nvCxnSpPr>
+        <p:spPr>
+          <a:xfrm>
+            <a:off x="3481462" y="1781070"/>
+            <a:ext cx="0" cy="726211"/>
+          </a:xfrm>
+          <a:prstGeom prst="straightConnector1">
+            <a:avLst/>
+          </a:prstGeom>
+          <a:ln w="19050">
+            <a:solidFill>
+              <a:srgbClr val="808082"/>
+            </a:solidFill>
+            <a:headEnd type="none" w="med" len="med"/>
+            <a:tailEnd type="triangle" w="med" len="med"/>
+          </a:ln>
+          <a:effectLst/>
+        </p:spPr>
+        <p:style>
+          <a:lnRef idx="2">
+            <a:schemeClr val="accent1"/>
+          </a:lnRef>
+          <a:fillRef idx="0">
+            <a:schemeClr val="accent1"/>
+          </a:fillRef>
+          <a:effectRef idx="1">
+            <a:schemeClr val="accent1"/>
+          </a:effectRef>
+          <a:fontRef idx="minor">
+            <a:schemeClr val="tx1"/>
+          </a:fontRef>
+        </p:style>
+      </p:cxnSp>
+      <p:sp>
+        <p:nvSpPr>
+          <p:cNvPr id="25" name="Rectangle 24"/>
+          <p:cNvSpPr/>
+          <p:nvPr/>
+        </p:nvSpPr>
+        <p:spPr>
+          <a:xfrm>
+            <a:off x="2853069" y="1997070"/>
+            <a:ext cx="828000" cy="216000"/>
+          </a:xfrm>
+          <a:prstGeom prst="rect">
+            <a:avLst/>
+          </a:prstGeom>
+          <a:solidFill>
+            <a:srgbClr val="808082"/>
+          </a:solidFill>
+          <a:ln>
+            <a:noFill/>
+          </a:ln>
+          <a:effectLst/>
+        </p:spPr>
+        <p:style>
+          <a:lnRef idx="1">
+            <a:schemeClr val="accent1"/>
+          </a:lnRef>
+          <a:fillRef idx="3">
+            <a:schemeClr val="accent1"/>
+          </a:fillRef>
+          <a:effectRef idx="2">
+            <a:schemeClr val="accent1"/>
+          </a:effectRef>
+          <a:fontRef idx="minor">
+            <a:schemeClr val="lt1"/>
+          </a:fontRef>
+        </p:style>
+        <p:txBody>
+          <a:bodyPr rtlCol="0" anchor="ctr"/>
+          <a:lstStyle/>
+          <a:p>
+            <a:pPr algn="ctr"/>
+            <a:r>
+              <a:rPr lang="en-US" sz="1200" dirty="0" smtClean="0"/>
+              <a:t>C.PDSC</a:t>
+            </a:r>
+            <a:endParaRPr lang="en-GB" sz="1200" dirty="0"/>
+          </a:p>
+        </p:txBody>
+      </p:sp>
+      <p:cxnSp>
+        <p:nvCxnSpPr>
+          <p:cNvPr id="105" name="Straight Arrow Connector 104"/>
+          <p:cNvCxnSpPr>
+            <a:stCxn id="12" idx="3"/>
+            <a:endCxn id="58" idx="1"/>
+          </p:cNvCxnSpPr>
+          <p:nvPr/>
+        </p:nvCxnSpPr>
+        <p:spPr>
+          <a:xfrm>
+            <a:off x="6721116" y="1668711"/>
+            <a:ext cx="1287341" cy="0"/>
+          </a:xfrm>
+          <a:prstGeom prst="straightConnector1">
+            <a:avLst/>
+          </a:prstGeom>
+          <a:ln w="19050">
+            <a:solidFill>
+              <a:srgbClr val="808082"/>
+            </a:solidFill>
+            <a:headEnd type="triangle" w="med" len="med"/>
+            <a:tailEnd type="none" w="med" len="med"/>
+          </a:ln>
+          <a:effectLst/>
+        </p:spPr>
+        <p:style>
+          <a:lnRef idx="2">
+            <a:schemeClr val="accent1"/>
+          </a:lnRef>
+          <a:fillRef idx="0">
+            <a:schemeClr val="accent1"/>
+          </a:fillRef>
+          <a:effectRef idx="1">
+            <a:schemeClr val="accent1"/>
+          </a:effectRef>
+          <a:fontRef idx="minor">
+            <a:schemeClr val="tx1"/>
+          </a:fontRef>
+        </p:style>
+      </p:cxnSp>
+      <p:cxnSp>
+        <p:nvCxnSpPr>
+          <p:cNvPr id="107" name="Straight Arrow Connector 106"/>
+          <p:cNvCxnSpPr/>
+          <p:nvPr/>
+        </p:nvCxnSpPr>
+        <p:spPr>
+          <a:xfrm>
+            <a:off x="8445056" y="1781391"/>
+            <a:ext cx="0" cy="216000"/>
+          </a:xfrm>
+          <a:prstGeom prst="straightConnector1">
+            <a:avLst/>
+          </a:prstGeom>
+          <a:ln w="19050">
+            <a:solidFill>
+              <a:srgbClr val="808082"/>
+            </a:solidFill>
+            <a:headEnd type="none" w="med" len="med"/>
+            <a:tailEnd type="triangle" w="med" len="med"/>
+          </a:ln>
+          <a:effectLst/>
+        </p:spPr>
+        <p:style>
+          <a:lnRef idx="2">
+            <a:schemeClr val="accent1"/>
+          </a:lnRef>
+          <a:fillRef idx="0">
+            <a:schemeClr val="accent1"/>
+          </a:fillRef>
+          <a:effectRef idx="1">
+            <a:schemeClr val="accent1"/>
+          </a:effectRef>
+          <a:fontRef idx="minor">
+            <a:schemeClr val="tx1"/>
+          </a:fontRef>
+        </p:style>
+      </p:cxnSp>
+      <p:cxnSp>
+        <p:nvCxnSpPr>
+          <p:cNvPr id="110" name="Straight Arrow Connector 109"/>
+          <p:cNvCxnSpPr>
+            <a:stCxn id="12" idx="2"/>
+            <a:endCxn id="82" idx="0"/>
+          </p:cNvCxnSpPr>
+          <p:nvPr/>
+        </p:nvCxnSpPr>
+        <p:spPr>
+          <a:xfrm flipH="1">
+            <a:off x="5818685" y="1812711"/>
+            <a:ext cx="0" cy="183187"/>
+          </a:xfrm>
+          <a:prstGeom prst="straightConnector1">
+            <a:avLst/>
+          </a:prstGeom>
+          <a:ln w="19050">
+            <a:solidFill>
+              <a:srgbClr val="808082"/>
+            </a:solidFill>
+            <a:headEnd type="none" w="med" len="med"/>
+            <a:tailEnd type="triangle" w="med" len="med"/>
+          </a:ln>
+          <a:effectLst/>
+        </p:spPr>
+        <p:style>
+          <a:lnRef idx="2">
+            <a:schemeClr val="accent1"/>
+          </a:lnRef>
+          <a:fillRef idx="0">
+            <a:schemeClr val="accent1"/>
+          </a:fillRef>
+          <a:effectRef idx="1">
+            <a:schemeClr val="accent1"/>
+          </a:effectRef>
+          <a:fontRef idx="minor">
+            <a:schemeClr val="tx1"/>
+          </a:fontRef>
+        </p:style>
+      </p:cxnSp>
+      <p:sp>
+        <p:nvSpPr>
+          <p:cNvPr id="113" name="TextBox 112"/>
+          <p:cNvSpPr txBox="1"/>
+          <p:nvPr/>
+        </p:nvSpPr>
+        <p:spPr>
+          <a:xfrm>
+            <a:off x="6812949" y="1398745"/>
+            <a:ext cx="1121683" cy="269966"/>
+          </a:xfrm>
+          <a:prstGeom prst="rect">
+            <a:avLst/>
+          </a:prstGeom>
+        </p:spPr>
+        <p:txBody>
+          <a:bodyPr vert="horz" wrap="square" lIns="0" tIns="0" rIns="0" bIns="0" rtlCol="0" anchor="ctr">
+            <a:normAutofit/>
+          </a:bodyPr>
+          <a:lstStyle/>
+          <a:p>
+            <a:pPr algn="ctr"/>
+            <a:r>
+              <a:rPr lang="en-US" sz="1200" dirty="0" smtClean="0">
+                <a:solidFill>
+                  <a:srgbClr val="58595B"/>
+                </a:solidFill>
+              </a:rPr>
+              <a:t>is read by</a:t>
+            </a:r>
+            <a:endParaRPr lang="en-GB" sz="1200" dirty="0" smtClean="0">
+              <a:solidFill>
+                <a:srgbClr val="58595B"/>
+              </a:solidFill>
+            </a:endParaRPr>
+          </a:p>
+        </p:txBody>
+      </p:sp>
+      <p:sp>
+        <p:nvSpPr>
+          <p:cNvPr id="114" name="TextBox 113"/>
+          <p:cNvSpPr txBox="1"/>
+          <p:nvPr/>
+        </p:nvSpPr>
+        <p:spPr>
+          <a:xfrm>
+            <a:off x="5849165" y="2578639"/>
+            <a:ext cx="1121683" cy="269966"/>
+          </a:xfrm>
+          <a:prstGeom prst="rect">
+            <a:avLst/>
+          </a:prstGeom>
+        </p:spPr>
+        <p:txBody>
+          <a:bodyPr vert="horz" wrap="square" lIns="0" tIns="0" rIns="0" bIns="0" rtlCol="0" anchor="ctr">
+            <a:normAutofit/>
+          </a:bodyPr>
+          <a:lstStyle/>
+          <a:p>
+            <a:r>
+              <a:rPr lang="en-US" sz="1200" dirty="0">
+                <a:solidFill>
+                  <a:srgbClr val="58595B"/>
+                </a:solidFill>
+              </a:rPr>
+              <a:t>p</a:t>
+            </a:r>
+            <a:r>
+              <a:rPr lang="en-US" sz="1200" dirty="0" smtClean="0">
+                <a:solidFill>
+                  <a:srgbClr val="58595B"/>
+                </a:solidFill>
+              </a:rPr>
+              <a:t>rovides a list to</a:t>
+            </a:r>
+            <a:endParaRPr lang="en-GB" sz="1200" dirty="0" smtClean="0">
+              <a:solidFill>
+                <a:srgbClr val="58595B"/>
+              </a:solidFill>
+            </a:endParaRPr>
+          </a:p>
+        </p:txBody>
+      </p:sp>
+    </p:spTree>
+    <p:extLst>
+      <p:ext uri="{BB962C8B-B14F-4D97-AF65-F5344CB8AC3E}">
+        <p14:creationId xmlns:p14="http://schemas.microsoft.com/office/powerpoint/2010/main" val="2075100935"/>
       </p:ext>
     </p:extLst>
   </p:cSld>
@@ -13621,6 +16291,33 @@
 </file>
 
 <file path=customXml/item1.xml><?xml version="1.0" encoding="utf-8"?>
+<p:properties xmlns:p="http://schemas.microsoft.com/office/2006/metadata/properties" xmlns:xsi="http://www.w3.org/2001/XMLSchema-instance">
+  <documentManagement>
+    <AlternateThumbnailUrl xmlns="http://schemas.microsoft.com/sharepoint/v3">
+      <Url xsi:nil="true"/>
+      <Description xsi:nil="true"/>
+    </AlternateThumbnailUrl>
+    <ImageCreateDate xmlns="http://schemas.microsoft.com/sharepoint/v3" xsi:nil="true"/>
+    <Description xmlns="http://schemas.microsoft.com/sharepoint/v3" xsi:nil="true"/>
+    <_dlc_DocId xmlns="f2ad5090-61a8-4b8c-ab70-68f4ff4d1933">ARM-ECM-0151353</_dlc_DocId>
+    <_dlc_DocIdUrl xmlns="f2ad5090-61a8-4b8c-ab70-68f4ff4d1933">
+      <Url>http://teamsites.arm.com/sites/marketing/branding/_layouts/DocIdRedir.aspx?ID=ARM-ECM-0151353</Url>
+      <Description>ARM-ECM-0151353</Description>
+    </_dlc_DocIdUrl>
+  </documentManagement>
+</p:properties>
+</file>
+
+<file path=customXml/item2.xml><?xml version="1.0" encoding="utf-8"?>
+<?mso-contentType ?>
+<FormTemplates xmlns="http://schemas.microsoft.com/sharepoint/v3/contenttype/forms">
+  <Display>DocumentLibraryForm</Display>
+  <Edit>DocumentLibraryForm</Edit>
+  <New>DocumentLibraryForm</New>
+</FormTemplates>
+</file>
+
+<file path=customXml/item3.xml><?xml version="1.0" encoding="utf-8"?>
 <ct:contentTypeSchema xmlns:ct="http://schemas.microsoft.com/office/2006/metadata/contentType" xmlns:ma="http://schemas.microsoft.com/office/2006/metadata/properties/metaAttributes" ct:_="" ma:_="" ma:contentTypeName="Picture" ma:contentTypeID="0x010102005A5C1BE65173D647975D08D04557E024" ma:contentTypeVersion="3" ma:contentTypeDescription="Upload an image or a photograph." ma:contentTypeScope="" ma:versionID="4e02033e9a8407b55ee482baa8e8773d">
   <xsd:schema xmlns:xsd="http://www.w3.org/2001/XMLSchema" xmlns:xs="http://www.w3.org/2001/XMLSchema" xmlns:p="http://schemas.microsoft.com/office/2006/metadata/properties" xmlns:ns1="http://schemas.microsoft.com/sharepoint/v3" xmlns:ns2="f2ad5090-61a8-4b8c-ab70-68f4ff4d1933" targetNamespace="http://schemas.microsoft.com/office/2006/metadata/properties" ma:root="true" ma:fieldsID="56baf7bb33d679821ced92383ddba583" ns1:_="" ns2:_="">
     <xsd:import namespace="http://schemas.microsoft.com/sharepoint/v3"/>
@@ -13821,33 +16518,6 @@
 </ct:contentTypeSchema>
 </file>
 
-<file path=customXml/item2.xml><?xml version="1.0" encoding="utf-8"?>
-<?mso-contentType ?>
-<FormTemplates xmlns="http://schemas.microsoft.com/sharepoint/v3/contenttype/forms">
-  <Display>DocumentLibraryForm</Display>
-  <Edit>DocumentLibraryForm</Edit>
-  <New>DocumentLibraryForm</New>
-</FormTemplates>
-</file>
-
-<file path=customXml/item3.xml><?xml version="1.0" encoding="utf-8"?>
-<p:properties xmlns:p="http://schemas.microsoft.com/office/2006/metadata/properties" xmlns:xsi="http://www.w3.org/2001/XMLSchema-instance">
-  <documentManagement>
-    <AlternateThumbnailUrl xmlns="http://schemas.microsoft.com/sharepoint/v3">
-      <Url xsi:nil="true"/>
-      <Description xsi:nil="true"/>
-    </AlternateThumbnailUrl>
-    <ImageCreateDate xmlns="http://schemas.microsoft.com/sharepoint/v3" xsi:nil="true"/>
-    <Description xmlns="http://schemas.microsoft.com/sharepoint/v3" xsi:nil="true"/>
-    <_dlc_DocId xmlns="f2ad5090-61a8-4b8c-ab70-68f4ff4d1933">ARM-ECM-0151353</_dlc_DocId>
-    <_dlc_DocIdUrl xmlns="f2ad5090-61a8-4b8c-ab70-68f4ff4d1933">
-      <Url>http://teamsites.arm.com/sites/marketing/branding/_layouts/DocIdRedir.aspx?ID=ARM-ECM-0151353</Url>
-      <Description>ARM-ECM-0151353</Description>
-    </_dlc_DocIdUrl>
-  </documentManagement>
-</p:properties>
-</file>
-
 <file path=customXml/item4.xml><?xml version="1.0" encoding="utf-8"?>
 <?mso-contentType ?>
 <spe:Receivers xmlns:spe="http://schemas.microsoft.com/sharepoint/events">
@@ -13895,6 +16565,31 @@
 </file>
 
 <file path=customXml/itemProps1.xml><?xml version="1.0" encoding="utf-8"?>
+<ds:datastoreItem xmlns:ds="http://schemas.openxmlformats.org/officeDocument/2006/customXml" ds:itemID="{AE6E82D6-7FB8-4D99-A7B6-3C5BB1D894B9}">
+  <ds:schemaRefs>
+    <ds:schemaRef ds:uri="f2ad5090-61a8-4b8c-ab70-68f4ff4d1933"/>
+    <ds:schemaRef ds:uri="http://schemas.microsoft.com/office/2006/metadata/properties"/>
+    <ds:schemaRef ds:uri="http://schemas.microsoft.com/office/2006/documentManagement/types"/>
+    <ds:schemaRef ds:uri="http://purl.org/dc/terms/"/>
+    <ds:schemaRef ds:uri="http://www.w3.org/XML/1998/namespace"/>
+    <ds:schemaRef ds:uri="http://schemas.openxmlformats.org/package/2006/metadata/core-properties"/>
+    <ds:schemaRef ds:uri="http://purl.org/dc/dcmitype/"/>
+    <ds:schemaRef ds:uri="http://schemas.microsoft.com/office/infopath/2007/PartnerControls"/>
+    <ds:schemaRef ds:uri="http://schemas.microsoft.com/sharepoint/v3"/>
+    <ds:schemaRef ds:uri="http://purl.org/dc/elements/1.1/"/>
+  </ds:schemaRefs>
+</ds:datastoreItem>
+</file>
+
+<file path=customXml/itemProps2.xml><?xml version="1.0" encoding="utf-8"?>
+<ds:datastoreItem xmlns:ds="http://schemas.openxmlformats.org/officeDocument/2006/customXml" ds:itemID="{9C777C69-0744-4BF3-8514-FB149EBD2248}">
+  <ds:schemaRefs>
+    <ds:schemaRef ds:uri="http://schemas.microsoft.com/sharepoint/v3/contenttype/forms"/>
+  </ds:schemaRefs>
+</ds:datastoreItem>
+</file>
+
+<file path=customXml/itemProps3.xml><?xml version="1.0" encoding="utf-8"?>
 <ds:datastoreItem xmlns:ds="http://schemas.openxmlformats.org/officeDocument/2006/customXml" ds:itemID="{E2FEA05E-38D0-44EA-8B8D-2375FC6AAF09}">
   <ds:schemaRefs>
     <ds:schemaRef ds:uri="http://schemas.microsoft.com/office/2006/metadata/contentType"/>
@@ -13913,31 +16608,6 @@
 </ds:datastoreItem>
 </file>
 
-<file path=customXml/itemProps2.xml><?xml version="1.0" encoding="utf-8"?>
-<ds:datastoreItem xmlns:ds="http://schemas.openxmlformats.org/officeDocument/2006/customXml" ds:itemID="{9C777C69-0744-4BF3-8514-FB149EBD2248}">
-  <ds:schemaRefs>
-    <ds:schemaRef ds:uri="http://schemas.microsoft.com/sharepoint/v3/contenttype/forms"/>
-  </ds:schemaRefs>
-</ds:datastoreItem>
-</file>
-
-<file path=customXml/itemProps3.xml><?xml version="1.0" encoding="utf-8"?>
-<ds:datastoreItem xmlns:ds="http://schemas.openxmlformats.org/officeDocument/2006/customXml" ds:itemID="{AE6E82D6-7FB8-4D99-A7B6-3C5BB1D894B9}">
-  <ds:schemaRefs>
-    <ds:schemaRef ds:uri="f2ad5090-61a8-4b8c-ab70-68f4ff4d1933"/>
-    <ds:schemaRef ds:uri="http://schemas.microsoft.com/office/2006/metadata/properties"/>
-    <ds:schemaRef ds:uri="http://schemas.microsoft.com/office/2006/documentManagement/types"/>
-    <ds:schemaRef ds:uri="http://purl.org/dc/terms/"/>
-    <ds:schemaRef ds:uri="http://www.w3.org/XML/1998/namespace"/>
-    <ds:schemaRef ds:uri="http://schemas.openxmlformats.org/package/2006/metadata/core-properties"/>
-    <ds:schemaRef ds:uri="http://purl.org/dc/dcmitype/"/>
-    <ds:schemaRef ds:uri="http://schemas.microsoft.com/office/infopath/2007/PartnerControls"/>
-    <ds:schemaRef ds:uri="http://schemas.microsoft.com/sharepoint/v3"/>
-    <ds:schemaRef ds:uri="http://purl.org/dc/elements/1.1/"/>
-  </ds:schemaRefs>
-</ds:datastoreItem>
-</file>
-
 <file path=customXml/itemProps4.xml><?xml version="1.0" encoding="utf-8"?>
 <ds:datastoreItem xmlns:ds="http://schemas.openxmlformats.org/officeDocument/2006/customXml" ds:itemID="{C8CB23D7-89E5-42FF-A5EB-008A06AB37C7}">
   <ds:schemaRefs>

</xml_diff>